<commit_message>
added more rough content to the ami4ccm section
</commit_message>
<xml_diff>
--- a/branches/dds_ports/modules/CIAO/docs/Connectors.pptx
+++ b/branches/dds_ports/modules/CIAO/docs/Connectors.pptx
@@ -6,10 +6,10 @@
     <p:sldMasterId id="2147483725" r:id="rId2"/>
   </p:sldMasterIdLst>
   <p:notesMasterIdLst>
-    <p:notesMasterId r:id="rId52"/>
+    <p:notesMasterId r:id="rId53"/>
   </p:notesMasterIdLst>
   <p:handoutMasterIdLst>
-    <p:handoutMasterId r:id="rId53"/>
+    <p:handoutMasterId r:id="rId54"/>
   </p:handoutMasterIdLst>
   <p:sldIdLst>
     <p:sldId id="1087" r:id="rId3"/>
@@ -57,10 +57,11 @@
     <p:sldId id="1074" r:id="rId45"/>
     <p:sldId id="1075" r:id="rId46"/>
     <p:sldId id="1076" r:id="rId47"/>
-    <p:sldId id="1077" r:id="rId48"/>
-    <p:sldId id="1085" r:id="rId49"/>
-    <p:sldId id="1086" r:id="rId50"/>
-    <p:sldId id="1092" r:id="rId51"/>
+    <p:sldId id="1093" r:id="rId48"/>
+    <p:sldId id="1077" r:id="rId49"/>
+    <p:sldId id="1085" r:id="rId50"/>
+    <p:sldId id="1086" r:id="rId51"/>
+    <p:sldId id="1092" r:id="rId52"/>
   </p:sldIdLst>
   <p:sldSz cx="9144000" cy="6858000" type="screen4x3"/>
   <p:notesSz cx="6997700" cy="9283700"/>
@@ -13032,7 +13033,7 @@
           <p:nvPr/>
         </p:nvPicPr>
         <mc:AlternateContent xmlns:mc="http://schemas.openxmlformats.org/markup-compatibility/2006">
-          <mc:Choice xmlns:ma="http://schemas.microsoft.com/office/mac/drawingml/2008/main" xmlns:mv="urn:schemas-microsoft-com:mac:vml" xmlns="" Requires="ma">
+          <mc:Choice xmlns="" xmlns:mv="urn:schemas-microsoft-com:mac:vml" xmlns:ma="http://schemas.microsoft.com/office/mac/drawingml/2008/main" Requires="ma">
             <p:blipFill>
               <a:blip r:embed="rId2"/>
               <a:stretch>
@@ -13355,7 +13356,7 @@
           <p:nvPr/>
         </p:nvPicPr>
         <mc:AlternateContent xmlns:mc="http://schemas.openxmlformats.org/markup-compatibility/2006">
-          <mc:Choice xmlns:ma="http://schemas.microsoft.com/office/mac/drawingml/2008/main" xmlns:mv="urn:schemas-microsoft-com:mac:vml" xmlns="" Requires="ma">
+          <mc:Choice xmlns="" xmlns:mv="urn:schemas-microsoft-com:mac:vml" xmlns:ma="http://schemas.microsoft.com/office/mac/drawingml/2008/main" Requires="ma">
             <p:blipFill>
               <a:blip r:embed="rId2"/>
               <a:stretch>
@@ -14194,7 +14195,7 @@
           <p:nvPr/>
         </p:nvPicPr>
         <mc:AlternateContent xmlns:mc="http://schemas.openxmlformats.org/markup-compatibility/2006">
-          <mc:Choice xmlns:ma="http://schemas.microsoft.com/office/mac/drawingml/2008/main" xmlns:mv="urn:schemas-microsoft-com:mac:vml" xmlns="" Requires="ma">
+          <mc:Choice xmlns="" xmlns:mv="urn:schemas-microsoft-com:mac:vml" xmlns:ma="http://schemas.microsoft.com/office/mac/drawingml/2008/main" Requires="ma">
             <p:blipFill>
               <a:blip r:embed="rId2"/>
               <a:stretch>
@@ -14576,7 +14577,7 @@
           <p:nvPr/>
         </p:nvPicPr>
         <mc:AlternateContent xmlns:mc="http://schemas.openxmlformats.org/markup-compatibility/2006">
-          <mc:Choice xmlns:ma="http://schemas.microsoft.com/office/mac/drawingml/2008/main" xmlns:mv="urn:schemas-microsoft-com:mac:vml" xmlns="" Requires="ma">
+          <mc:Choice xmlns="" xmlns:mv="urn:schemas-microsoft-com:mac:vml" xmlns:ma="http://schemas.microsoft.com/office/mac/drawingml/2008/main" Requires="ma">
             <p:blipFill>
               <a:blip r:embed="rId2"/>
               <a:stretch>
@@ -14612,7 +14613,7 @@
           <p:nvPr/>
         </p:nvPicPr>
         <mc:AlternateContent xmlns:mc="http://schemas.openxmlformats.org/markup-compatibility/2006">
-          <mc:Choice xmlns:ma="http://schemas.microsoft.com/office/mac/drawingml/2008/main" xmlns:mv="urn:schemas-microsoft-com:mac:vml" xmlns="" Requires="ma">
+          <mc:Choice xmlns="" xmlns:mv="urn:schemas-microsoft-com:mac:vml" xmlns:ma="http://schemas.microsoft.com/office/mac/drawingml/2008/main" Requires="ma">
             <p:blipFill>
               <a:blip r:embed="rId4"/>
               <a:stretch>
@@ -15617,20 +15618,7 @@
                 <a:effectLst/>
                 <a:latin typeface="Arial" pitchFamily="-65" charset="0"/>
               </a:rPr>
-              <a:t>Exact ports are still </a:t>
-            </a:r>
-            <a:r>
-              <a:rPr kumimoji="0" lang="en-US" sz="2400" b="1" i="0" u="none" strike="noStrike" cap="none" normalizeH="0" baseline="0" dirty="0" smtClean="0">
-                <a:ln>
-                  <a:noFill/>
-                </a:ln>
-                <a:solidFill>
-                  <a:srgbClr val="FF0000"/>
-                </a:solidFill>
-                <a:effectLst/>
-                <a:latin typeface="Arial" pitchFamily="-65" charset="0"/>
-              </a:rPr>
-              <a:t>being finalized</a:t>
+              <a:t>Exact ports are still being finalized</a:t>
             </a:r>
             <a:r>
               <a:rPr kumimoji="0" lang="en-US" sz="2400" b="1" i="0" u="none" strike="noStrike" cap="none" normalizeH="0" dirty="0" smtClean="0">
@@ -20325,7 +20313,30 @@
                 <a:ea typeface="宋体" pitchFamily="-65" charset="-128"/>
                 <a:cs typeface="Times New Roman" charset="0"/>
               </a:rPr>
-              <a:t>Sender/Receiver components</a:t>
+              <a:t>$CIAO_ROOT/connectors/dds4ccm/examples/Hello</a:t>
+            </a:r>
+          </a:p>
+          <a:p>
+            <a:pPr marL="169863" indent="-169863">
+              <a:spcBef>
+                <a:spcPct val="40000"/>
+              </a:spcBef>
+              <a:buFontTx/>
+              <a:buChar char="•"/>
+            </a:pPr>
+            <a:r>
+              <a:rPr lang="en-US" altLang="zh-CN" sz="2000" i="0" dirty="0" smtClean="0">
+                <a:ea typeface="宋体" pitchFamily="-65" charset="-128"/>
+                <a:cs typeface="Times New Roman" charset="0"/>
+              </a:rPr>
+              <a:t>Sender/Receiver </a:t>
+            </a:r>
+            <a:r>
+              <a:rPr lang="en-US" altLang="zh-CN" sz="2000" i="0" dirty="0" smtClean="0">
+                <a:ea typeface="宋体" pitchFamily="-65" charset="-128"/>
+                <a:cs typeface="Times New Roman" charset="0"/>
+              </a:rPr>
+              <a:t>components</a:t>
             </a:r>
           </a:p>
           <a:p>
@@ -22845,17 +22856,196 @@
           <a:lstStyle/>
           <a:p>
             <a:r>
-              <a:rPr lang="nl-NL" sz="1100" i="0">
-                <a:latin typeface="Courier New" charset="0"/>
-                <a:ea typeface="Courier New" charset="0"/>
-                <a:cs typeface="Courier New" charset="0"/>
-              </a:rPr>
-              <a:t>component AMI</a:t>
-            </a:r>
-          </a:p>
-          <a:p>
-            <a:r>
-              <a:rPr lang="nl-NL" sz="1100" i="0">
+              <a:rPr lang="nl-NL" sz="1100" i="0" dirty="0" smtClean="0">
+                <a:latin typeface="Courier New" charset="0"/>
+                <a:ea typeface="Courier New" charset="0"/>
+                <a:cs typeface="Courier New" charset="0"/>
+              </a:rPr>
+              <a:t> class  MyFoo_callback_exec_i</a:t>
+            </a:r>
+          </a:p>
+          <a:p>
+            <a:r>
+              <a:rPr lang="nl-NL" sz="1100" i="0" dirty="0" smtClean="0">
+                <a:latin typeface="Courier New" charset="0"/>
+                <a:ea typeface="Courier New" charset="0"/>
+                <a:cs typeface="Courier New" charset="0"/>
+              </a:rPr>
+              <a:t>    : public virtual ::CCM_AMI::CCM_AMI_MyFoo_callback,</a:t>
+            </a:r>
+          </a:p>
+          <a:p>
+            <a:r>
+              <a:rPr lang="nl-NL" sz="1100" i="0" dirty="0" smtClean="0">
+                <a:latin typeface="Courier New" charset="0"/>
+                <a:ea typeface="Courier New" charset="0"/>
+                <a:cs typeface="Courier New" charset="0"/>
+              </a:rPr>
+              <a:t>      public virtual ::CORBA::LocalObject</a:t>
+            </a:r>
+          </a:p>
+          <a:p>
+            <a:r>
+              <a:rPr lang="nl-NL" sz="1100" i="0" dirty="0" smtClean="0">
+                <a:latin typeface="Courier New" charset="0"/>
+                <a:ea typeface="Courier New" charset="0"/>
+                <a:cs typeface="Courier New" charset="0"/>
+              </a:rPr>
+              <a:t>  {</a:t>
+            </a:r>
+          </a:p>
+          <a:p>
+            <a:r>
+              <a:rPr lang="nl-NL" sz="1100" i="0" dirty="0" smtClean="0">
+                <a:latin typeface="Courier New" charset="0"/>
+                <a:ea typeface="Courier New" charset="0"/>
+                <a:cs typeface="Courier New" charset="0"/>
+              </a:rPr>
+              <a:t>  public:</a:t>
+            </a:r>
+          </a:p>
+          <a:p>
+            <a:r>
+              <a:rPr lang="nl-NL" sz="1100" i="0" dirty="0" smtClean="0">
+                <a:latin typeface="Courier New" charset="0"/>
+                <a:ea typeface="Courier New" charset="0"/>
+                <a:cs typeface="Courier New" charset="0"/>
+              </a:rPr>
+              <a:t>    MyFoo_callback_exec_i (void);</a:t>
+            </a:r>
+          </a:p>
+          <a:p>
+            <a:r>
+              <a:rPr lang="nl-NL" sz="1100" i="0" dirty="0" smtClean="0">
+                <a:latin typeface="Courier New" charset="0"/>
+                <a:ea typeface="Courier New" charset="0"/>
+                <a:cs typeface="Courier New" charset="0"/>
+              </a:rPr>
+              <a:t>    virtual ~MyFoo_callback_exec_i (void);</a:t>
+            </a:r>
+          </a:p>
+          <a:p>
+            <a:r>
+              <a:rPr lang="nl-NL" sz="1100" i="0" dirty="0" smtClean="0">
+                <a:latin typeface="Courier New" charset="0"/>
+                <a:ea typeface="Courier New" charset="0"/>
+                <a:cs typeface="Courier New" charset="0"/>
+              </a:rPr>
+              <a:t>    </a:t>
+            </a:r>
+          </a:p>
+          <a:p>
+            <a:r>
+              <a:rPr lang="nl-NL" sz="1100" i="0" dirty="0" smtClean="0">
+                <a:latin typeface="Courier New" charset="0"/>
+                <a:ea typeface="Courier New" charset="0"/>
+                <a:cs typeface="Courier New" charset="0"/>
+              </a:rPr>
+              <a:t>    </a:t>
+            </a:r>
+            <a:r>
+              <a:rPr lang="nl-NL" sz="1100" i="0" dirty="0" smtClean="0">
+                <a:latin typeface="Courier New" charset="0"/>
+                <a:ea typeface="Courier New" charset="0"/>
+                <a:cs typeface="Courier New" charset="0"/>
+              </a:rPr>
+              <a:t>virtual void</a:t>
+            </a:r>
+          </a:p>
+          <a:p>
+            <a:r>
+              <a:rPr lang="nl-NL" sz="1100" i="0" dirty="0" smtClean="0">
+                <a:latin typeface="Courier New" charset="0"/>
+                <a:ea typeface="Courier New" charset="0"/>
+                <a:cs typeface="Courier New" charset="0"/>
+              </a:rPr>
+              <a:t>    foo_callback_handler (</a:t>
+            </a:r>
+          </a:p>
+          <a:p>
+            <a:r>
+              <a:rPr lang="nl-NL" sz="1100" i="0" dirty="0" smtClean="0">
+                <a:latin typeface="Courier New" charset="0"/>
+                <a:ea typeface="Courier New" charset="0"/>
+                <a:cs typeface="Courier New" charset="0"/>
+              </a:rPr>
+              <a:t>      ::CORBA::Long result,</a:t>
+            </a:r>
+          </a:p>
+          <a:p>
+            <a:r>
+              <a:rPr lang="nl-NL" sz="1100" i="0" dirty="0" smtClean="0">
+                <a:latin typeface="Courier New" charset="0"/>
+                <a:ea typeface="Courier New" charset="0"/>
+                <a:cs typeface="Courier New" charset="0"/>
+              </a:rPr>
+              <a:t>      const char * answer);</a:t>
+            </a:r>
+          </a:p>
+          <a:p>
+            <a:r>
+              <a:rPr lang="nl-NL" sz="1100" i="0" dirty="0" smtClean="0">
+                <a:latin typeface="Courier New" charset="0"/>
+                <a:ea typeface="Courier New" charset="0"/>
+                <a:cs typeface="Courier New" charset="0"/>
+              </a:rPr>
+              <a:t>    </a:t>
+            </a:r>
+            <a:endParaRPr lang="nl-NL" sz="1100" i="0" dirty="0" smtClean="0">
+              <a:latin typeface="Courier New" charset="0"/>
+              <a:ea typeface="Courier New" charset="0"/>
+              <a:cs typeface="Courier New" charset="0"/>
+            </a:endParaRPr>
+          </a:p>
+          <a:p>
+            <a:r>
+              <a:rPr lang="nl-NL" sz="1100" i="0" dirty="0" smtClean="0">
+                <a:latin typeface="Courier New" charset="0"/>
+                <a:ea typeface="Courier New" charset="0"/>
+                <a:cs typeface="Courier New" charset="0"/>
+              </a:rPr>
+              <a:t>    virtual void</a:t>
+            </a:r>
+          </a:p>
+          <a:p>
+            <a:r>
+              <a:rPr lang="nl-NL" sz="1100" i="0" dirty="0" smtClean="0">
+                <a:latin typeface="Courier New" charset="0"/>
+                <a:ea typeface="Courier New" charset="0"/>
+                <a:cs typeface="Courier New" charset="0"/>
+              </a:rPr>
+              <a:t>    foo_callback_excep (</a:t>
+            </a:r>
+          </a:p>
+          <a:p>
+            <a:r>
+              <a:rPr lang="nl-NL" sz="1100" i="0" dirty="0" smtClean="0">
+                <a:latin typeface="Courier New" charset="0"/>
+                <a:ea typeface="Courier New" charset="0"/>
+                <a:cs typeface="Courier New" charset="0"/>
+              </a:rPr>
+              <a:t>      const ::CCM_AMI::InternalException &amp; exception_holder);</a:t>
+            </a:r>
+          </a:p>
+          <a:p>
+            <a:r>
+              <a:rPr lang="nl-NL" sz="1100" i="0" dirty="0" smtClean="0">
+                <a:latin typeface="Courier New" charset="0"/>
+                <a:ea typeface="Courier New" charset="0"/>
+                <a:cs typeface="Courier New" charset="0"/>
+              </a:rPr>
+              <a:t>  </a:t>
+            </a:r>
+            <a:r>
+              <a:rPr lang="nl-NL" sz="1100" i="0" dirty="0" smtClean="0">
+                <a:latin typeface="Courier New" charset="0"/>
+                <a:ea typeface="Courier New" charset="0"/>
+                <a:cs typeface="Courier New" charset="0"/>
+              </a:rPr>
+              <a:t>};</a:t>
+            </a:r>
+            <a:r>
+              <a:rPr lang="nl-NL" sz="1100" i="0" dirty="0">
                 <a:latin typeface="Courier New" charset="0"/>
                 <a:ea typeface="Courier New" charset="0"/>
                 <a:cs typeface="Courier New" charset="0"/>
@@ -22863,13 +23053,13 @@
               <a:t/>
             </a:r>
             <a:br>
-              <a:rPr lang="nl-NL" sz="1100" i="0">
+              <a:rPr lang="nl-NL" sz="1100" i="0" dirty="0">
                 <a:latin typeface="Courier New" charset="0"/>
                 <a:ea typeface="Courier New" charset="0"/>
                 <a:cs typeface="Courier New" charset="0"/>
               </a:rPr>
             </a:br>
-            <a:endParaRPr lang="nl-NL" sz="1100" i="0">
+            <a:endParaRPr lang="nl-NL" sz="1100" i="0" dirty="0">
               <a:latin typeface="Courier New" charset="0"/>
               <a:ea typeface="Courier New" charset="0"/>
               <a:cs typeface="Courier New" charset="0"/>
@@ -22911,7 +23101,7 @@
       </p:grpSpPr>
       <p:sp>
         <p:nvSpPr>
-          <p:cNvPr id="294914" name="Rectangle 2"/>
+          <p:cNvPr id="293890" name="Rectangle 2"/>
           <p:cNvSpPr>
             <a:spLocks noChangeArrowheads="1"/>
           </p:cNvSpPr>
@@ -22954,14 +23144,14 @@
                 <a:ea typeface="宋体" pitchFamily="-65" charset="-128"/>
                 <a:cs typeface="宋体" pitchFamily="-65" charset="-128"/>
               </a:rPr>
-              <a:t>Invoking the asynchronous callback</a:t>
+              <a:t>Implement the callback handler</a:t>
             </a:r>
           </a:p>
         </p:txBody>
       </p:sp>
       <p:sp>
         <p:nvSpPr>
-          <p:cNvPr id="294915" name="Rectangle 3"/>
+          <p:cNvPr id="293891" name="Rectangle 3"/>
           <p:cNvSpPr>
             <a:spLocks noChangeArrowheads="1"/>
           </p:cNvSpPr>
@@ -23007,7 +23197,7 @@
       </p:sp>
       <p:sp>
         <p:nvSpPr>
-          <p:cNvPr id="294916" name="Rectangle 4"/>
+          <p:cNvPr id="293892" name="Rectangle 4"/>
           <p:cNvSpPr>
             <a:spLocks noChangeArrowheads="1"/>
           </p:cNvSpPr>
@@ -23038,17 +23228,154 @@
           <a:lstStyle/>
           <a:p>
             <a:r>
-              <a:rPr lang="nl-NL" sz="1100" i="0">
-                <a:latin typeface="Courier New" charset="0"/>
-                <a:ea typeface="Courier New" charset="0"/>
-                <a:cs typeface="Courier New" charset="0"/>
-              </a:rPr>
-              <a:t>component AMI</a:t>
-            </a:r>
-          </a:p>
-          <a:p>
-            <a:r>
-              <a:rPr lang="nl-NL" sz="1100" i="0">
+              <a:rPr lang="nl-NL" sz="1100" i="0" dirty="0" smtClean="0">
+                <a:latin typeface="Courier New" charset="0"/>
+                <a:ea typeface="Courier New" charset="0"/>
+                <a:cs typeface="Courier New" charset="0"/>
+              </a:rPr>
+              <a:t>Void</a:t>
+            </a:r>
+          </a:p>
+          <a:p>
+            <a:r>
+              <a:rPr lang="nl-NL" sz="1100" i="0" dirty="0" smtClean="0">
+                <a:latin typeface="Courier New" charset="0"/>
+                <a:ea typeface="Courier New" charset="0"/>
+                <a:cs typeface="Courier New" charset="0"/>
+              </a:rPr>
+              <a:t>MyFoo_callback_exec_i::foo_callback_handler (</a:t>
+            </a:r>
+          </a:p>
+          <a:p>
+            <a:r>
+              <a:rPr lang="nl-NL" sz="1100" i="0" dirty="0" smtClean="0">
+                <a:latin typeface="Courier New" charset="0"/>
+                <a:ea typeface="Courier New" charset="0"/>
+                <a:cs typeface="Courier New" charset="0"/>
+              </a:rPr>
+              <a:t>    ::CORBA::Long result,</a:t>
+            </a:r>
+          </a:p>
+          <a:p>
+            <a:r>
+              <a:rPr lang="nl-NL" sz="1100" i="0" dirty="0" smtClean="0">
+                <a:latin typeface="Courier New" charset="0"/>
+                <a:ea typeface="Courier New" charset="0"/>
+                <a:cs typeface="Courier New" charset="0"/>
+              </a:rPr>
+              <a:t>    const char * answer)</a:t>
+            </a:r>
+          </a:p>
+          <a:p>
+            <a:r>
+              <a:rPr lang="nl-NL" sz="1100" i="0" dirty="0" smtClean="0">
+                <a:latin typeface="Courier New" charset="0"/>
+                <a:ea typeface="Courier New" charset="0"/>
+                <a:cs typeface="Courier New" charset="0"/>
+              </a:rPr>
+              <a:t>  {</a:t>
+            </a:r>
+          </a:p>
+          <a:p>
+            <a:r>
+              <a:rPr lang="nl-NL" sz="1100" i="0" dirty="0" smtClean="0">
+                <a:latin typeface="Courier New" charset="0"/>
+                <a:ea typeface="Courier New" charset="0"/>
+                <a:cs typeface="Courier New" charset="0"/>
+              </a:rPr>
+              <a:t>    printf ("Sender (FOO) :\tCallback from AMI : result &lt;%d&gt; answer &lt;%s&gt;\n", result, answer);</a:t>
+            </a:r>
+          </a:p>
+          <a:p>
+            <a:r>
+              <a:rPr lang="nl-NL" sz="1100" i="0" dirty="0" smtClean="0">
+                <a:latin typeface="Courier New" charset="0"/>
+                <a:ea typeface="Courier New" charset="0"/>
+                <a:cs typeface="Courier New" charset="0"/>
+              </a:rPr>
+              <a:t>  }</a:t>
+            </a:r>
+          </a:p>
+          <a:p>
+            <a:endParaRPr lang="nl-NL" sz="1100" i="0" dirty="0" smtClean="0">
+              <a:latin typeface="Courier New" charset="0"/>
+              <a:ea typeface="Courier New" charset="0"/>
+              <a:cs typeface="Courier New" charset="0"/>
+            </a:endParaRPr>
+          </a:p>
+          <a:p>
+            <a:r>
+              <a:rPr lang="nl-NL" sz="1100" i="0" dirty="0" smtClean="0">
+                <a:latin typeface="Courier New" charset="0"/>
+                <a:ea typeface="Courier New" charset="0"/>
+                <a:cs typeface="Courier New" charset="0"/>
+              </a:rPr>
+              <a:t>  void</a:t>
+            </a:r>
+          </a:p>
+          <a:p>
+            <a:r>
+              <a:rPr lang="nl-NL" sz="1100" i="0" dirty="0" smtClean="0">
+                <a:latin typeface="Courier New" charset="0"/>
+                <a:ea typeface="Courier New" charset="0"/>
+                <a:cs typeface="Courier New" charset="0"/>
+              </a:rPr>
+              <a:t>  MyFoo_callback_exec_i::foo_callback_excep (</a:t>
+            </a:r>
+          </a:p>
+          <a:p>
+            <a:r>
+              <a:rPr lang="nl-NL" sz="1100" i="0" dirty="0" smtClean="0">
+                <a:latin typeface="Courier New" charset="0"/>
+                <a:ea typeface="Courier New" charset="0"/>
+                <a:cs typeface="Courier New" charset="0"/>
+              </a:rPr>
+              <a:t>      const ::CCM_AMI::InternalException &amp; exception_holder)</a:t>
+            </a:r>
+          </a:p>
+          <a:p>
+            <a:r>
+              <a:rPr lang="nl-NL" sz="1100" i="0" dirty="0" smtClean="0">
+                <a:latin typeface="Courier New" charset="0"/>
+                <a:ea typeface="Courier New" charset="0"/>
+                <a:cs typeface="Courier New" charset="0"/>
+              </a:rPr>
+              <a:t>  {</a:t>
+            </a:r>
+          </a:p>
+          <a:p>
+            <a:r>
+              <a:rPr lang="nl-NL" sz="1100" i="0" dirty="0" smtClean="0">
+                <a:latin typeface="Courier New" charset="0"/>
+                <a:ea typeface="Courier New" charset="0"/>
+                <a:cs typeface="Courier New" charset="0"/>
+              </a:rPr>
+              <a:t>    printf ("Sender (FOO) :\tCallback except from AMI : excepti id : &lt;%d&gt; except string : &lt;%s&gt;\n",</a:t>
+            </a:r>
+          </a:p>
+          <a:p>
+            <a:r>
+              <a:rPr lang="nl-NL" sz="1100" i="0" dirty="0" smtClean="0">
+                <a:latin typeface="Courier New" charset="0"/>
+                <a:ea typeface="Courier New" charset="0"/>
+                <a:cs typeface="Courier New" charset="0"/>
+              </a:rPr>
+              <a:t>      exception_holder.id, exception_holder.error_string.in ());</a:t>
+            </a:r>
+          </a:p>
+          <a:p>
+            <a:r>
+              <a:rPr lang="nl-NL" sz="1100" i="0" dirty="0" smtClean="0">
+                <a:latin typeface="Courier New" charset="0"/>
+                <a:ea typeface="Courier New" charset="0"/>
+                <a:cs typeface="Courier New" charset="0"/>
+              </a:rPr>
+              <a:t>  }</a:t>
+            </a:r>
+          </a:p>
+          <a:p>
+            <a:r>
+              <a:rPr lang="nl-NL" sz="1100" i="0" dirty="0" smtClean="0">
                 <a:latin typeface="Courier New" charset="0"/>
                 <a:ea typeface="Courier New" charset="0"/>
                 <a:cs typeface="Courier New" charset="0"/>
@@ -23056,13 +23383,13 @@
               <a:t/>
             </a:r>
             <a:br>
-              <a:rPr lang="nl-NL" sz="1100" i="0">
+              <a:rPr lang="nl-NL" sz="1100" i="0" dirty="0" smtClean="0">
                 <a:latin typeface="Courier New" charset="0"/>
                 <a:ea typeface="Courier New" charset="0"/>
                 <a:cs typeface="Courier New" charset="0"/>
               </a:rPr>
             </a:br>
-            <a:endParaRPr lang="nl-NL" sz="1100" i="0">
+            <a:endParaRPr lang="nl-NL" sz="1100" i="0" dirty="0">
               <a:latin typeface="Courier New" charset="0"/>
               <a:ea typeface="Courier New" charset="0"/>
               <a:cs typeface="Courier New" charset="0"/>
@@ -23140,22 +23467,15 @@
               </a:spcBef>
             </a:pPr>
             <a:r>
-              <a:rPr lang="en-US" altLang="zh-CN" sz="3200" i="0" dirty="0" smtClean="0">
+              <a:rPr lang="en-US" altLang="zh-CN" sz="3200" i="0">
                 <a:solidFill>
                   <a:srgbClr val="FF0000"/>
                 </a:solidFill>
                 <a:ea typeface="宋体" pitchFamily="-65" charset="-128"/>
                 <a:cs typeface="宋体" pitchFamily="-65" charset="-128"/>
               </a:rPr>
-              <a:t>Prototype</a:t>
-            </a:r>
-            <a:endParaRPr lang="en-US" altLang="zh-CN" sz="3200" i="0" dirty="0">
-              <a:solidFill>
-                <a:srgbClr val="FF0000"/>
-              </a:solidFill>
-              <a:ea typeface="宋体" pitchFamily="-65" charset="-128"/>
-              <a:cs typeface="宋体" pitchFamily="-65" charset="-128"/>
-            </a:endParaRPr>
+              <a:t>Invoking the asynchronous callback</a:t>
+            </a:r>
           </a:p>
         </p:txBody>
       </p:sp>
@@ -23238,30 +23558,126 @@
           <a:lstStyle/>
           <a:p>
             <a:r>
-              <a:rPr lang="nl-NL" sz="1100" i="0" dirty="0">
-                <a:latin typeface="Courier New" charset="0"/>
-                <a:ea typeface="Courier New" charset="0"/>
-                <a:cs typeface="Courier New" charset="0"/>
-              </a:rPr>
-              <a:t>component AMI</a:t>
-            </a:r>
-          </a:p>
-          <a:p>
-            <a:r>
-              <a:rPr lang="nl-NL" sz="1100" i="0" dirty="0">
-                <a:latin typeface="Courier New" charset="0"/>
-                <a:ea typeface="Courier New" charset="0"/>
-                <a:cs typeface="Courier New" charset="0"/>
-              </a:rPr>
-              <a:t/>
-            </a:r>
-            <a:br>
-              <a:rPr lang="nl-NL" sz="1100" i="0" dirty="0">
-                <a:latin typeface="Courier New" charset="0"/>
-                <a:ea typeface="Courier New" charset="0"/>
-                <a:cs typeface="Courier New" charset="0"/>
-              </a:rPr>
-            </a:br>
+              <a:rPr lang="en-US" sz="1100" i="0" dirty="0" smtClean="0">
+                <a:latin typeface="Courier New" charset="0"/>
+                <a:ea typeface="Courier New" charset="0"/>
+                <a:cs typeface="Courier New" charset="0"/>
+              </a:rPr>
+              <a:t> ::CCM_AMI::</a:t>
+            </a:r>
+            <a:r>
+              <a:rPr lang="en-US" sz="1100" i="0" dirty="0" err="1" smtClean="0">
+                <a:latin typeface="Courier New" charset="0"/>
+                <a:ea typeface="Courier New" charset="0"/>
+                <a:cs typeface="Courier New" charset="0"/>
+              </a:rPr>
+              <a:t>AMI_MyFoo_var</a:t>
+            </a:r>
+            <a:r>
+              <a:rPr lang="en-US" sz="1100" i="0" dirty="0" smtClean="0">
+                <a:latin typeface="Courier New" charset="0"/>
+                <a:ea typeface="Courier New" charset="0"/>
+                <a:cs typeface="Courier New" charset="0"/>
+              </a:rPr>
+              <a:t> </a:t>
+            </a:r>
+            <a:r>
+              <a:rPr lang="en-US" sz="1100" i="0" dirty="0" err="1" smtClean="0">
+                <a:latin typeface="Courier New" charset="0"/>
+                <a:ea typeface="Courier New" charset="0"/>
+                <a:cs typeface="Courier New" charset="0"/>
+              </a:rPr>
+              <a:t>my_foo_ami</a:t>
+            </a:r>
+            <a:r>
+              <a:rPr lang="en-US" sz="1100" i="0" dirty="0" smtClean="0">
+                <a:latin typeface="Courier New" charset="0"/>
+                <a:ea typeface="Courier New" charset="0"/>
+                <a:cs typeface="Courier New" charset="0"/>
+              </a:rPr>
+              <a:t> </a:t>
+            </a:r>
+            <a:r>
+              <a:rPr lang="en-US" sz="1100" i="0" dirty="0" smtClean="0">
+                <a:latin typeface="Courier New" charset="0"/>
+                <a:ea typeface="Courier New" charset="0"/>
+                <a:cs typeface="Courier New" charset="0"/>
+              </a:rPr>
+              <a:t>=</a:t>
+            </a:r>
+            <a:endParaRPr lang="en-US" sz="1100" i="0" dirty="0" smtClean="0">
+              <a:latin typeface="Courier New" charset="0"/>
+              <a:ea typeface="Courier New" charset="0"/>
+              <a:cs typeface="Courier New" charset="0"/>
+            </a:endParaRPr>
+          </a:p>
+          <a:p>
+            <a:r>
+              <a:rPr lang="en-US" sz="1100" i="0" dirty="0" smtClean="0">
+                <a:latin typeface="Courier New" charset="0"/>
+                <a:ea typeface="Courier New" charset="0"/>
+                <a:cs typeface="Courier New" charset="0"/>
+              </a:rPr>
+              <a:t>      this-&gt;context_-&gt;</a:t>
+            </a:r>
+            <a:r>
+              <a:rPr lang="en-US" sz="1100" i="0" dirty="0" err="1" smtClean="0">
+                <a:latin typeface="Courier New" charset="0"/>
+                <a:ea typeface="Courier New" charset="0"/>
+                <a:cs typeface="Courier New" charset="0"/>
+              </a:rPr>
+              <a:t>get_connection_run_asynch_my_foo</a:t>
+            </a:r>
+            <a:r>
+              <a:rPr lang="en-US" sz="1100" i="0" dirty="0" smtClean="0">
+                <a:latin typeface="Courier New" charset="0"/>
+                <a:ea typeface="Courier New" charset="0"/>
+                <a:cs typeface="Courier New" charset="0"/>
+              </a:rPr>
+              <a:t>();</a:t>
+            </a:r>
+          </a:p>
+          <a:p>
+            <a:r>
+              <a:rPr lang="en-US" sz="1100" i="0" dirty="0" smtClean="0">
+                <a:latin typeface="Courier New" charset="0"/>
+                <a:ea typeface="Courier New" charset="0"/>
+                <a:cs typeface="Courier New" charset="0"/>
+              </a:rPr>
+              <a:t> </a:t>
+            </a:r>
+            <a:r>
+              <a:rPr lang="en-US" sz="1100" i="0" dirty="0" err="1" smtClean="0">
+                <a:latin typeface="Courier New" charset="0"/>
+                <a:ea typeface="Courier New" charset="0"/>
+                <a:cs typeface="Courier New" charset="0"/>
+              </a:rPr>
+              <a:t>my_foo_ami</a:t>
+            </a:r>
+            <a:r>
+              <a:rPr lang="en-US" sz="1100" i="0" dirty="0" smtClean="0">
+                <a:latin typeface="Courier New" charset="0"/>
+                <a:ea typeface="Courier New" charset="0"/>
+                <a:cs typeface="Courier New" charset="0"/>
+              </a:rPr>
+              <a:t>_-&gt;</a:t>
+            </a:r>
+            <a:r>
+              <a:rPr lang="en-US" sz="1100" i="0" dirty="0" err="1" smtClean="0">
+                <a:latin typeface="Courier New" charset="0"/>
+                <a:ea typeface="Courier New" charset="0"/>
+                <a:cs typeface="Courier New" charset="0"/>
+              </a:rPr>
+              <a:t>sendc_foo</a:t>
+            </a:r>
+            <a:r>
+              <a:rPr lang="en-US" sz="1100" i="0" dirty="0" smtClean="0">
+                <a:latin typeface="Courier New" charset="0"/>
+                <a:ea typeface="Courier New" charset="0"/>
+                <a:cs typeface="Courier New" charset="0"/>
+              </a:rPr>
+              <a:t> ("Do something asynchronous");</a:t>
+            </a:r>
             <a:endParaRPr lang="nl-NL" sz="1100" i="0" dirty="0">
               <a:latin typeface="Courier New" charset="0"/>
               <a:ea typeface="Courier New" charset="0"/>
@@ -23347,7 +23763,7 @@
                 <a:ea typeface="宋体" pitchFamily="-65" charset="-128"/>
                 <a:cs typeface="宋体" pitchFamily="-65" charset="-128"/>
               </a:rPr>
-              <a:t>OMG Process</a:t>
+              <a:t>Prototype</a:t>
             </a:r>
             <a:endParaRPr lang="en-US" altLang="zh-CN" sz="3200" i="0" dirty="0">
               <a:solidFill>
@@ -23442,13 +23858,18 @@
               <a:buChar char="•"/>
             </a:pPr>
             <a:r>
-              <a:rPr lang="nl-NL" sz="2000" i="0" dirty="0" smtClean="0">
+              <a:rPr lang="en-US" altLang="zh-CN" sz="2000" i="0" dirty="0" smtClean="0">
                 <a:latin typeface="+mn-lt"/>
-                <a:ea typeface="Courier New" charset="0"/>
-                <a:cs typeface="Courier New" charset="0"/>
-              </a:rPr>
-              <a:t>AMI4CCM port part anymore of DDS4CCM</a:t>
-            </a:r>
+                <a:ea typeface="宋体" pitchFamily="-65" charset="-128"/>
+                <a:cs typeface="Times New Roman" charset="0"/>
+              </a:rPr>
+              <a:t>$CIAO_ROOT/connectors/ami4ccm/examples/Hello</a:t>
+            </a:r>
+            <a:endParaRPr lang="en-US" altLang="zh-CN" sz="2000" i="0" dirty="0" smtClean="0">
+              <a:latin typeface="+mn-lt"/>
+              <a:ea typeface="宋体" pitchFamily="-65" charset="-128"/>
+              <a:cs typeface="Times New Roman" charset="0"/>
+            </a:endParaRPr>
           </a:p>
           <a:p>
             <a:pPr>
@@ -23461,63 +23882,7 @@
                 <a:ea typeface="Courier New" charset="0"/>
                 <a:cs typeface="Courier New" charset="0"/>
               </a:rPr>
-              <a:t>Standardization will take</a:t>
-            </a:r>
-          </a:p>
-          <a:p>
-            <a:pPr lvl="1">
-              <a:buFont typeface="Arial" pitchFamily="34" charset="0"/>
-              <a:buChar char="•"/>
-            </a:pPr>
-            <a:r>
-              <a:rPr lang="nl-NL" sz="2000" i="0" dirty="0" smtClean="0">
-                <a:latin typeface="+mn-lt"/>
-                <a:ea typeface="Courier New" charset="0"/>
-                <a:cs typeface="Courier New" charset="0"/>
-              </a:rPr>
-              <a:t>Request for Proposal (RFP)</a:t>
-            </a:r>
-          </a:p>
-          <a:p>
-            <a:pPr lvl="1">
-              <a:buFont typeface="Arial" pitchFamily="34" charset="0"/>
-              <a:buChar char="•"/>
-            </a:pPr>
-            <a:r>
-              <a:rPr lang="nl-NL" sz="2000" i="0" dirty="0" smtClean="0">
-                <a:latin typeface="+mn-lt"/>
-                <a:ea typeface="Courier New" charset="0"/>
-                <a:cs typeface="Courier New" charset="0"/>
-              </a:rPr>
-              <a:t>Respond to the proposal</a:t>
-            </a:r>
-          </a:p>
-          <a:p>
-            <a:pPr lvl="1">
-              <a:buFont typeface="Arial" pitchFamily="34" charset="0"/>
-              <a:buChar char="•"/>
-            </a:pPr>
-            <a:r>
-              <a:rPr lang="nl-NL" sz="2000" i="0" dirty="0" smtClean="0">
-                <a:latin typeface="+mn-lt"/>
-                <a:ea typeface="Courier New" charset="0"/>
-                <a:cs typeface="Courier New" charset="0"/>
-              </a:rPr>
-              <a:t>Agree on a beta 1 specification</a:t>
-            </a:r>
-          </a:p>
-          <a:p>
-            <a:pPr lvl="1">
-              <a:buFont typeface="Arial" pitchFamily="34" charset="0"/>
-              <a:buChar char="•"/>
-            </a:pPr>
-            <a:r>
-              <a:rPr lang="nl-NL" sz="2000" i="0" dirty="0" smtClean="0">
-                <a:latin typeface="+mn-lt"/>
-                <a:ea typeface="Courier New" charset="0"/>
-                <a:cs typeface="Courier New" charset="0"/>
-              </a:rPr>
-              <a:t>Finalization Task Force (FTF)</a:t>
+              <a:t>Sender component</a:t>
             </a:r>
           </a:p>
           <a:p>
@@ -23531,64 +23896,22 @@
                 <a:ea typeface="Courier New" charset="0"/>
                 <a:cs typeface="Courier New" charset="0"/>
               </a:rPr>
-              <a:t>Time commitment</a:t>
-            </a:r>
-          </a:p>
-          <a:p>
-            <a:pPr lvl="1">
-              <a:buFont typeface="Arial" pitchFamily="34" charset="0"/>
-              <a:buChar char="•"/>
-            </a:pPr>
-            <a:r>
-              <a:rPr lang="nl-NL" sz="2000" i="0" dirty="0" smtClean="0">
-                <a:latin typeface="+mn-lt"/>
-                <a:ea typeface="Courier New" charset="0"/>
-                <a:cs typeface="Courier New" charset="0"/>
-              </a:rPr>
-              <a:t>4 visits to a OMG meeting, each one week</a:t>
-            </a:r>
-          </a:p>
-          <a:p>
-            <a:pPr lvl="1">
-              <a:buFont typeface="Arial" pitchFamily="34" charset="0"/>
-              <a:buChar char="•"/>
-            </a:pPr>
-            <a:r>
-              <a:rPr lang="nl-NL" sz="2000" i="0" dirty="0" smtClean="0">
-                <a:latin typeface="+mn-lt"/>
-                <a:ea typeface="Courier New" charset="0"/>
-                <a:cs typeface="Courier New" charset="0"/>
-              </a:rPr>
-              <a:t>Around 1 to 2 weeks of preparation for each meeting</a:t>
-            </a:r>
-          </a:p>
-          <a:p>
-            <a:pPr lvl="1">
-              <a:buFont typeface="Arial" pitchFamily="34" charset="0"/>
-              <a:buChar char="•"/>
-            </a:pPr>
-            <a:endParaRPr lang="nl-NL" sz="2000" i="0" dirty="0" smtClean="0">
-              <a:latin typeface="+mn-lt"/>
-              <a:ea typeface="Courier New" charset="0"/>
-              <a:cs typeface="Courier New" charset="0"/>
-            </a:endParaRPr>
-          </a:p>
-          <a:p>
-            <a:pPr lvl="1">
-              <a:buFont typeface="Arial" pitchFamily="34" charset="0"/>
-              <a:buChar char="•"/>
-            </a:pPr>
-            <a:endParaRPr lang="nl-NL" sz="2000" i="0" dirty="0" smtClean="0">
-              <a:latin typeface="+mn-lt"/>
-              <a:ea typeface="Courier New" charset="0"/>
-              <a:cs typeface="Courier New" charset="0"/>
-            </a:endParaRPr>
+              <a:t>Receiver component</a:t>
+            </a:r>
           </a:p>
           <a:p>
             <a:pPr>
               <a:buFont typeface="Arial" pitchFamily="34" charset="0"/>
               <a:buChar char="•"/>
             </a:pPr>
+            <a:r>
+              <a:rPr lang="nl-NL" sz="2000" i="0" dirty="0" smtClean="0">
+                <a:latin typeface="+mn-lt"/>
+                <a:ea typeface="Courier New" charset="0"/>
+                <a:cs typeface="Courier New" charset="0"/>
+              </a:rPr>
+              <a:t>AMI connector </a:t>
+            </a:r>
             <a:endParaRPr lang="nl-NL" sz="2000" i="0" dirty="0">
               <a:latin typeface="+mn-lt"/>
               <a:ea typeface="Courier New" charset="0"/>
@@ -23596,6 +23919,18 @@
             </a:endParaRPr>
           </a:p>
           <a:p>
+            <a:pPr>
+              <a:buFont typeface="Arial" pitchFamily="34" charset="0"/>
+              <a:buChar char="•"/>
+            </a:pPr>
+            <a:r>
+              <a:rPr lang="nl-NL" sz="2000" i="0" dirty="0" smtClean="0">
+                <a:latin typeface="+mn-lt"/>
+                <a:ea typeface="Courier New" charset="0"/>
+                <a:cs typeface="Courier New" charset="0"/>
+              </a:rPr>
+              <a:t>Deployment plan for these 3 components</a:t>
+            </a:r>
             <a:r>
               <a:rPr lang="nl-NL" sz="2000" i="0" dirty="0">
                 <a:latin typeface="+mn-lt"/>
@@ -23696,7 +24031,17 @@
                 <a:ea typeface="宋体" pitchFamily="-65" charset="-128"/>
                 <a:cs typeface="宋体" pitchFamily="-65" charset="-128"/>
               </a:rPr>
-              <a:t>Modeling</a:t>
+              <a:t>Possible OMG </a:t>
+            </a:r>
+            <a:r>
+              <a:rPr lang="en-US" altLang="zh-CN" sz="3200" i="0" dirty="0" smtClean="0">
+                <a:solidFill>
+                  <a:srgbClr val="FF0000"/>
+                </a:solidFill>
+                <a:ea typeface="宋体" pitchFamily="-65" charset="-128"/>
+                <a:cs typeface="宋体" pitchFamily="-65" charset="-128"/>
+              </a:rPr>
+              <a:t>Process</a:t>
             </a:r>
             <a:endParaRPr lang="en-US" altLang="zh-CN" sz="3200" i="0" dirty="0">
               <a:solidFill>
@@ -23796,7 +24141,7 @@
                 <a:ea typeface="Courier New" charset="0"/>
                 <a:cs typeface="Courier New" charset="0"/>
               </a:rPr>
-              <a:t>Working modeling environment must be avaible for making larger tests</a:t>
+              <a:t>AMI4CCM port part anymore of DDS4CCM</a:t>
             </a:r>
           </a:p>
           <a:p>
@@ -23805,22 +24150,162 @@
               <a:buChar char="•"/>
             </a:pPr>
             <a:r>
-              <a:rPr lang="en-US" sz="2000" i="0" dirty="0" smtClean="0">
+              <a:rPr lang="nl-NL" sz="2000" i="0" dirty="0" smtClean="0">
                 <a:latin typeface="+mn-lt"/>
                 <a:ea typeface="Courier New" charset="0"/>
                 <a:cs typeface="Courier New" charset="0"/>
               </a:rPr>
-              <a:t>Runtime and modeling efforts should </a:t>
-            </a:r>
-            <a:r>
-              <a:rPr lang="en-US" sz="2000" i="0" smtClean="0">
+              <a:t>Standardization will take</a:t>
+            </a:r>
+          </a:p>
+          <a:p>
+            <a:pPr lvl="1">
+              <a:buFont typeface="Arial" pitchFamily="34" charset="0"/>
+              <a:buChar char="•"/>
+            </a:pPr>
+            <a:r>
+              <a:rPr lang="nl-NL" sz="2000" i="0" dirty="0" smtClean="0">
                 <a:latin typeface="+mn-lt"/>
                 <a:ea typeface="Courier New" charset="0"/>
                 <a:cs typeface="Courier New" charset="0"/>
               </a:rPr>
-              <a:t>be synchronized</a:t>
-            </a:r>
+              <a:t>Request for Proposal (RFP)</a:t>
+            </a:r>
+          </a:p>
+          <a:p>
+            <a:pPr lvl="1">
+              <a:buFont typeface="Arial" pitchFamily="34" charset="0"/>
+              <a:buChar char="•"/>
+            </a:pPr>
+            <a:r>
+              <a:rPr lang="nl-NL" sz="2000" i="0" dirty="0" smtClean="0">
+                <a:latin typeface="+mn-lt"/>
+                <a:ea typeface="Courier New" charset="0"/>
+                <a:cs typeface="Courier New" charset="0"/>
+              </a:rPr>
+              <a:t>Respond to the proposal</a:t>
+            </a:r>
+          </a:p>
+          <a:p>
+            <a:pPr lvl="1">
+              <a:buFont typeface="Arial" pitchFamily="34" charset="0"/>
+              <a:buChar char="•"/>
+            </a:pPr>
+            <a:r>
+              <a:rPr lang="nl-NL" sz="2000" i="0" dirty="0" smtClean="0">
+                <a:latin typeface="+mn-lt"/>
+                <a:ea typeface="Courier New" charset="0"/>
+                <a:cs typeface="Courier New" charset="0"/>
+              </a:rPr>
+              <a:t>Agree on a beta 1 specification</a:t>
+            </a:r>
+          </a:p>
+          <a:p>
+            <a:pPr lvl="1">
+              <a:buFont typeface="Arial" pitchFamily="34" charset="0"/>
+              <a:buChar char="•"/>
+            </a:pPr>
+            <a:r>
+              <a:rPr lang="nl-NL" sz="2000" i="0" dirty="0" smtClean="0">
+                <a:latin typeface="+mn-lt"/>
+                <a:ea typeface="Courier New" charset="0"/>
+                <a:cs typeface="Courier New" charset="0"/>
+              </a:rPr>
+              <a:t>Finalization Task Force (FTF)</a:t>
+            </a:r>
+          </a:p>
+          <a:p>
+            <a:pPr>
+              <a:buFont typeface="Arial" pitchFamily="34" charset="0"/>
+              <a:buChar char="•"/>
+            </a:pPr>
+            <a:r>
+              <a:rPr lang="nl-NL" sz="2000" i="0" dirty="0" smtClean="0">
+                <a:latin typeface="+mn-lt"/>
+                <a:ea typeface="Courier New" charset="0"/>
+                <a:cs typeface="Courier New" charset="0"/>
+              </a:rPr>
+              <a:t>Time commitment</a:t>
+            </a:r>
+          </a:p>
+          <a:p>
+            <a:pPr lvl="1">
+              <a:buFont typeface="Arial" pitchFamily="34" charset="0"/>
+              <a:buChar char="•"/>
+            </a:pPr>
+            <a:r>
+              <a:rPr lang="nl-NL" sz="2000" i="0" dirty="0" smtClean="0">
+                <a:latin typeface="+mn-lt"/>
+                <a:ea typeface="Courier New" charset="0"/>
+                <a:cs typeface="Courier New" charset="0"/>
+              </a:rPr>
+              <a:t>4 visits to a OMG meeting, each one week</a:t>
+            </a:r>
+          </a:p>
+          <a:p>
+            <a:pPr lvl="1">
+              <a:buFont typeface="Arial" pitchFamily="34" charset="0"/>
+              <a:buChar char="•"/>
+            </a:pPr>
+            <a:r>
+              <a:rPr lang="nl-NL" sz="2000" i="0" dirty="0" smtClean="0">
+                <a:latin typeface="+mn-lt"/>
+                <a:ea typeface="Courier New" charset="0"/>
+                <a:cs typeface="Courier New" charset="0"/>
+              </a:rPr>
+              <a:t>Around 1 to 2 weeks of preparation for each meeting</a:t>
+            </a:r>
+          </a:p>
+          <a:p>
+            <a:pPr lvl="1">
+              <a:buFont typeface="Arial" pitchFamily="34" charset="0"/>
+              <a:buChar char="•"/>
+            </a:pPr>
             <a:endParaRPr lang="nl-NL" sz="2000" i="0" dirty="0" smtClean="0">
+              <a:latin typeface="+mn-lt"/>
+              <a:ea typeface="Courier New" charset="0"/>
+              <a:cs typeface="Courier New" charset="0"/>
+            </a:endParaRPr>
+          </a:p>
+          <a:p>
+            <a:pPr lvl="1">
+              <a:buFont typeface="Arial" pitchFamily="34" charset="0"/>
+              <a:buChar char="•"/>
+            </a:pPr>
+            <a:endParaRPr lang="nl-NL" sz="2000" i="0" dirty="0" smtClean="0">
+              <a:latin typeface="+mn-lt"/>
+              <a:ea typeface="Courier New" charset="0"/>
+              <a:cs typeface="Courier New" charset="0"/>
+            </a:endParaRPr>
+          </a:p>
+          <a:p>
+            <a:pPr>
+              <a:buFont typeface="Arial" pitchFamily="34" charset="0"/>
+              <a:buChar char="•"/>
+            </a:pPr>
+            <a:endParaRPr lang="nl-NL" sz="2000" i="0" dirty="0">
+              <a:latin typeface="+mn-lt"/>
+              <a:ea typeface="Courier New" charset="0"/>
+              <a:cs typeface="Courier New" charset="0"/>
+            </a:endParaRPr>
+          </a:p>
+          <a:p>
+            <a:r>
+              <a:rPr lang="nl-NL" sz="2000" i="0" dirty="0">
+                <a:latin typeface="+mn-lt"/>
+                <a:ea typeface="Courier New" charset="0"/>
+                <a:cs typeface="Courier New" charset="0"/>
+              </a:rPr>
+              <a:t/>
+            </a:r>
+            <a:br>
+              <a:rPr lang="nl-NL" sz="2000" i="0" dirty="0">
+                <a:latin typeface="+mn-lt"/>
+                <a:ea typeface="Courier New" charset="0"/>
+                <a:cs typeface="Courier New" charset="0"/>
+              </a:rPr>
+            </a:br>
+            <a:endParaRPr lang="nl-NL" sz="2000" i="0" dirty="0">
               <a:latin typeface="+mn-lt"/>
               <a:ea typeface="Courier New" charset="0"/>
               <a:cs typeface="Courier New" charset="0"/>
@@ -24035,6 +24520,215 @@
             <a:endParaRPr lang="en-US" altLang="zh-CN" sz="2000" i="0" dirty="0" smtClean="0">
               <a:ea typeface="宋体" pitchFamily="-65" charset="-128"/>
               <a:cs typeface="Times New Roman" charset="0"/>
+            </a:endParaRPr>
+          </a:p>
+        </p:txBody>
+      </p:sp>
+    </p:spTree>
+  </p:cSld>
+  <p:clrMapOvr>
+    <a:masterClrMapping/>
+  </p:clrMapOvr>
+  <p:timing>
+    <p:tnLst>
+      <p:par>
+        <p:cTn id="1" dur="indefinite" restart="never" nodeType="tmRoot"/>
+      </p:par>
+    </p:tnLst>
+  </p:timing>
+</p:sld>
+</file>
+
+<file path=ppt/slides/slide50.xml><?xml version="1.0" encoding="utf-8"?>
+<p:sld xmlns:a="http://schemas.openxmlformats.org/drawingml/2006/main" xmlns:r="http://schemas.openxmlformats.org/officeDocument/2006/relationships" xmlns:p="http://schemas.openxmlformats.org/presentationml/2006/main">
+  <p:cSld>
+    <p:spTree>
+      <p:nvGrpSpPr>
+        <p:cNvPr id="1" name=""/>
+        <p:cNvGrpSpPr/>
+        <p:nvPr/>
+      </p:nvGrpSpPr>
+      <p:grpSpPr>
+        <a:xfrm>
+          <a:off x="0" y="0"/>
+          <a:ext cx="0" cy="0"/>
+          <a:chOff x="0" y="0"/>
+          <a:chExt cx="0" cy="0"/>
+        </a:xfrm>
+      </p:grpSpPr>
+      <p:sp>
+        <p:nvSpPr>
+          <p:cNvPr id="294914" name="Rectangle 2"/>
+          <p:cNvSpPr>
+            <a:spLocks noChangeArrowheads="1"/>
+          </p:cNvSpPr>
+          <p:nvPr/>
+        </p:nvSpPr>
+        <p:spPr bwMode="auto">
+          <a:xfrm>
+            <a:off x="0" y="542925"/>
+            <a:ext cx="9144000" cy="381000"/>
+          </a:xfrm>
+          <a:prstGeom prst="rect">
+            <a:avLst/>
+          </a:prstGeom>
+          <a:noFill/>
+          <a:ln w="9525">
+            <a:noFill/>
+            <a:miter lim="800000"/>
+            <a:headEnd/>
+            <a:tailEnd/>
+          </a:ln>
+        </p:spPr>
+        <p:txBody>
+          <a:bodyPr anchor="ctr">
+            <a:prstTxWarp prst="textNoShape">
+              <a:avLst/>
+            </a:prstTxWarp>
+          </a:bodyPr>
+          <a:lstStyle/>
+          <a:p>
+            <a:pPr algn="ctr">
+              <a:spcBef>
+                <a:spcPct val="0"/>
+              </a:spcBef>
+            </a:pPr>
+            <a:r>
+              <a:rPr lang="en-US" altLang="zh-CN" sz="3200" i="0" dirty="0" smtClean="0">
+                <a:solidFill>
+                  <a:srgbClr val="FF0000"/>
+                </a:solidFill>
+                <a:ea typeface="宋体" pitchFamily="-65" charset="-128"/>
+                <a:cs typeface="宋体" pitchFamily="-65" charset="-128"/>
+              </a:rPr>
+              <a:t>Modeling</a:t>
+            </a:r>
+            <a:endParaRPr lang="en-US" altLang="zh-CN" sz="3200" i="0" dirty="0">
+              <a:solidFill>
+                <a:srgbClr val="FF0000"/>
+              </a:solidFill>
+              <a:ea typeface="宋体" pitchFamily="-65" charset="-128"/>
+              <a:cs typeface="宋体" pitchFamily="-65" charset="-128"/>
+            </a:endParaRPr>
+          </a:p>
+        </p:txBody>
+      </p:sp>
+      <p:sp>
+        <p:nvSpPr>
+          <p:cNvPr id="294915" name="Rectangle 3"/>
+          <p:cNvSpPr>
+            <a:spLocks noChangeArrowheads="1"/>
+          </p:cNvSpPr>
+          <p:nvPr/>
+        </p:nvSpPr>
+        <p:spPr bwMode="auto">
+          <a:xfrm>
+            <a:off x="228600" y="1190625"/>
+            <a:ext cx="8763000" cy="4876800"/>
+          </a:xfrm>
+          <a:prstGeom prst="rect">
+            <a:avLst/>
+          </a:prstGeom>
+          <a:noFill/>
+          <a:ln w="9525">
+            <a:noFill/>
+            <a:miter lim="800000"/>
+            <a:headEnd/>
+            <a:tailEnd/>
+          </a:ln>
+        </p:spPr>
+        <p:txBody>
+          <a:bodyPr>
+            <a:prstTxWarp prst="textNoShape">
+              <a:avLst/>
+            </a:prstTxWarp>
+          </a:bodyPr>
+          <a:lstStyle/>
+          <a:p>
+            <a:pPr marL="169863" indent="-169863">
+              <a:spcBef>
+                <a:spcPct val="40000"/>
+              </a:spcBef>
+              <a:buFontTx/>
+              <a:buChar char="•"/>
+            </a:pPr>
+            <a:endParaRPr lang="en-US" altLang="zh-CN" sz="2000" i="0">
+              <a:ea typeface="宋体" pitchFamily="-65" charset="-128"/>
+              <a:cs typeface="Times New Roman" charset="0"/>
+            </a:endParaRPr>
+          </a:p>
+        </p:txBody>
+      </p:sp>
+      <p:sp>
+        <p:nvSpPr>
+          <p:cNvPr id="294916" name="Rectangle 4"/>
+          <p:cNvSpPr>
+            <a:spLocks noChangeArrowheads="1"/>
+          </p:cNvSpPr>
+          <p:nvPr/>
+        </p:nvSpPr>
+        <p:spPr bwMode="auto">
+          <a:xfrm>
+            <a:off x="381000" y="1343025"/>
+            <a:ext cx="8763000" cy="4876800"/>
+          </a:xfrm>
+          <a:prstGeom prst="rect">
+            <a:avLst/>
+          </a:prstGeom>
+          <a:noFill/>
+          <a:ln w="9525">
+            <a:noFill/>
+            <a:miter lim="800000"/>
+            <a:headEnd/>
+            <a:tailEnd/>
+          </a:ln>
+        </p:spPr>
+        <p:txBody>
+          <a:bodyPr>
+            <a:prstTxWarp prst="textNoShape">
+              <a:avLst/>
+            </a:prstTxWarp>
+          </a:bodyPr>
+          <a:lstStyle/>
+          <a:p>
+            <a:pPr>
+              <a:buFont typeface="Arial" pitchFamily="34" charset="0"/>
+              <a:buChar char="•"/>
+            </a:pPr>
+            <a:r>
+              <a:rPr lang="nl-NL" sz="2000" i="0" dirty="0" smtClean="0">
+                <a:latin typeface="+mn-lt"/>
+                <a:ea typeface="Courier New" charset="0"/>
+                <a:cs typeface="Courier New" charset="0"/>
+              </a:rPr>
+              <a:t>Working modeling environment must be avaible for making larger tests</a:t>
+            </a:r>
+          </a:p>
+          <a:p>
+            <a:pPr>
+              <a:buFont typeface="Arial" pitchFamily="34" charset="0"/>
+              <a:buChar char="•"/>
+            </a:pPr>
+            <a:r>
+              <a:rPr lang="en-US" sz="2000" i="0" dirty="0" smtClean="0">
+                <a:latin typeface="+mn-lt"/>
+                <a:ea typeface="Courier New" charset="0"/>
+                <a:cs typeface="Courier New" charset="0"/>
+              </a:rPr>
+              <a:t>Runtime and modeling efforts should </a:t>
+            </a:r>
+            <a:r>
+              <a:rPr lang="en-US" sz="2000" i="0" smtClean="0">
+                <a:latin typeface="+mn-lt"/>
+                <a:ea typeface="Courier New" charset="0"/>
+                <a:cs typeface="Courier New" charset="0"/>
+              </a:rPr>
+              <a:t>be synchronized</a:t>
+            </a:r>
+            <a:endParaRPr lang="nl-NL" sz="2000" i="0" dirty="0" smtClean="0">
+              <a:latin typeface="+mn-lt"/>
+              <a:ea typeface="Courier New" charset="0"/>
+              <a:cs typeface="Courier New" charset="0"/>
             </a:endParaRPr>
           </a:p>
         </p:txBody>

</xml_diff>

<commit_message>
reader is implemented partly
</commit_message>
<xml_diff>
--- a/branches/dds_ports/modules/CIAO/docs/Connectors.pptx
+++ b/branches/dds_ports/modules/CIAO/docs/Connectors.pptx
@@ -1,6 +1,6 @@
 
 <file path=ppt/presentation.xml><?xml version="1.0" encoding="utf-8"?>
-<p:presentation xmlns:a="http://schemas.openxmlformats.org/drawingml/2006/main" xmlns:r="http://schemas.openxmlformats.org/officeDocument/2006/relationships" xmlns:mc="http://schemas.openxmlformats.org/markup-compatibility/2006" xmlns:mv="urn:schemas-microsoft-com:mac:vml" xmlns:p="http://schemas.openxmlformats.org/presentationml/2006/main" mc:Ignorable="mv" mc:PreserveAttributes="mv:*" strictFirstAndLastChars="0" saveSubsetFonts="1" autoCompressPictures="0">
+<p:presentation xmlns:a="http://schemas.openxmlformats.org/drawingml/2006/main" xmlns:r="http://schemas.openxmlformats.org/officeDocument/2006/relationships" xmlns:p="http://schemas.openxmlformats.org/presentationml/2006/main" strictFirstAndLastChars="0" saveSubsetFonts="1" autoCompressPictures="0">
   <p:sldMasterIdLst>
     <p:sldMasterId id="2147483723" r:id="rId1"/>
     <p:sldMasterId id="2147483725" r:id="rId2"/>
@@ -195,7 +195,7 @@
 </file>
 
 <file path=ppt/handoutMasters/handoutMaster1.xml><?xml version="1.0" encoding="utf-8"?>
-<p:handoutMaster xmlns:a="http://schemas.openxmlformats.org/drawingml/2006/main" xmlns:r="http://schemas.openxmlformats.org/officeDocument/2006/relationships" xmlns:mc="http://schemas.openxmlformats.org/markup-compatibility/2006" xmlns:mv="urn:schemas-microsoft-com:mac:vml" xmlns:p="http://schemas.openxmlformats.org/presentationml/2006/main" mc:Ignorable="mv" mc:PreserveAttributes="mv:*">
+<p:handoutMaster xmlns:a="http://schemas.openxmlformats.org/drawingml/2006/main" xmlns:r="http://schemas.openxmlformats.org/officeDocument/2006/relationships" xmlns:p="http://schemas.openxmlformats.org/presentationml/2006/main">
   <p:cSld>
     <p:bg>
       <p:bgPr>
@@ -432,7 +432,7 @@
 </file>
 
 <file path=ppt/notesMasters/notesMaster1.xml><?xml version="1.0" encoding="utf-8"?>
-<p:notesMaster xmlns:a="http://schemas.openxmlformats.org/drawingml/2006/main" xmlns:r="http://schemas.openxmlformats.org/officeDocument/2006/relationships" xmlns:mc="http://schemas.openxmlformats.org/markup-compatibility/2006" xmlns:mv="urn:schemas-microsoft-com:mac:vml" xmlns:p="http://schemas.openxmlformats.org/presentationml/2006/main" mc:Ignorable="mv" mc:PreserveAttributes="mv:*">
+<p:notesMaster xmlns:a="http://schemas.openxmlformats.org/drawingml/2006/main" xmlns:r="http://schemas.openxmlformats.org/officeDocument/2006/relationships" xmlns:p="http://schemas.openxmlformats.org/presentationml/2006/main">
   <p:cSld>
     <p:bg>
       <p:bgPr>
@@ -891,7 +891,7 @@
 </file>
 
 <file path=ppt/slideLayouts/slideLayout1.xml><?xml version="1.0" encoding="utf-8"?>
-<p:sldLayout xmlns:a="http://schemas.openxmlformats.org/drawingml/2006/main" xmlns:r="http://schemas.openxmlformats.org/officeDocument/2006/relationships" xmlns:mc="http://schemas.openxmlformats.org/markup-compatibility/2006" xmlns:mv="urn:schemas-microsoft-com:mac:vml" xmlns:p="http://schemas.openxmlformats.org/presentationml/2006/main" mc:Ignorable="mv" mc:PreserveAttributes="mv:*" showMasterSp="0" type="title" preserve="1">
+<p:sldLayout xmlns:a="http://schemas.openxmlformats.org/drawingml/2006/main" xmlns:r="http://schemas.openxmlformats.org/officeDocument/2006/relationships" xmlns:p="http://schemas.openxmlformats.org/presentationml/2006/main" showMasterSp="0" type="title" preserve="1">
   <p:cSld name="Title Slide">
     <p:spTree>
       <p:nvGrpSpPr>
@@ -1024,7 +1024,7 @@
 </file>
 
 <file path=ppt/slideLayouts/slideLayout10.xml><?xml version="1.0" encoding="utf-8"?>
-<p:sldLayout xmlns:a="http://schemas.openxmlformats.org/drawingml/2006/main" xmlns:r="http://schemas.openxmlformats.org/officeDocument/2006/relationships" xmlns:mc="http://schemas.openxmlformats.org/markup-compatibility/2006" xmlns:mv="urn:schemas-microsoft-com:mac:vml" xmlns:p="http://schemas.openxmlformats.org/presentationml/2006/main" mc:Ignorable="mv" mc:PreserveAttributes="mv:*" type="vertTx" preserve="1">
+<p:sldLayout xmlns:a="http://schemas.openxmlformats.org/drawingml/2006/main" xmlns:r="http://schemas.openxmlformats.org/officeDocument/2006/relationships" xmlns:p="http://schemas.openxmlformats.org/presentationml/2006/main" type="vertTx" preserve="1">
   <p:cSld name="Title and Vertical Text">
     <p:spTree>
       <p:nvGrpSpPr>
@@ -1124,7 +1124,7 @@
 </file>
 
 <file path=ppt/slideLayouts/slideLayout11.xml><?xml version="1.0" encoding="utf-8"?>
-<p:sldLayout xmlns:a="http://schemas.openxmlformats.org/drawingml/2006/main" xmlns:r="http://schemas.openxmlformats.org/officeDocument/2006/relationships" xmlns:mc="http://schemas.openxmlformats.org/markup-compatibility/2006" xmlns:mv="urn:schemas-microsoft-com:mac:vml" xmlns:p="http://schemas.openxmlformats.org/presentationml/2006/main" mc:Ignorable="mv" mc:PreserveAttributes="mv:*" type="vertTitleAndTx" preserve="1">
+<p:sldLayout xmlns:a="http://schemas.openxmlformats.org/drawingml/2006/main" xmlns:r="http://schemas.openxmlformats.org/officeDocument/2006/relationships" xmlns:p="http://schemas.openxmlformats.org/presentationml/2006/main" type="vertTitleAndTx" preserve="1">
   <p:cSld name="Vertical Title and Text">
     <p:spTree>
       <p:nvGrpSpPr>
@@ -1234,7 +1234,7 @@
 </file>
 
 <file path=ppt/slideLayouts/slideLayout12.xml><?xml version="1.0" encoding="utf-8"?>
-<p:sldLayout xmlns:a="http://schemas.openxmlformats.org/drawingml/2006/main" xmlns:r="http://schemas.openxmlformats.org/officeDocument/2006/relationships" xmlns:mc="http://schemas.openxmlformats.org/markup-compatibility/2006" xmlns:mv="urn:schemas-microsoft-com:mac:vml" xmlns:p="http://schemas.openxmlformats.org/presentationml/2006/main" mc:Ignorable="mv" mc:PreserveAttributes="mv:*" type="txAndObj" preserve="1">
+<p:sldLayout xmlns:a="http://schemas.openxmlformats.org/drawingml/2006/main" xmlns:r="http://schemas.openxmlformats.org/officeDocument/2006/relationships" xmlns:p="http://schemas.openxmlformats.org/presentationml/2006/main" type="txAndObj" preserve="1">
   <p:cSld name="Title, Text, and Content">
     <p:spTree>
       <p:nvGrpSpPr>
@@ -1401,7 +1401,7 @@
 </file>
 
 <file path=ppt/slideLayouts/slideLayout13.xml><?xml version="1.0" encoding="utf-8"?>
-<p:sldLayout xmlns:a="http://schemas.openxmlformats.org/drawingml/2006/main" xmlns:r="http://schemas.openxmlformats.org/officeDocument/2006/relationships" xmlns:mc="http://schemas.openxmlformats.org/markup-compatibility/2006" xmlns:mv="urn:schemas-microsoft-com:mac:vml" xmlns:p="http://schemas.openxmlformats.org/presentationml/2006/main" mc:Ignorable="mv" mc:PreserveAttributes="mv:*" type="objAndTx" preserve="1">
+<p:sldLayout xmlns:a="http://schemas.openxmlformats.org/drawingml/2006/main" xmlns:r="http://schemas.openxmlformats.org/officeDocument/2006/relationships" xmlns:p="http://schemas.openxmlformats.org/presentationml/2006/main" type="objAndTx" preserve="1">
   <p:cSld name="Title, Content and Text">
     <p:spTree>
       <p:nvGrpSpPr>
@@ -1568,7 +1568,7 @@
 </file>
 
 <file path=ppt/slideLayouts/slideLayout14.xml><?xml version="1.0" encoding="utf-8"?>
-<p:sldLayout xmlns:a="http://schemas.openxmlformats.org/drawingml/2006/main" xmlns:r="http://schemas.openxmlformats.org/officeDocument/2006/relationships" xmlns:mc="http://schemas.openxmlformats.org/markup-compatibility/2006" xmlns:mv="urn:schemas-microsoft-com:mac:vml" xmlns:p="http://schemas.openxmlformats.org/presentationml/2006/main" mc:Ignorable="mv" mc:PreserveAttributes="mv:*" type="txAndTwoObj" preserve="1">
+<p:sldLayout xmlns:a="http://schemas.openxmlformats.org/drawingml/2006/main" xmlns:r="http://schemas.openxmlformats.org/officeDocument/2006/relationships" xmlns:p="http://schemas.openxmlformats.org/presentationml/2006/main" type="txAndTwoObj" preserve="1">
   <p:cSld name="Title, Text, and 2 Content">
     <p:spTree>
       <p:nvGrpSpPr>
@@ -1792,7 +1792,7 @@
 </file>
 
 <file path=ppt/slideLayouts/slideLayout15.xml><?xml version="1.0" encoding="utf-8"?>
-<p:sldLayout xmlns:a="http://schemas.openxmlformats.org/drawingml/2006/main" xmlns:r="http://schemas.openxmlformats.org/officeDocument/2006/relationships" xmlns:mc="http://schemas.openxmlformats.org/markup-compatibility/2006" xmlns:mv="urn:schemas-microsoft-com:mac:vml" xmlns:p="http://schemas.openxmlformats.org/presentationml/2006/main" mc:Ignorable="mv" mc:PreserveAttributes="mv:*" type="twoObjAndTx" preserve="1">
+<p:sldLayout xmlns:a="http://schemas.openxmlformats.org/drawingml/2006/main" xmlns:r="http://schemas.openxmlformats.org/officeDocument/2006/relationships" xmlns:p="http://schemas.openxmlformats.org/presentationml/2006/main" type="twoObjAndTx" preserve="1">
   <p:cSld name="Title, 2 Content and Text">
     <p:spTree>
       <p:nvGrpSpPr>
@@ -2016,7 +2016,7 @@
 </file>
 
 <file path=ppt/slideLayouts/slideLayout16.xml><?xml version="1.0" encoding="utf-8"?>
-<p:sldLayout xmlns:a="http://schemas.openxmlformats.org/drawingml/2006/main" xmlns:r="http://schemas.openxmlformats.org/officeDocument/2006/relationships" xmlns:mc="http://schemas.openxmlformats.org/markup-compatibility/2006" xmlns:mv="urn:schemas-microsoft-com:mac:vml" xmlns:p="http://schemas.openxmlformats.org/presentationml/2006/main" mc:Ignorable="mv" mc:PreserveAttributes="mv:*" type="txOverObj" preserve="1">
+<p:sldLayout xmlns:a="http://schemas.openxmlformats.org/drawingml/2006/main" xmlns:r="http://schemas.openxmlformats.org/officeDocument/2006/relationships" xmlns:p="http://schemas.openxmlformats.org/presentationml/2006/main" type="txOverObj" preserve="1">
   <p:cSld name="Title and Text over Content">
     <p:spTree>
       <p:nvGrpSpPr>
@@ -2183,7 +2183,7 @@
 </file>
 
 <file path=ppt/slideLayouts/slideLayout17.xml><?xml version="1.0" encoding="utf-8"?>
-<p:sldLayout xmlns:a="http://schemas.openxmlformats.org/drawingml/2006/main" xmlns:r="http://schemas.openxmlformats.org/officeDocument/2006/relationships" xmlns:mc="http://schemas.openxmlformats.org/markup-compatibility/2006" xmlns:mv="urn:schemas-microsoft-com:mac:vml" xmlns:p="http://schemas.openxmlformats.org/presentationml/2006/main" mc:Ignorable="mv" mc:PreserveAttributes="mv:*" type="objOnly" preserve="1">
+<p:sldLayout xmlns:a="http://schemas.openxmlformats.org/drawingml/2006/main" xmlns:r="http://schemas.openxmlformats.org/officeDocument/2006/relationships" xmlns:p="http://schemas.openxmlformats.org/presentationml/2006/main" type="objOnly" preserve="1">
   <p:cSld name="Content">
     <p:spTree>
       <p:nvGrpSpPr>
@@ -2265,7 +2265,7 @@
 </file>
 
 <file path=ppt/slideLayouts/slideLayout18.xml><?xml version="1.0" encoding="utf-8"?>
-<p:sldLayout xmlns:a="http://schemas.openxmlformats.org/drawingml/2006/main" xmlns:r="http://schemas.openxmlformats.org/officeDocument/2006/relationships" xmlns:mc="http://schemas.openxmlformats.org/markup-compatibility/2006" xmlns:mv="urn:schemas-microsoft-com:mac:vml" xmlns:p="http://schemas.openxmlformats.org/presentationml/2006/main" mc:Ignorable="mv" mc:PreserveAttributes="mv:*" type="objOverTx" preserve="1">
+<p:sldLayout xmlns:a="http://schemas.openxmlformats.org/drawingml/2006/main" xmlns:r="http://schemas.openxmlformats.org/officeDocument/2006/relationships" xmlns:p="http://schemas.openxmlformats.org/presentationml/2006/main" type="objOverTx" preserve="1">
   <p:cSld name="Title and Content over Text">
     <p:spTree>
       <p:nvGrpSpPr>
@@ -2432,7 +2432,7 @@
 </file>
 
 <file path=ppt/slideLayouts/slideLayout19.xml><?xml version="1.0" encoding="utf-8"?>
-<p:sldLayout xmlns:a="http://schemas.openxmlformats.org/drawingml/2006/main" xmlns:r="http://schemas.openxmlformats.org/officeDocument/2006/relationships" xmlns:mc="http://schemas.openxmlformats.org/markup-compatibility/2006" xmlns:mv="urn:schemas-microsoft-com:mac:vml" xmlns:p="http://schemas.openxmlformats.org/presentationml/2006/main" mc:Ignorable="mv" mc:PreserveAttributes="mv:*" type="objAndTwoObj" preserve="1">
+<p:sldLayout xmlns:a="http://schemas.openxmlformats.org/drawingml/2006/main" xmlns:r="http://schemas.openxmlformats.org/officeDocument/2006/relationships" xmlns:p="http://schemas.openxmlformats.org/presentationml/2006/main" type="objAndTwoObj" preserve="1">
   <p:cSld name="Title, Content, and 2 Content">
     <p:spTree>
       <p:nvGrpSpPr>
@@ -2656,7 +2656,7 @@
 </file>
 
 <file path=ppt/slideLayouts/slideLayout2.xml><?xml version="1.0" encoding="utf-8"?>
-<p:sldLayout xmlns:a="http://schemas.openxmlformats.org/drawingml/2006/main" xmlns:r="http://schemas.openxmlformats.org/officeDocument/2006/relationships" xmlns:mc="http://schemas.openxmlformats.org/markup-compatibility/2006" xmlns:mv="urn:schemas-microsoft-com:mac:vml" xmlns:p="http://schemas.openxmlformats.org/presentationml/2006/main" mc:Ignorable="mv" mc:PreserveAttributes="mv:*" type="obj" preserve="1">
+<p:sldLayout xmlns:a="http://schemas.openxmlformats.org/drawingml/2006/main" xmlns:r="http://schemas.openxmlformats.org/officeDocument/2006/relationships" xmlns:p="http://schemas.openxmlformats.org/presentationml/2006/main" type="obj" preserve="1">
   <p:cSld name="Title and Content">
     <p:spTree>
       <p:nvGrpSpPr>
@@ -2756,7 +2756,7 @@
 </file>
 
 <file path=ppt/slideLayouts/slideLayout20.xml><?xml version="1.0" encoding="utf-8"?>
-<p:sldLayout xmlns:a="http://schemas.openxmlformats.org/drawingml/2006/main" xmlns:r="http://schemas.openxmlformats.org/officeDocument/2006/relationships" xmlns:mc="http://schemas.openxmlformats.org/markup-compatibility/2006" xmlns:mv="urn:schemas-microsoft-com:mac:vml" xmlns:p="http://schemas.openxmlformats.org/presentationml/2006/main" mc:Ignorable="mv" mc:PreserveAttributes="mv:*" type="fourObj" preserve="1">
+<p:sldLayout xmlns:a="http://schemas.openxmlformats.org/drawingml/2006/main" xmlns:r="http://schemas.openxmlformats.org/officeDocument/2006/relationships" xmlns:p="http://schemas.openxmlformats.org/presentationml/2006/main" type="fourObj" preserve="1">
   <p:cSld name="Title and 4 Content">
     <p:spTree>
       <p:nvGrpSpPr>
@@ -3037,7 +3037,7 @@
 </file>
 
 <file path=ppt/slideLayouts/slideLayout21.xml><?xml version="1.0" encoding="utf-8"?>
-<p:sldLayout xmlns:a="http://schemas.openxmlformats.org/drawingml/2006/main" xmlns:r="http://schemas.openxmlformats.org/officeDocument/2006/relationships" xmlns:mc="http://schemas.openxmlformats.org/markup-compatibility/2006" xmlns:mv="urn:schemas-microsoft-com:mac:vml" xmlns:p="http://schemas.openxmlformats.org/presentationml/2006/main" mc:Ignorable="mv" mc:PreserveAttributes="mv:*" showMasterSp="0" type="title" preserve="1">
+<p:sldLayout xmlns:a="http://schemas.openxmlformats.org/drawingml/2006/main" xmlns:r="http://schemas.openxmlformats.org/officeDocument/2006/relationships" xmlns:p="http://schemas.openxmlformats.org/presentationml/2006/main" showMasterSp="0" type="title" preserve="1">
   <p:cSld name="Title Slide">
     <p:spTree>
       <p:nvGrpSpPr>
@@ -3485,7 +3485,7 @@
 </file>
 
 <file path=ppt/slideLayouts/slideLayout22.xml><?xml version="1.0" encoding="utf-8"?>
-<p:sldLayout xmlns:a="http://schemas.openxmlformats.org/drawingml/2006/main" xmlns:r="http://schemas.openxmlformats.org/officeDocument/2006/relationships" xmlns:mc="http://schemas.openxmlformats.org/markup-compatibility/2006" xmlns:mv="urn:schemas-microsoft-com:mac:vml" xmlns:p="http://schemas.openxmlformats.org/presentationml/2006/main" mc:Ignorable="mv" mc:PreserveAttributes="mv:*" type="obj" preserve="1">
+<p:sldLayout xmlns:a="http://schemas.openxmlformats.org/drawingml/2006/main" xmlns:r="http://schemas.openxmlformats.org/officeDocument/2006/relationships" xmlns:p="http://schemas.openxmlformats.org/presentationml/2006/main" type="obj" preserve="1">
   <p:cSld name="Title and Content">
     <p:spTree>
       <p:nvGrpSpPr>
@@ -3615,7 +3615,7 @@
 </file>
 
 <file path=ppt/slideLayouts/slideLayout23.xml><?xml version="1.0" encoding="utf-8"?>
-<p:sldLayout xmlns:a="http://schemas.openxmlformats.org/drawingml/2006/main" xmlns:r="http://schemas.openxmlformats.org/officeDocument/2006/relationships" xmlns:mc="http://schemas.openxmlformats.org/markup-compatibility/2006" xmlns:mv="urn:schemas-microsoft-com:mac:vml" xmlns:p="http://schemas.openxmlformats.org/presentationml/2006/main" mc:Ignorable="mv" mc:PreserveAttributes="mv:*" type="secHead" preserve="1">
+<p:sldLayout xmlns:a="http://schemas.openxmlformats.org/drawingml/2006/main" xmlns:r="http://schemas.openxmlformats.org/officeDocument/2006/relationships" xmlns:p="http://schemas.openxmlformats.org/presentationml/2006/main" type="secHead" preserve="1">
   <p:cSld name="Section Header">
     <p:spTree>
       <p:nvGrpSpPr>
@@ -3767,7 +3767,7 @@
 </file>
 
 <file path=ppt/slideLayouts/slideLayout24.xml><?xml version="1.0" encoding="utf-8"?>
-<p:sldLayout xmlns:a="http://schemas.openxmlformats.org/drawingml/2006/main" xmlns:r="http://schemas.openxmlformats.org/officeDocument/2006/relationships" xmlns:mc="http://schemas.openxmlformats.org/markup-compatibility/2006" xmlns:mv="urn:schemas-microsoft-com:mac:vml" xmlns:p="http://schemas.openxmlformats.org/presentationml/2006/main" mc:Ignorable="mv" mc:PreserveAttributes="mv:*" type="twoObj" preserve="1">
+<p:sldLayout xmlns:a="http://schemas.openxmlformats.org/drawingml/2006/main" xmlns:r="http://schemas.openxmlformats.org/officeDocument/2006/relationships" xmlns:p="http://schemas.openxmlformats.org/presentationml/2006/main" type="twoObj" preserve="1">
   <p:cSld name="Two Content">
     <p:spTree>
       <p:nvGrpSpPr>
@@ -4015,7 +4015,7 @@
 </file>
 
 <file path=ppt/slideLayouts/slideLayout25.xml><?xml version="1.0" encoding="utf-8"?>
-<p:sldLayout xmlns:a="http://schemas.openxmlformats.org/drawingml/2006/main" xmlns:r="http://schemas.openxmlformats.org/officeDocument/2006/relationships" xmlns:mc="http://schemas.openxmlformats.org/markup-compatibility/2006" xmlns:mv="urn:schemas-microsoft-com:mac:vml" xmlns:p="http://schemas.openxmlformats.org/presentationml/2006/main" mc:Ignorable="mv" mc:PreserveAttributes="mv:*" type="twoTxTwoObj" preserve="1">
+<p:sldLayout xmlns:a="http://schemas.openxmlformats.org/drawingml/2006/main" xmlns:r="http://schemas.openxmlformats.org/officeDocument/2006/relationships" xmlns:p="http://schemas.openxmlformats.org/presentationml/2006/main" type="twoTxTwoObj" preserve="1">
   <p:cSld name="Comparison">
     <p:spTree>
       <p:nvGrpSpPr>
@@ -4402,7 +4402,7 @@
 </file>
 
 <file path=ppt/slideLayouts/slideLayout26.xml><?xml version="1.0" encoding="utf-8"?>
-<p:sldLayout xmlns:a="http://schemas.openxmlformats.org/drawingml/2006/main" xmlns:r="http://schemas.openxmlformats.org/officeDocument/2006/relationships" xmlns:mc="http://schemas.openxmlformats.org/markup-compatibility/2006" xmlns:mv="urn:schemas-microsoft-com:mac:vml" xmlns:p="http://schemas.openxmlformats.org/presentationml/2006/main" mc:Ignorable="mv" mc:PreserveAttributes="mv:*" type="titleOnly" preserve="1">
+<p:sldLayout xmlns:a="http://schemas.openxmlformats.org/drawingml/2006/main" xmlns:r="http://schemas.openxmlformats.org/officeDocument/2006/relationships" xmlns:p="http://schemas.openxmlformats.org/presentationml/2006/main" type="titleOnly" preserve="1">
   <p:cSld name="Title Only">
     <p:spTree>
       <p:nvGrpSpPr>
@@ -4480,7 +4480,7 @@
 </file>
 
 <file path=ppt/slideLayouts/slideLayout27.xml><?xml version="1.0" encoding="utf-8"?>
-<p:sldLayout xmlns:a="http://schemas.openxmlformats.org/drawingml/2006/main" xmlns:r="http://schemas.openxmlformats.org/officeDocument/2006/relationships" xmlns:mc="http://schemas.openxmlformats.org/markup-compatibility/2006" xmlns:mv="urn:schemas-microsoft-com:mac:vml" xmlns:p="http://schemas.openxmlformats.org/presentationml/2006/main" mc:Ignorable="mv" mc:PreserveAttributes="mv:*" type="blank" preserve="1">
+<p:sldLayout xmlns:a="http://schemas.openxmlformats.org/drawingml/2006/main" xmlns:r="http://schemas.openxmlformats.org/officeDocument/2006/relationships" xmlns:p="http://schemas.openxmlformats.org/presentationml/2006/main" type="blank" preserve="1">
   <p:cSld name="Blank">
     <p:spTree>
       <p:nvGrpSpPr>
@@ -4535,7 +4535,7 @@
 </file>
 
 <file path=ppt/slideLayouts/slideLayout28.xml><?xml version="1.0" encoding="utf-8"?>
-<p:sldLayout xmlns:a="http://schemas.openxmlformats.org/drawingml/2006/main" xmlns:r="http://schemas.openxmlformats.org/officeDocument/2006/relationships" xmlns:mc="http://schemas.openxmlformats.org/markup-compatibility/2006" xmlns:mv="urn:schemas-microsoft-com:mac:vml" xmlns:p="http://schemas.openxmlformats.org/presentationml/2006/main" mc:Ignorable="mv" mc:PreserveAttributes="mv:*" type="objTx" preserve="1">
+<p:sldLayout xmlns:a="http://schemas.openxmlformats.org/drawingml/2006/main" xmlns:r="http://schemas.openxmlformats.org/officeDocument/2006/relationships" xmlns:p="http://schemas.openxmlformats.org/presentationml/2006/main" type="objTx" preserve="1">
   <p:cSld name="Content with Caption">
     <p:spTree>
       <p:nvGrpSpPr>
@@ -4772,7 +4772,7 @@
 </file>
 
 <file path=ppt/slideLayouts/slideLayout29.xml><?xml version="1.0" encoding="utf-8"?>
-<p:sldLayout xmlns:a="http://schemas.openxmlformats.org/drawingml/2006/main" xmlns:r="http://schemas.openxmlformats.org/officeDocument/2006/relationships" xmlns:mc="http://schemas.openxmlformats.org/markup-compatibility/2006" xmlns:mv="urn:schemas-microsoft-com:mac:vml" xmlns:p="http://schemas.openxmlformats.org/presentationml/2006/main" mc:Ignorable="mv" mc:PreserveAttributes="mv:*" type="picTx" preserve="1">
+<p:sldLayout xmlns:a="http://schemas.openxmlformats.org/drawingml/2006/main" xmlns:r="http://schemas.openxmlformats.org/officeDocument/2006/relationships" xmlns:p="http://schemas.openxmlformats.org/presentationml/2006/main" type="picTx" preserve="1">
   <p:cSld name="Picture with Caption">
     <p:spTree>
       <p:nvGrpSpPr>
@@ -4986,7 +4986,7 @@
 </file>
 
 <file path=ppt/slideLayouts/slideLayout3.xml><?xml version="1.0" encoding="utf-8"?>
-<p:sldLayout xmlns:a="http://schemas.openxmlformats.org/drawingml/2006/main" xmlns:r="http://schemas.openxmlformats.org/officeDocument/2006/relationships" xmlns:mc="http://schemas.openxmlformats.org/markup-compatibility/2006" xmlns:mv="urn:schemas-microsoft-com:mac:vml" xmlns:p="http://schemas.openxmlformats.org/presentationml/2006/main" mc:Ignorable="mv" mc:PreserveAttributes="mv:*" type="secHead" preserve="1">
+<p:sldLayout xmlns:a="http://schemas.openxmlformats.org/drawingml/2006/main" xmlns:r="http://schemas.openxmlformats.org/officeDocument/2006/relationships" xmlns:p="http://schemas.openxmlformats.org/presentationml/2006/main" type="secHead" preserve="1">
   <p:cSld name="Section Header">
     <p:spTree>
       <p:nvGrpSpPr>
@@ -5108,7 +5108,7 @@
 </file>
 
 <file path=ppt/slideLayouts/slideLayout30.xml><?xml version="1.0" encoding="utf-8"?>
-<p:sldLayout xmlns:a="http://schemas.openxmlformats.org/drawingml/2006/main" xmlns:r="http://schemas.openxmlformats.org/officeDocument/2006/relationships" xmlns:mc="http://schemas.openxmlformats.org/markup-compatibility/2006" xmlns:mv="urn:schemas-microsoft-com:mac:vml" xmlns:p="http://schemas.openxmlformats.org/presentationml/2006/main" mc:Ignorable="mv" mc:PreserveAttributes="mv:*" type="vertTx" preserve="1">
+<p:sldLayout xmlns:a="http://schemas.openxmlformats.org/drawingml/2006/main" xmlns:r="http://schemas.openxmlformats.org/officeDocument/2006/relationships" xmlns:p="http://schemas.openxmlformats.org/presentationml/2006/main" type="vertTx" preserve="1">
   <p:cSld name="Title and Vertical Text">
     <p:spTree>
       <p:nvGrpSpPr>
@@ -5238,7 +5238,7 @@
 </file>
 
 <file path=ppt/slideLayouts/slideLayout31.xml><?xml version="1.0" encoding="utf-8"?>
-<p:sldLayout xmlns:a="http://schemas.openxmlformats.org/drawingml/2006/main" xmlns:r="http://schemas.openxmlformats.org/officeDocument/2006/relationships" xmlns:mc="http://schemas.openxmlformats.org/markup-compatibility/2006" xmlns:mv="urn:schemas-microsoft-com:mac:vml" xmlns:p="http://schemas.openxmlformats.org/presentationml/2006/main" mc:Ignorable="mv" mc:PreserveAttributes="mv:*" type="vertTitleAndTx" preserve="1">
+<p:sldLayout xmlns:a="http://schemas.openxmlformats.org/drawingml/2006/main" xmlns:r="http://schemas.openxmlformats.org/officeDocument/2006/relationships" xmlns:p="http://schemas.openxmlformats.org/presentationml/2006/main" type="vertTitleAndTx" preserve="1">
   <p:cSld name="Vertical Title and Text">
     <p:spTree>
       <p:nvGrpSpPr>
@@ -5378,7 +5378,7 @@
 </file>
 
 <file path=ppt/slideLayouts/slideLayout32.xml><?xml version="1.0" encoding="utf-8"?>
-<p:sldLayout xmlns:a="http://schemas.openxmlformats.org/drawingml/2006/main" xmlns:r="http://schemas.openxmlformats.org/officeDocument/2006/relationships" xmlns:mc="http://schemas.openxmlformats.org/markup-compatibility/2006" xmlns:mv="urn:schemas-microsoft-com:mac:vml" xmlns:p="http://schemas.openxmlformats.org/presentationml/2006/main" mc:Ignorable="mv" mc:PreserveAttributes="mv:*" type="objOnly">
+<p:sldLayout xmlns:a="http://schemas.openxmlformats.org/drawingml/2006/main" xmlns:r="http://schemas.openxmlformats.org/officeDocument/2006/relationships" xmlns:p="http://schemas.openxmlformats.org/presentationml/2006/main" type="objOnly">
   <p:cSld name="Content">
     <p:spTree>
       <p:nvGrpSpPr>
@@ -5460,7 +5460,7 @@
 </file>
 
 <file path=ppt/slideLayouts/slideLayout4.xml><?xml version="1.0" encoding="utf-8"?>
-<p:sldLayout xmlns:a="http://schemas.openxmlformats.org/drawingml/2006/main" xmlns:r="http://schemas.openxmlformats.org/officeDocument/2006/relationships" xmlns:mc="http://schemas.openxmlformats.org/markup-compatibility/2006" xmlns:mv="urn:schemas-microsoft-com:mac:vml" xmlns:p="http://schemas.openxmlformats.org/presentationml/2006/main" mc:Ignorable="mv" mc:PreserveAttributes="mv:*" type="twoObj" preserve="1">
+<p:sldLayout xmlns:a="http://schemas.openxmlformats.org/drawingml/2006/main" xmlns:r="http://schemas.openxmlformats.org/officeDocument/2006/relationships" xmlns:p="http://schemas.openxmlformats.org/presentationml/2006/main" type="twoObj" preserve="1">
   <p:cSld name="Two Content">
     <p:spTree>
       <p:nvGrpSpPr>
@@ -5678,7 +5678,7 @@
 </file>
 
 <file path=ppt/slideLayouts/slideLayout5.xml><?xml version="1.0" encoding="utf-8"?>
-<p:sldLayout xmlns:a="http://schemas.openxmlformats.org/drawingml/2006/main" xmlns:r="http://schemas.openxmlformats.org/officeDocument/2006/relationships" xmlns:mc="http://schemas.openxmlformats.org/markup-compatibility/2006" xmlns:mv="urn:schemas-microsoft-com:mac:vml" xmlns:p="http://schemas.openxmlformats.org/presentationml/2006/main" mc:Ignorable="mv" mc:PreserveAttributes="mv:*" type="twoTxTwoObj" preserve="1">
+<p:sldLayout xmlns:a="http://schemas.openxmlformats.org/drawingml/2006/main" xmlns:r="http://schemas.openxmlformats.org/officeDocument/2006/relationships" xmlns:p="http://schemas.openxmlformats.org/presentationml/2006/main" type="twoTxTwoObj" preserve="1">
   <p:cSld name="Comparison">
     <p:spTree>
       <p:nvGrpSpPr>
@@ -6035,7 +6035,7 @@
 </file>
 
 <file path=ppt/slideLayouts/slideLayout6.xml><?xml version="1.0" encoding="utf-8"?>
-<p:sldLayout xmlns:a="http://schemas.openxmlformats.org/drawingml/2006/main" xmlns:r="http://schemas.openxmlformats.org/officeDocument/2006/relationships" xmlns:mc="http://schemas.openxmlformats.org/markup-compatibility/2006" xmlns:mv="urn:schemas-microsoft-com:mac:vml" xmlns:p="http://schemas.openxmlformats.org/presentationml/2006/main" mc:Ignorable="mv" mc:PreserveAttributes="mv:*" type="titleOnly" preserve="1">
+<p:sldLayout xmlns:a="http://schemas.openxmlformats.org/drawingml/2006/main" xmlns:r="http://schemas.openxmlformats.org/officeDocument/2006/relationships" xmlns:p="http://schemas.openxmlformats.org/presentationml/2006/main" type="titleOnly" preserve="1">
   <p:cSld name="Title Only">
     <p:spTree>
       <p:nvGrpSpPr>
@@ -6083,7 +6083,7 @@
 </file>
 
 <file path=ppt/slideLayouts/slideLayout7.xml><?xml version="1.0" encoding="utf-8"?>
-<p:sldLayout xmlns:a="http://schemas.openxmlformats.org/drawingml/2006/main" xmlns:r="http://schemas.openxmlformats.org/officeDocument/2006/relationships" xmlns:mc="http://schemas.openxmlformats.org/markup-compatibility/2006" xmlns:mv="urn:schemas-microsoft-com:mac:vml" xmlns:p="http://schemas.openxmlformats.org/presentationml/2006/main" mc:Ignorable="mv" mc:PreserveAttributes="mv:*" type="blank" preserve="1">
+<p:sldLayout xmlns:a="http://schemas.openxmlformats.org/drawingml/2006/main" xmlns:r="http://schemas.openxmlformats.org/officeDocument/2006/relationships" xmlns:p="http://schemas.openxmlformats.org/presentationml/2006/main" type="blank" preserve="1">
   <p:cSld name="Blank">
     <p:spTree>
       <p:nvGrpSpPr>
@@ -6108,7 +6108,7 @@
 </file>
 
 <file path=ppt/slideLayouts/slideLayout8.xml><?xml version="1.0" encoding="utf-8"?>
-<p:sldLayout xmlns:a="http://schemas.openxmlformats.org/drawingml/2006/main" xmlns:r="http://schemas.openxmlformats.org/officeDocument/2006/relationships" xmlns:mc="http://schemas.openxmlformats.org/markup-compatibility/2006" xmlns:mv="urn:schemas-microsoft-com:mac:vml" xmlns:p="http://schemas.openxmlformats.org/presentationml/2006/main" mc:Ignorable="mv" mc:PreserveAttributes="mv:*" type="objTx" preserve="1">
+<p:sldLayout xmlns:a="http://schemas.openxmlformats.org/drawingml/2006/main" xmlns:r="http://schemas.openxmlformats.org/officeDocument/2006/relationships" xmlns:p="http://schemas.openxmlformats.org/presentationml/2006/main" type="objTx" preserve="1">
   <p:cSld name="Content with Caption">
     <p:spTree>
       <p:nvGrpSpPr>
@@ -6315,7 +6315,7 @@
 </file>
 
 <file path=ppt/slideLayouts/slideLayout9.xml><?xml version="1.0" encoding="utf-8"?>
-<p:sldLayout xmlns:a="http://schemas.openxmlformats.org/drawingml/2006/main" xmlns:r="http://schemas.openxmlformats.org/officeDocument/2006/relationships" xmlns:mc="http://schemas.openxmlformats.org/markup-compatibility/2006" xmlns:mv="urn:schemas-microsoft-com:mac:vml" xmlns:p="http://schemas.openxmlformats.org/presentationml/2006/main" mc:Ignorable="mv" mc:PreserveAttributes="mv:*" type="picTx" preserve="1">
+<p:sldLayout xmlns:a="http://schemas.openxmlformats.org/drawingml/2006/main" xmlns:r="http://schemas.openxmlformats.org/officeDocument/2006/relationships" xmlns:p="http://schemas.openxmlformats.org/presentationml/2006/main" type="picTx" preserve="1">
   <p:cSld name="Picture with Caption">
     <p:spTree>
       <p:nvGrpSpPr>
@@ -6499,7 +6499,7 @@
 </file>
 
 <file path=ppt/slideMasters/slideMaster1.xml><?xml version="1.0" encoding="utf-8"?>
-<p:sldMaster xmlns:a="http://schemas.openxmlformats.org/drawingml/2006/main" xmlns:r="http://schemas.openxmlformats.org/officeDocument/2006/relationships" xmlns:mc="http://schemas.openxmlformats.org/markup-compatibility/2006" xmlns:mv="urn:schemas-microsoft-com:mac:vml" xmlns:p="http://schemas.openxmlformats.org/presentationml/2006/main" mc:Ignorable="mv" mc:PreserveAttributes="mv:*">
+<p:sldMaster xmlns:a="http://schemas.openxmlformats.org/drawingml/2006/main" xmlns:r="http://schemas.openxmlformats.org/officeDocument/2006/relationships" xmlns:p="http://schemas.openxmlformats.org/presentationml/2006/main">
   <p:cSld>
     <p:bg>
       <p:bgPr>
@@ -7296,7 +7296,7 @@
 </file>
 
 <file path=ppt/slideMasters/slideMaster2.xml><?xml version="1.0" encoding="utf-8"?>
-<p:sldMaster xmlns:a="http://schemas.openxmlformats.org/drawingml/2006/main" xmlns:r="http://schemas.openxmlformats.org/officeDocument/2006/relationships" xmlns:mc="http://schemas.openxmlformats.org/markup-compatibility/2006" xmlns:mv="urn:schemas-microsoft-com:mac:vml" xmlns:p="http://schemas.openxmlformats.org/presentationml/2006/main" mc:Ignorable="mv" mc:PreserveAttributes="mv:*">
+<p:sldMaster xmlns:a="http://schemas.openxmlformats.org/drawingml/2006/main" xmlns:r="http://schemas.openxmlformats.org/officeDocument/2006/relationships" xmlns:p="http://schemas.openxmlformats.org/presentationml/2006/main">
   <p:cSld>
     <p:bg>
       <p:bgPr>
@@ -8299,7 +8299,7 @@
 </file>
 
 <file path=ppt/slides/slide1.xml><?xml version="1.0" encoding="utf-8"?>
-<p:sld xmlns:a="http://schemas.openxmlformats.org/drawingml/2006/main" xmlns:r="http://schemas.openxmlformats.org/officeDocument/2006/relationships" xmlns:mc="http://schemas.openxmlformats.org/markup-compatibility/2006" xmlns:mv="urn:schemas-microsoft-com:mac:vml" xmlns:p="http://schemas.openxmlformats.org/presentationml/2006/main" mc:Ignorable="mv" mc:PreserveAttributes="mv:*">
+<p:sld xmlns:a="http://schemas.openxmlformats.org/drawingml/2006/main" xmlns:r="http://schemas.openxmlformats.org/officeDocument/2006/relationships" xmlns:p="http://schemas.openxmlformats.org/presentationml/2006/main">
   <p:cSld>
     <p:spTree>
       <p:nvGrpSpPr>
@@ -8420,7 +8420,7 @@
 </file>
 
 <file path=ppt/slides/slide10.xml><?xml version="1.0" encoding="utf-8"?>
-<p:sld xmlns:a="http://schemas.openxmlformats.org/drawingml/2006/main" xmlns:r="http://schemas.openxmlformats.org/officeDocument/2006/relationships" xmlns:mc="http://schemas.openxmlformats.org/markup-compatibility/2006" xmlns:mv="urn:schemas-microsoft-com:mac:vml" xmlns:p="http://schemas.openxmlformats.org/presentationml/2006/main" mc:Ignorable="mv" mc:PreserveAttributes="mv:*">
+<p:sld xmlns:a="http://schemas.openxmlformats.org/drawingml/2006/main" xmlns:r="http://schemas.openxmlformats.org/officeDocument/2006/relationships" xmlns:p="http://schemas.openxmlformats.org/presentationml/2006/main">
   <p:cSld>
     <p:spTree>
       <p:nvGrpSpPr>
@@ -10132,7 +10132,7 @@
 </file>
 
 <file path=ppt/slides/slide11.xml><?xml version="1.0" encoding="utf-8"?>
-<p:sld xmlns:a="http://schemas.openxmlformats.org/drawingml/2006/main" xmlns:r="http://schemas.openxmlformats.org/officeDocument/2006/relationships" xmlns:mc="http://schemas.openxmlformats.org/markup-compatibility/2006" xmlns:mv="urn:schemas-microsoft-com:mac:vml" xmlns:p="http://schemas.openxmlformats.org/presentationml/2006/main" mc:Ignorable="mv" mc:PreserveAttributes="mv:*">
+<p:sld xmlns:a="http://schemas.openxmlformats.org/drawingml/2006/main" xmlns:r="http://schemas.openxmlformats.org/officeDocument/2006/relationships" xmlns:p="http://schemas.openxmlformats.org/presentationml/2006/main">
   <p:cSld>
     <p:spTree>
       <p:nvGrpSpPr>
@@ -10929,7 +10929,7 @@
 </file>
 
 <file path=ppt/slides/slide12.xml><?xml version="1.0" encoding="utf-8"?>
-<p:sld xmlns:a="http://schemas.openxmlformats.org/drawingml/2006/main" xmlns:r="http://schemas.openxmlformats.org/officeDocument/2006/relationships" xmlns:mc="http://schemas.openxmlformats.org/markup-compatibility/2006" xmlns:mv="urn:schemas-microsoft-com:mac:vml" xmlns:p="http://schemas.openxmlformats.org/presentationml/2006/main" mc:Ignorable="mv" mc:PreserveAttributes="mv:*">
+<p:sld xmlns:a="http://schemas.openxmlformats.org/drawingml/2006/main" xmlns:r="http://schemas.openxmlformats.org/officeDocument/2006/relationships" xmlns:p="http://schemas.openxmlformats.org/presentationml/2006/main">
   <p:cSld>
     <p:spTree>
       <p:nvGrpSpPr>
@@ -12800,7 +12800,7 @@
 </file>
 
 <file path=ppt/slides/slide13.xml><?xml version="1.0" encoding="utf-8"?>
-<p:sld xmlns:a="http://schemas.openxmlformats.org/drawingml/2006/main" xmlns:r="http://schemas.openxmlformats.org/officeDocument/2006/relationships" xmlns:mc="http://schemas.openxmlformats.org/markup-compatibility/2006" xmlns:mv="urn:schemas-microsoft-com:mac:vml" xmlns:p="http://schemas.openxmlformats.org/presentationml/2006/main" mc:Ignorable="mv" mc:PreserveAttributes="mv:*">
+<p:sld xmlns:a="http://schemas.openxmlformats.org/drawingml/2006/main" xmlns:r="http://schemas.openxmlformats.org/officeDocument/2006/relationships" xmlns:p="http://schemas.openxmlformats.org/presentationml/2006/main">
   <p:cSld>
     <p:spTree>
       <p:nvGrpSpPr>
@@ -12852,11 +12852,7 @@
           <a:p>
             <a:r>
               <a:rPr lang="en-US" dirty="0" smtClean="0"/>
-              <a:t>We may want to include examples of </a:t>
-            </a:r>
-            <a:r>
-              <a:rPr lang="en-US" dirty="0" smtClean="0"/>
-              <a:t>parameterized modules, etc if the details are finalized before the meeting</a:t>
+              <a:t>We may want to include examples of parameterized modules, etc if the details are finalized before the meeting</a:t>
             </a:r>
             <a:endParaRPr lang="en-US" dirty="0"/>
           </a:p>
@@ -12897,7 +12893,7 @@
 </file>
 
 <file path=ppt/slides/slide14.xml><?xml version="1.0" encoding="utf-8"?>
-<p:sld xmlns:a="http://schemas.openxmlformats.org/drawingml/2006/main" xmlns:r="http://schemas.openxmlformats.org/officeDocument/2006/relationships" xmlns:mc="http://schemas.openxmlformats.org/markup-compatibility/2006" xmlns:mv="urn:schemas-microsoft-com:mac:vml" xmlns:p="http://schemas.openxmlformats.org/presentationml/2006/main" mc:Ignorable="mv" mc:PreserveAttributes="mv:*">
+<p:sld xmlns:a="http://schemas.openxmlformats.org/drawingml/2006/main" xmlns:r="http://schemas.openxmlformats.org/officeDocument/2006/relationships" xmlns:p="http://schemas.openxmlformats.org/presentationml/2006/main">
   <p:cSld>
     <p:spTree>
       <p:nvGrpSpPr>
@@ -13013,7 +13009,7 @@
 </file>
 
 <file path=ppt/slides/slide15.xml><?xml version="1.0" encoding="utf-8"?>
-<p:sld xmlns:a="http://schemas.openxmlformats.org/drawingml/2006/main" xmlns:r="http://schemas.openxmlformats.org/officeDocument/2006/relationships" xmlns:mc="http://schemas.openxmlformats.org/markup-compatibility/2006" xmlns:mv="urn:schemas-microsoft-com:mac:vml" xmlns:p="http://schemas.openxmlformats.org/presentationml/2006/main" mc:Ignorable="mv" mc:PreserveAttributes="mv:*">
+<p:sld xmlns:a="http://schemas.openxmlformats.org/drawingml/2006/main" xmlns:r="http://schemas.openxmlformats.org/officeDocument/2006/relationships" xmlns:p="http://schemas.openxmlformats.org/presentationml/2006/main">
   <p:cSld>
     <p:spTree>
       <p:nvGrpSpPr>
@@ -13037,8 +13033,8 @@
           </p:cNvPicPr>
           <p:nvPr/>
         </p:nvPicPr>
-        <mc:AlternateContent>
-          <mc:Choice xmlns:ma="http://schemas.microsoft.com/office/mac/drawingml/2008/main" Requires="ma">
+        <mc:AlternateContent xmlns:mc="http://schemas.openxmlformats.org/markup-compatibility/2006">
+          <mc:Choice xmlns:ma="http://schemas.microsoft.com/office/mac/drawingml/2008/main" xmlns:mv="urn:schemas-microsoft-com:mac:vml" xmlns="" Requires="ma">
             <p:blipFill>
               <a:blip r:embed="rId2"/>
               <a:stretch>
@@ -13226,7 +13222,7 @@
 </file>
 
 <file path=ppt/slides/slide16.xml><?xml version="1.0" encoding="utf-8"?>
-<p:sld xmlns:a="http://schemas.openxmlformats.org/drawingml/2006/main" xmlns:r="http://schemas.openxmlformats.org/officeDocument/2006/relationships" xmlns:mc="http://schemas.openxmlformats.org/markup-compatibility/2006" xmlns:mv="urn:schemas-microsoft-com:mac:vml" xmlns:p="http://schemas.openxmlformats.org/presentationml/2006/main" mc:Ignorable="mv" mc:PreserveAttributes="mv:*">
+<p:sld xmlns:a="http://schemas.openxmlformats.org/drawingml/2006/main" xmlns:r="http://schemas.openxmlformats.org/officeDocument/2006/relationships" xmlns:p="http://schemas.openxmlformats.org/presentationml/2006/main">
   <p:cSld>
     <p:spTree>
       <p:nvGrpSpPr>
@@ -13360,8 +13356,8 @@
           </p:cNvPicPr>
           <p:nvPr/>
         </p:nvPicPr>
-        <mc:AlternateContent>
-          <mc:Choice xmlns:ma="http://schemas.microsoft.com/office/mac/drawingml/2008/main" Requires="ma">
+        <mc:AlternateContent xmlns:mc="http://schemas.openxmlformats.org/markup-compatibility/2006">
+          <mc:Choice xmlns:ma="http://schemas.microsoft.com/office/mac/drawingml/2008/main" xmlns:mv="urn:schemas-microsoft-com:mac:vml" xmlns="" Requires="ma">
             <p:blipFill>
               <a:blip r:embed="rId2"/>
               <a:stretch>
@@ -13404,7 +13400,7 @@
 </file>
 
 <file path=ppt/slides/slide17.xml><?xml version="1.0" encoding="utf-8"?>
-<p:sld xmlns:a="http://schemas.openxmlformats.org/drawingml/2006/main" xmlns:r="http://schemas.openxmlformats.org/officeDocument/2006/relationships" xmlns:mc="http://schemas.openxmlformats.org/markup-compatibility/2006" xmlns:mv="urn:schemas-microsoft-com:mac:vml" xmlns:p="http://schemas.openxmlformats.org/presentationml/2006/main" mc:Ignorable="mv" mc:PreserveAttributes="mv:*">
+<p:sld xmlns:a="http://schemas.openxmlformats.org/drawingml/2006/main" xmlns:r="http://schemas.openxmlformats.org/officeDocument/2006/relationships" xmlns:p="http://schemas.openxmlformats.org/presentationml/2006/main">
   <p:cSld>
     <p:spTree>
       <p:nvGrpSpPr>
@@ -14175,7 +14171,7 @@
 </file>
 
 <file path=ppt/slides/slide18.xml><?xml version="1.0" encoding="utf-8"?>
-<p:sld xmlns:a="http://schemas.openxmlformats.org/drawingml/2006/main" xmlns:r="http://schemas.openxmlformats.org/officeDocument/2006/relationships" xmlns:mc="http://schemas.openxmlformats.org/markup-compatibility/2006" xmlns:mv="urn:schemas-microsoft-com:mac:vml" xmlns:p="http://schemas.openxmlformats.org/presentationml/2006/main" mc:Ignorable="mv" mc:PreserveAttributes="mv:*">
+<p:sld xmlns:a="http://schemas.openxmlformats.org/drawingml/2006/main" xmlns:r="http://schemas.openxmlformats.org/officeDocument/2006/relationships" xmlns:p="http://schemas.openxmlformats.org/presentationml/2006/main">
   <p:cSld>
     <p:spTree>
       <p:nvGrpSpPr>
@@ -14199,8 +14195,8 @@
           </p:cNvPicPr>
           <p:nvPr/>
         </p:nvPicPr>
-        <mc:AlternateContent>
-          <mc:Choice xmlns:ma="http://schemas.microsoft.com/office/mac/drawingml/2008/main" Requires="ma">
+        <mc:AlternateContent xmlns:mc="http://schemas.openxmlformats.org/markup-compatibility/2006">
+          <mc:Choice xmlns:ma="http://schemas.microsoft.com/office/mac/drawingml/2008/main" xmlns:mv="urn:schemas-microsoft-com:mac:vml" xmlns="" Requires="ma">
             <p:blipFill>
               <a:blip r:embed="rId2"/>
               <a:stretch>
@@ -14401,21 +14397,7 @@
                 <a:ea typeface="宋体" pitchFamily="-65" charset="-128"/>
                 <a:cs typeface="Times New Roman" charset="0"/>
               </a:rPr>
-              <a:t>Each fragment is co-located with the component  </a:t>
-            </a:r>
-            <a:r>
-              <a:rPr lang="en-US" altLang="zh-CN" sz="2000" i="0" dirty="0" smtClean="0">
-                <a:ea typeface="宋体" pitchFamily="-65" charset="-128"/>
-                <a:cs typeface="Times New Roman" charset="0"/>
-              </a:rPr>
-              <a:t>instance it </a:t>
-            </a:r>
-            <a:r>
-              <a:rPr lang="en-US" altLang="zh-CN" sz="2000" i="0" dirty="0" smtClean="0">
-                <a:ea typeface="宋体" pitchFamily="-65" charset="-128"/>
-                <a:cs typeface="Times New Roman" charset="0"/>
-              </a:rPr>
-              <a:t>is connected to</a:t>
+              <a:t>Each fragment is co-located with the component  instance it is connected to</a:t>
             </a:r>
           </a:p>
           <a:p>
@@ -14552,7 +14534,7 @@
 </file>
 
 <file path=ppt/slides/slide19.xml><?xml version="1.0" encoding="utf-8"?>
-<p:sld xmlns:a="http://schemas.openxmlformats.org/drawingml/2006/main" xmlns:r="http://schemas.openxmlformats.org/officeDocument/2006/relationships" xmlns:mc="http://schemas.openxmlformats.org/markup-compatibility/2006" xmlns:mv="urn:schemas-microsoft-com:mac:vml" xmlns:p="http://schemas.openxmlformats.org/presentationml/2006/main" mc:Ignorable="mv" mc:PreserveAttributes="mv:*">
+<p:sld xmlns:a="http://schemas.openxmlformats.org/drawingml/2006/main" xmlns:r="http://schemas.openxmlformats.org/officeDocument/2006/relationships" xmlns:p="http://schemas.openxmlformats.org/presentationml/2006/main">
   <p:cSld>
     <p:spTree>
       <p:nvGrpSpPr>
@@ -14689,7 +14671,7 @@
 </file>
 
 <file path=ppt/slides/slide2.xml><?xml version="1.0" encoding="utf-8"?>
-<p:sld xmlns:a="http://schemas.openxmlformats.org/drawingml/2006/main" xmlns:r="http://schemas.openxmlformats.org/officeDocument/2006/relationships" xmlns:mc="http://schemas.openxmlformats.org/markup-compatibility/2006" xmlns:mv="urn:schemas-microsoft-com:mac:vml" xmlns:p="http://schemas.openxmlformats.org/presentationml/2006/main" mc:Ignorable="mv" mc:PreserveAttributes="mv:*">
+<p:sld xmlns:a="http://schemas.openxmlformats.org/drawingml/2006/main" xmlns:r="http://schemas.openxmlformats.org/officeDocument/2006/relationships" xmlns:p="http://schemas.openxmlformats.org/presentationml/2006/main">
   <p:cSld>
     <p:spTree>
       <p:nvGrpSpPr>
@@ -14957,7 +14939,7 @@
 </file>
 
 <file path=ppt/slides/slide20.xml><?xml version="1.0" encoding="utf-8"?>
-<p:sld xmlns:a="http://schemas.openxmlformats.org/drawingml/2006/main" xmlns:r="http://schemas.openxmlformats.org/officeDocument/2006/relationships" xmlns:mc="http://schemas.openxmlformats.org/markup-compatibility/2006" xmlns:mv="urn:schemas-microsoft-com:mac:vml" xmlns:p="http://schemas.openxmlformats.org/presentationml/2006/main" mc:Ignorable="mv" mc:PreserveAttributes="mv:*">
+<p:sld xmlns:a="http://schemas.openxmlformats.org/drawingml/2006/main" xmlns:r="http://schemas.openxmlformats.org/officeDocument/2006/relationships" xmlns:p="http://schemas.openxmlformats.org/presentationml/2006/main">
   <p:cSld>
     <p:spTree>
       <p:nvGrpSpPr>
@@ -14990,15 +14972,7 @@
           <a:p>
             <a:r>
               <a:rPr lang="en-US" dirty="0" smtClean="0"/>
-              <a:t>Connector Modeling vs. Deployment </a:t>
-            </a:r>
-            <a:r>
-              <a:rPr lang="en-US" dirty="0" smtClean="0"/>
-              <a:t>(2/</a:t>
-            </a:r>
-            <a:r>
-              <a:rPr lang="en-US" dirty="0" smtClean="0"/>
-              <a:t>2)</a:t>
+              <a:t>Connector Modeling vs. Deployment (2/2)</a:t>
             </a:r>
             <a:endParaRPr lang="en-US" b="1" dirty="0"/>
           </a:p>
@@ -15074,8 +15048,8 @@
           </p:cNvPicPr>
           <p:nvPr/>
         </p:nvPicPr>
-        <mc:AlternateContent>
-          <mc:Choice xmlns:ma="http://schemas.microsoft.com/office/mac/drawingml/2008/main" Requires="ma">
+        <mc:AlternateContent xmlns:mc="http://schemas.openxmlformats.org/markup-compatibility/2006">
+          <mc:Choice xmlns:ma="http://schemas.microsoft.com/office/mac/drawingml/2008/main" xmlns:mv="urn:schemas-microsoft-com:mac:vml" xmlns="" Requires="ma">
             <p:blipFill>
               <a:blip r:embed="rId2"/>
               <a:stretch>
@@ -15118,7 +15092,7 @@
 </file>
 
 <file path=ppt/slides/slide21.xml><?xml version="1.0" encoding="utf-8"?>
-<p:sld xmlns:a="http://schemas.openxmlformats.org/drawingml/2006/main" xmlns:r="http://schemas.openxmlformats.org/officeDocument/2006/relationships" xmlns:mc="http://schemas.openxmlformats.org/markup-compatibility/2006" xmlns:mv="urn:schemas-microsoft-com:mac:vml" xmlns:p="http://schemas.openxmlformats.org/presentationml/2006/main" mc:Ignorable="mv" mc:PreserveAttributes="mv:*">
+<p:sld xmlns:a="http://schemas.openxmlformats.org/drawingml/2006/main" xmlns:r="http://schemas.openxmlformats.org/officeDocument/2006/relationships" xmlns:p="http://schemas.openxmlformats.org/presentationml/2006/main">
   <p:cSld>
     <p:spTree>
       <p:nvGrpSpPr>
@@ -15234,7 +15208,7 @@
 </file>
 
 <file path=ppt/slides/slide22.xml><?xml version="1.0" encoding="utf-8"?>
-<p:sld xmlns:a="http://schemas.openxmlformats.org/drawingml/2006/main" xmlns:r="http://schemas.openxmlformats.org/officeDocument/2006/relationships" xmlns:mc="http://schemas.openxmlformats.org/markup-compatibility/2006" xmlns:mv="urn:schemas-microsoft-com:mac:vml" xmlns:p="http://schemas.openxmlformats.org/presentationml/2006/main" mc:Ignorable="mv" mc:PreserveAttributes="mv:*">
+<p:sld xmlns:a="http://schemas.openxmlformats.org/drawingml/2006/main" xmlns:r="http://schemas.openxmlformats.org/officeDocument/2006/relationships" xmlns:p="http://schemas.openxmlformats.org/presentationml/2006/main">
   <p:cSld>
     <p:spTree>
       <p:nvGrpSpPr>
@@ -15344,13 +15318,8 @@
             <a:pPr lvl="1"/>
             <a:r>
               <a:rPr lang="en-US" dirty="0" smtClean="0"/>
-              <a:t>Must develop ad-hoc and proprietary ways to store and apply configuration </a:t>
-            </a:r>
-            <a:r>
-              <a:rPr lang="en-US" dirty="0" smtClean="0"/>
-              <a:t>data</a:t>
-            </a:r>
-            <a:endParaRPr lang="en-US" dirty="0" smtClean="0"/>
+              <a:t>Must develop ad-hoc and proprietary ways to store and apply configuration data</a:t>
+            </a:r>
           </a:p>
         </p:txBody>
       </p:sp>
@@ -15432,52 +15401,23 @@
                   <a:srgbClr val="FF0000"/>
                 </a:solidFill>
               </a:rPr>
-              <a:t>The DDS for Lightweight CCM (DDS4CCM) attempts to</a:t>
-            </a:r>
+              <a:t>The DDS for Lightweight CCM (DDS4CCM) attempts to </a:t>
+            </a:r>
+          </a:p>
+          <a:p>
+            <a:pPr algn="ctr">
+              <a:spcBef>
+                <a:spcPts val="0"/>
+              </a:spcBef>
+            </a:pPr>
             <a:r>
               <a:rPr lang="en-US" sz="2200" b="1" i="0" dirty="0" smtClean="0">
                 <a:solidFill>
                   <a:srgbClr val="FF0000"/>
                 </a:solidFill>
               </a:rPr>
-              <a:t> </a:t>
-            </a:r>
-          </a:p>
-          <a:p>
-            <a:pPr algn="ctr">
-              <a:spcBef>
-                <a:spcPts val="0"/>
-              </a:spcBef>
-            </a:pPr>
-            <a:r>
-              <a:rPr lang="en-US" sz="2200" b="1" i="0" dirty="0" smtClean="0">
-                <a:solidFill>
-                  <a:srgbClr val="FF0000"/>
-                </a:solidFill>
-              </a:rPr>
-              <a:t>resolve </a:t>
-            </a:r>
-            <a:r>
-              <a:rPr lang="en-US" sz="2200" b="1" i="0" dirty="0" smtClean="0">
-                <a:solidFill>
-                  <a:srgbClr val="FF0000"/>
-                </a:solidFill>
-              </a:rPr>
-              <a:t>these </a:t>
-            </a:r>
-            <a:r>
-              <a:rPr lang="en-US" sz="2200" b="1" i="0" dirty="0" smtClean="0">
-                <a:solidFill>
-                  <a:srgbClr val="FF0000"/>
-                </a:solidFill>
-              </a:rPr>
-              <a:t>challenges</a:t>
-            </a:r>
-            <a:endParaRPr lang="en-US" sz="2200" b="1" i="0" dirty="0" smtClean="0">
-              <a:solidFill>
-                <a:srgbClr val="FF0000"/>
-              </a:solidFill>
-            </a:endParaRPr>
+              <a:t>resolve these challenges</a:t>
+            </a:r>
           </a:p>
         </p:txBody>
       </p:sp>
@@ -15497,7 +15437,7 @@
 </file>
 
 <file path=ppt/slides/slide23.xml><?xml version="1.0" encoding="utf-8"?>
-<p:sld xmlns:a="http://schemas.openxmlformats.org/drawingml/2006/main" xmlns:r="http://schemas.openxmlformats.org/officeDocument/2006/relationships" xmlns:mc="http://schemas.openxmlformats.org/markup-compatibility/2006" xmlns:mv="urn:schemas-microsoft-com:mac:vml" xmlns:p="http://schemas.openxmlformats.org/presentationml/2006/main" mc:Ignorable="mv" mc:PreserveAttributes="mv:*">
+<p:sld xmlns:a="http://schemas.openxmlformats.org/drawingml/2006/main" xmlns:r="http://schemas.openxmlformats.org/officeDocument/2006/relationships" xmlns:p="http://schemas.openxmlformats.org/presentationml/2006/main">
   <p:cSld>
     <p:spTree>
       <p:nvGrpSpPr>
@@ -15630,7 +15570,7 @@
 </file>
 
 <file path=ppt/slides/slide24.xml><?xml version="1.0" encoding="utf-8"?>
-<p:sld xmlns:a="http://schemas.openxmlformats.org/drawingml/2006/main" xmlns:r="http://schemas.openxmlformats.org/officeDocument/2006/relationships" xmlns:mc="http://schemas.openxmlformats.org/markup-compatibility/2006" xmlns:mv="urn:schemas-microsoft-com:mac:vml" xmlns:p="http://schemas.openxmlformats.org/presentationml/2006/main" mc:Ignorable="mv" mc:PreserveAttributes="mv:*">
+<p:sld xmlns:a="http://schemas.openxmlformats.org/drawingml/2006/main" xmlns:r="http://schemas.openxmlformats.org/officeDocument/2006/relationships" xmlns:p="http://schemas.openxmlformats.org/presentationml/2006/main">
   <p:cSld>
     <p:spTree>
       <p:nvGrpSpPr>
@@ -15686,22 +15626,14 @@
           <a:p>
             <a:r>
               <a:rPr lang="en-US" dirty="0" smtClean="0"/>
-              <a:t>Specification tries not to </a:t>
-            </a:r>
+              <a:t>Specification tries not to prevent advanced DDS usage</a:t>
+            </a:r>
+          </a:p>
+          <a:p>
+            <a:pPr lvl="1"/>
             <a:r>
               <a:rPr lang="en-US" dirty="0" smtClean="0"/>
-              <a:t>prevent advanced DDS usage</a:t>
-            </a:r>
-          </a:p>
-          <a:p>
-            <a:pPr lvl="1"/>
-            <a:r>
-              <a:rPr lang="en-US" dirty="0" smtClean="0"/>
-              <a:t>All ports provide acces</a:t>
-            </a:r>
-            <a:r>
-              <a:rPr lang="en-US" dirty="0" smtClean="0"/>
-              <a:t>s to a more detailed interface</a:t>
+              <a:t>All ports provide access to a more detailed interface</a:t>
             </a:r>
           </a:p>
           <a:p>
@@ -15733,7 +15665,7 @@
 </file>
 
 <file path=ppt/slides/slide25.xml><?xml version="1.0" encoding="utf-8"?>
-<p:sld xmlns:a="http://schemas.openxmlformats.org/drawingml/2006/main" xmlns:r="http://schemas.openxmlformats.org/officeDocument/2006/relationships" xmlns:mc="http://schemas.openxmlformats.org/markup-compatibility/2006" xmlns:mv="urn:schemas-microsoft-com:mac:vml" xmlns:p="http://schemas.openxmlformats.org/presentationml/2006/main" mc:Ignorable="mv" mc:PreserveAttributes="mv:*">
+<p:sld xmlns:a="http://schemas.openxmlformats.org/drawingml/2006/main" xmlns:r="http://schemas.openxmlformats.org/officeDocument/2006/relationships" xmlns:p="http://schemas.openxmlformats.org/presentationml/2006/main">
   <p:cSld>
     <p:spTree>
       <p:nvGrpSpPr>
@@ -15766,11 +15698,7 @@
           <a:p>
             <a:r>
               <a:rPr lang="en-US" dirty="0" smtClean="0"/>
-              <a:t>DDS4CCM Basic Ports (1</a:t>
-            </a:r>
-            <a:r>
-              <a:rPr lang="en-US" dirty="0" smtClean="0"/>
-              <a:t>/3)</a:t>
+              <a:t>DDS4CCM Basic Ports (1/3)</a:t>
             </a:r>
             <a:endParaRPr lang="en-US" dirty="0"/>
           </a:p>
@@ -15824,15 +15752,7 @@
             </a:r>
             <a:r>
               <a:rPr lang="en-US" dirty="0" smtClean="0"/>
-              <a:t> – Allows publication of data on a topic without regard to</a:t>
-            </a:r>
-            <a:r>
-              <a:rPr lang="en-US" dirty="0" smtClean="0"/>
-              <a:t> the instance </a:t>
-            </a:r>
-            <a:r>
-              <a:rPr lang="en-US" dirty="0" smtClean="0"/>
-              <a:t>lifecycle.</a:t>
+              <a:t> – Allows publication of data on a topic without regard to the instance lifecycle.</a:t>
             </a:r>
           </a:p>
           <a:p>
@@ -15895,7 +15815,7 @@
 </file>
 
 <file path=ppt/slides/slide26.xml><?xml version="1.0" encoding="utf-8"?>
-<p:sld xmlns:a="http://schemas.openxmlformats.org/drawingml/2006/main" xmlns:r="http://schemas.openxmlformats.org/officeDocument/2006/relationships" xmlns:mc="http://schemas.openxmlformats.org/markup-compatibility/2006" xmlns:mv="urn:schemas-microsoft-com:mac:vml" xmlns:p="http://schemas.openxmlformats.org/presentationml/2006/main" mc:Ignorable="mv" mc:PreserveAttributes="mv:*">
+<p:sld xmlns:a="http://schemas.openxmlformats.org/drawingml/2006/main" xmlns:r="http://schemas.openxmlformats.org/officeDocument/2006/relationships" xmlns:p="http://schemas.openxmlformats.org/presentationml/2006/main">
   <p:cSld>
     <p:spTree>
       <p:nvGrpSpPr>
@@ -15963,15 +15883,7 @@
             </a:r>
             <a:r>
               <a:rPr lang="en-US" dirty="0" smtClean="0"/>
-              <a:t> – Allows access</a:t>
-            </a:r>
-            <a:r>
-              <a:rPr lang="en-US" dirty="0" smtClean="0"/>
-              <a:t> to one </a:t>
-            </a:r>
-            <a:r>
-              <a:rPr lang="en-US" dirty="0" smtClean="0"/>
-              <a:t>or more instances with non-blocking semantics.</a:t>
+              <a:t> – Allows access to one or more instances with non-blocking semantics.</a:t>
             </a:r>
           </a:p>
           <a:p>
@@ -15982,15 +15894,7 @@
             </a:r>
             <a:r>
               <a:rPr lang="en-US" dirty="0" smtClean="0"/>
-              <a:t> – Allows access</a:t>
-            </a:r>
-            <a:r>
-              <a:rPr lang="en-US" dirty="0" smtClean="0"/>
-              <a:t> to one </a:t>
-            </a:r>
-            <a:r>
-              <a:rPr lang="en-US" dirty="0" smtClean="0"/>
-              <a:t>or more instances with blocking semantics.</a:t>
+              <a:t> – Allows access to one or more instances with blocking semantics.</a:t>
             </a:r>
           </a:p>
           <a:p>
@@ -16053,7 +15957,7 @@
 </file>
 
 <file path=ppt/slides/slide27.xml><?xml version="1.0" encoding="utf-8"?>
-<p:sld xmlns:a="http://schemas.openxmlformats.org/drawingml/2006/main" xmlns:r="http://schemas.openxmlformats.org/officeDocument/2006/relationships" xmlns:mc="http://schemas.openxmlformats.org/markup-compatibility/2006" xmlns:mv="urn:schemas-microsoft-com:mac:vml" xmlns:p="http://schemas.openxmlformats.org/presentationml/2006/main" mc:Ignorable="mv" mc:PreserveAttributes="mv:*">
+<p:sld xmlns:a="http://schemas.openxmlformats.org/drawingml/2006/main" xmlns:r="http://schemas.openxmlformats.org/officeDocument/2006/relationships" xmlns:p="http://schemas.openxmlformats.org/presentationml/2006/main">
   <p:cSld>
     <p:spTree>
       <p:nvGrpSpPr>
@@ -16121,21 +16025,8 @@
             </a:r>
             <a:r>
               <a:rPr lang="en-US" dirty="0" smtClean="0"/>
-              <a:t> –</a:t>
-            </a:r>
-            <a:r>
-              <a:rPr lang="en-US" dirty="0" smtClean="0"/>
-              <a:t> Delivers status related to ports, this information is relevant to dat</a:t>
-            </a:r>
-            <a:r>
-              <a:rPr lang="en-US" dirty="0" smtClean="0"/>
-              <a:t>a subscribers.</a:t>
-            </a:r>
-            <a:r>
-              <a:rPr lang="en-US" dirty="0" smtClean="0"/>
-              <a:t> </a:t>
-            </a:r>
-            <a:endParaRPr lang="en-US" dirty="0" smtClean="0"/>
+              <a:t> – Delivers status related to ports, this information is relevant to data subscribers. </a:t>
+            </a:r>
           </a:p>
           <a:p>
             <a:pPr lvl="1"/>
@@ -16145,15 +16036,7 @@
             </a:r>
             <a:r>
               <a:rPr lang="en-US" dirty="0" smtClean="0"/>
-              <a:t> –</a:t>
-            </a:r>
-            <a:r>
-              <a:rPr lang="en-US" dirty="0" smtClean="0"/>
-              <a:t> Delivers status updates that are relevant system-</a:t>
-            </a:r>
-            <a:r>
-              <a:rPr lang="en-US" dirty="0" smtClean="0"/>
-              <a:t>wide. 	</a:t>
+              <a:t> – Delivers status updates that are relevant system-wide. 	</a:t>
             </a:r>
           </a:p>
           <a:p>
@@ -16351,7 +16234,7 @@
 </file>
 
 <file path=ppt/slides/slide28.xml><?xml version="1.0" encoding="utf-8"?>
-<p:sld xmlns:a="http://schemas.openxmlformats.org/drawingml/2006/main" xmlns:r="http://schemas.openxmlformats.org/officeDocument/2006/relationships" xmlns:mc="http://schemas.openxmlformats.org/markup-compatibility/2006" xmlns:mv="urn:schemas-microsoft-com:mac:vml" xmlns:p="http://schemas.openxmlformats.org/presentationml/2006/main" mc:Ignorable="mv" mc:PreserveAttributes="mv:*">
+<p:sld xmlns:a="http://schemas.openxmlformats.org/drawingml/2006/main" xmlns:r="http://schemas.openxmlformats.org/officeDocument/2006/relationships" xmlns:p="http://schemas.openxmlformats.org/presentationml/2006/main">
   <p:cSld>
     <p:spTree>
       <p:nvGrpSpPr>
@@ -16384,11 +16267,7 @@
           <a:p>
             <a:r>
               <a:rPr lang="en-US" dirty="0" smtClean="0"/>
-              <a:t>DDS4CCM Extended </a:t>
-            </a:r>
-            <a:r>
-              <a:rPr lang="en-US" dirty="0" smtClean="0"/>
-              <a:t>Ports (1/2)</a:t>
+              <a:t>DDS4CCM Extended Ports (1/2)</a:t>
             </a:r>
             <a:endParaRPr lang="en-US" dirty="0"/>
           </a:p>
@@ -16432,7 +16311,6 @@
               <a:rPr lang="en-US" dirty="0" smtClean="0"/>
               <a:t>Increases code portability by not exposing DDS implementation directly</a:t>
             </a:r>
-            <a:endParaRPr lang="en-US" dirty="0" smtClean="0"/>
           </a:p>
           <a:p>
             <a:pPr lvl="1"/>
@@ -16742,7 +16620,7 @@
 </file>
 
 <file path=ppt/slides/slide29.xml><?xml version="1.0" encoding="utf-8"?>
-<p:sld xmlns:a="http://schemas.openxmlformats.org/drawingml/2006/main" xmlns:r="http://schemas.openxmlformats.org/officeDocument/2006/relationships" xmlns:mc="http://schemas.openxmlformats.org/markup-compatibility/2006" xmlns:mv="urn:schemas-microsoft-com:mac:vml" xmlns:p="http://schemas.openxmlformats.org/presentationml/2006/main" mc:Ignorable="mv" mc:PreserveAttributes="mv:*">
+<p:sld xmlns:a="http://schemas.openxmlformats.org/drawingml/2006/main" xmlns:r="http://schemas.openxmlformats.org/officeDocument/2006/relationships" xmlns:p="http://schemas.openxmlformats.org/presentationml/2006/main">
   <p:cSld>
     <p:spTree>
       <p:nvGrpSpPr>
@@ -16853,14 +16731,7 @@
                 <a:latin typeface="Courier New"/>
                 <a:cs typeface="Courier New"/>
               </a:rPr>
-              <a:t>p</a:t>
-            </a:r>
-            <a:r>
-              <a:rPr lang="en-US" sz="1400" i="0" dirty="0" err="1" smtClean="0">
-                <a:latin typeface="Courier New"/>
-                <a:cs typeface="Courier New"/>
-              </a:rPr>
-              <a:t>orttype</a:t>
+              <a:t>porttype</a:t>
             </a:r>
             <a:r>
               <a:rPr lang="en-US" sz="1400" i="0" dirty="0" smtClean="0">
@@ -17041,14 +16912,7 @@
                 <a:latin typeface="Courier New"/>
                 <a:cs typeface="Courier New"/>
               </a:rPr>
-              <a:t>p</a:t>
-            </a:r>
-            <a:r>
-              <a:rPr lang="en-US" sz="1400" i="0" dirty="0" err="1" smtClean="0">
-                <a:latin typeface="Courier New"/>
-                <a:cs typeface="Courier New"/>
-              </a:rPr>
-              <a:t>orttype</a:t>
+              <a:t>porttype</a:t>
             </a:r>
             <a:r>
               <a:rPr lang="en-US" sz="1400" i="0" dirty="0" smtClean="0">
@@ -17218,7 +17082,7 @@
 </file>
 
 <file path=ppt/slides/slide3.xml><?xml version="1.0" encoding="utf-8"?>
-<p:sld xmlns:a="http://schemas.openxmlformats.org/drawingml/2006/main" xmlns:r="http://schemas.openxmlformats.org/officeDocument/2006/relationships" xmlns:mc="http://schemas.openxmlformats.org/markup-compatibility/2006" xmlns:mv="urn:schemas-microsoft-com:mac:vml" xmlns:p="http://schemas.openxmlformats.org/presentationml/2006/main" mc:Ignorable="mv" mc:PreserveAttributes="mv:*">
+<p:sld xmlns:a="http://schemas.openxmlformats.org/drawingml/2006/main" xmlns:r="http://schemas.openxmlformats.org/officeDocument/2006/relationships" xmlns:p="http://schemas.openxmlformats.org/presentationml/2006/main">
   <p:cSld>
     <p:spTree>
       <p:nvGrpSpPr>
@@ -17486,7 +17350,7 @@
 </file>
 
 <file path=ppt/slides/slide30.xml><?xml version="1.0" encoding="utf-8"?>
-<p:sld xmlns:a="http://schemas.openxmlformats.org/drawingml/2006/main" xmlns:r="http://schemas.openxmlformats.org/officeDocument/2006/relationships" xmlns:mc="http://schemas.openxmlformats.org/markup-compatibility/2006" xmlns:mv="urn:schemas-microsoft-com:mac:vml" xmlns:p="http://schemas.openxmlformats.org/presentationml/2006/main" mc:Ignorable="mv" mc:PreserveAttributes="mv:*">
+<p:sld xmlns:a="http://schemas.openxmlformats.org/drawingml/2006/main" xmlns:r="http://schemas.openxmlformats.org/officeDocument/2006/relationships" xmlns:p="http://schemas.openxmlformats.org/presentationml/2006/main">
   <p:cSld>
     <p:spTree>
       <p:nvGrpSpPr>
@@ -17650,14 +17514,7 @@
                 <a:latin typeface="Courier New"/>
                 <a:cs typeface="Courier New"/>
               </a:rPr>
-              <a:t>c</a:t>
-            </a:r>
-            <a:r>
-              <a:rPr lang="en-US" sz="1500" dirty="0" smtClean="0">
-                <a:latin typeface="Courier New"/>
-                <a:cs typeface="Courier New"/>
-              </a:rPr>
-              <a:t>onnector </a:t>
+              <a:t>connector </a:t>
             </a:r>
             <a:r>
               <a:rPr lang="en-US" sz="1500" dirty="0" err="1" smtClean="0">
@@ -17982,7 +17839,7 @@
 </file>
 
 <file path=ppt/slides/slide31.xml><?xml version="1.0" encoding="utf-8"?>
-<p:sld xmlns:a="http://schemas.openxmlformats.org/drawingml/2006/main" xmlns:r="http://schemas.openxmlformats.org/officeDocument/2006/relationships" xmlns:mc="http://schemas.openxmlformats.org/markup-compatibility/2006" xmlns:mv="urn:schemas-microsoft-com:mac:vml" xmlns:p="http://schemas.openxmlformats.org/presentationml/2006/main" mc:Ignorable="mv" mc:PreserveAttributes="mv:*">
+<p:sld xmlns:a="http://schemas.openxmlformats.org/drawingml/2006/main" xmlns:r="http://schemas.openxmlformats.org/officeDocument/2006/relationships" xmlns:p="http://schemas.openxmlformats.org/presentationml/2006/main">
   <p:cSld>
     <p:spTree>
       <p:nvGrpSpPr>
@@ -18015,15 +17872,7 @@
           <a:p>
             <a:r>
               <a:rPr lang="en-US" dirty="0" smtClean="0"/>
-              <a:t>DDS4CCM Standard Connectors </a:t>
-            </a:r>
-            <a:r>
-              <a:rPr lang="en-US" dirty="0" smtClean="0"/>
-              <a:t>(2/</a:t>
-            </a:r>
-            <a:r>
-              <a:rPr lang="en-US" dirty="0" smtClean="0"/>
-              <a:t>2)</a:t>
+              <a:t>DDS4CCM Standard Connectors (2/2)</a:t>
             </a:r>
             <a:endParaRPr lang="en-US" dirty="0"/>
           </a:p>
@@ -18142,42 +17991,58 @@
                 <a:latin typeface="Courier New"/>
                 <a:cs typeface="Courier New"/>
               </a:rPr>
-              <a:t>c</a:t>
+              <a:t>connector </a:t>
+            </a:r>
+            <a:r>
+              <a:rPr lang="en-US" sz="1400" i="0" dirty="0" err="1" smtClean="0">
+                <a:latin typeface="Courier New"/>
+                <a:cs typeface="Courier New"/>
+              </a:rPr>
+              <a:t>DDS_State</a:t>
             </a:r>
             <a:r>
               <a:rPr lang="en-US" sz="1400" i="0" dirty="0" smtClean="0">
                 <a:latin typeface="Courier New"/>
                 <a:cs typeface="Courier New"/>
               </a:rPr>
-              <a:t>onnector </a:t>
+              <a:t>&lt;</a:t>
             </a:r>
             <a:r>
               <a:rPr lang="en-US" sz="1400" i="0" dirty="0" err="1" smtClean="0">
                 <a:latin typeface="Courier New"/>
                 <a:cs typeface="Courier New"/>
               </a:rPr>
-              <a:t>DDS_State</a:t>
+              <a:t>typename</a:t>
             </a:r>
             <a:r>
               <a:rPr lang="en-US" sz="1400" i="0" dirty="0" smtClean="0">
                 <a:latin typeface="Courier New"/>
                 <a:cs typeface="Courier New"/>
               </a:rPr>
-              <a:t>&lt;</a:t>
+              <a:t> T&gt;</a:t>
+            </a:r>
+          </a:p>
+          <a:p>
+            <a:r>
+              <a:rPr lang="en-US" sz="1400" i="0" dirty="0" smtClean="0">
+                <a:latin typeface="Courier New"/>
+                <a:cs typeface="Courier New"/>
+              </a:rPr>
+              <a:t>   : </a:t>
             </a:r>
             <a:r>
               <a:rPr lang="en-US" sz="1400" i="0" dirty="0" err="1" smtClean="0">
                 <a:latin typeface="Courier New"/>
                 <a:cs typeface="Courier New"/>
               </a:rPr>
-              <a:t>typename</a:t>
+              <a:t>DDS_TopicBase</a:t>
             </a:r>
             <a:r>
               <a:rPr lang="en-US" sz="1400" i="0" dirty="0" smtClean="0">
                 <a:latin typeface="Courier New"/>
                 <a:cs typeface="Courier New"/>
               </a:rPr>
-              <a:t> T&gt;</a:t>
+              <a:t> {</a:t>
             </a:r>
           </a:p>
           <a:p>
@@ -18186,29 +18051,43 @@
                 <a:latin typeface="Courier New"/>
                 <a:cs typeface="Courier New"/>
               </a:rPr>
-              <a:t>   : </a:t>
+              <a:t>  </a:t>
             </a:r>
             <a:r>
               <a:rPr lang="en-US" sz="1400" i="0" dirty="0" err="1" smtClean="0">
                 <a:latin typeface="Courier New"/>
                 <a:cs typeface="Courier New"/>
               </a:rPr>
-              <a:t>DDS_TopicBase</a:t>
+              <a:t>mirrorport</a:t>
             </a:r>
             <a:r>
               <a:rPr lang="en-US" sz="1400" i="0" dirty="0" smtClean="0">
                 <a:latin typeface="Courier New"/>
                 <a:cs typeface="Courier New"/>
               </a:rPr>
-              <a:t> {</a:t>
-            </a:r>
-          </a:p>
-          <a:p>
+              <a:t> </a:t>
+            </a:r>
+            <a:r>
+              <a:rPr lang="en-US" sz="1400" i="0" dirty="0" err="1" smtClean="0">
+                <a:latin typeface="Courier New"/>
+                <a:cs typeface="Courier New"/>
+              </a:rPr>
+              <a:t>DDS_Update</a:t>
+            </a:r>
             <a:r>
               <a:rPr lang="en-US" sz="1400" i="0" dirty="0" smtClean="0">
                 <a:latin typeface="Courier New"/>
                 <a:cs typeface="Courier New"/>
               </a:rPr>
+              <a:t>&lt;T&gt; observable;</a:t>
+            </a:r>
+          </a:p>
+          <a:p>
+            <a:r>
+              <a:rPr lang="en-US" sz="1400" i="0" dirty="0" smtClean="0">
+                <a:latin typeface="Courier New"/>
+                <a:cs typeface="Courier New"/>
+              </a:rPr>
               <a:t>  </a:t>
             </a:r>
             <a:r>
@@ -18230,21 +18109,28 @@
                 <a:latin typeface="Courier New"/>
                 <a:cs typeface="Courier New"/>
               </a:rPr>
-              <a:t>DDS_Update</a:t>
+              <a:t>DDS_Read</a:t>
             </a:r>
             <a:r>
               <a:rPr lang="en-US" sz="1400" i="0" dirty="0" smtClean="0">
                 <a:latin typeface="Courier New"/>
                 <a:cs typeface="Courier New"/>
               </a:rPr>
-              <a:t>&lt;T</a:t>
+              <a:t>&lt;T&gt; </a:t>
+            </a:r>
+            <a:r>
+              <a:rPr lang="en-US" sz="1400" i="0" dirty="0" err="1" smtClean="0">
+                <a:latin typeface="Courier New"/>
+                <a:cs typeface="Courier New"/>
+              </a:rPr>
+              <a:t>passive_observer</a:t>
             </a:r>
             <a:r>
               <a:rPr lang="en-US" sz="1400" i="0" dirty="0" smtClean="0">
                 <a:latin typeface="Courier New"/>
                 <a:cs typeface="Courier New"/>
               </a:rPr>
-              <a:t>&gt; observable;</a:t>
+              <a:t>;    </a:t>
             </a:r>
           </a:p>
           <a:p>
@@ -18274,137 +18160,65 @@
                 <a:latin typeface="Courier New"/>
                 <a:cs typeface="Courier New"/>
               </a:rPr>
-              <a:t>DDS_Read</a:t>
+              <a:t>DDS_Get</a:t>
             </a:r>
             <a:r>
               <a:rPr lang="en-US" sz="1400" i="0" dirty="0" smtClean="0">
                 <a:latin typeface="Courier New"/>
                 <a:cs typeface="Courier New"/>
               </a:rPr>
-              <a:t>&lt;T</a:t>
+              <a:t>&lt;T&gt; </a:t>
+            </a:r>
+            <a:r>
+              <a:rPr lang="en-US" sz="1400" i="0" dirty="0" err="1" smtClean="0">
+                <a:latin typeface="Courier New"/>
+                <a:cs typeface="Courier New"/>
+              </a:rPr>
+              <a:t>pull_observer</a:t>
             </a:r>
             <a:r>
               <a:rPr lang="en-US" sz="1400" i="0" dirty="0" smtClean="0">
                 <a:latin typeface="Courier New"/>
                 <a:cs typeface="Courier New"/>
               </a:rPr>
-              <a:t>&gt; </a:t>
+              <a:t>; </a:t>
+            </a:r>
+          </a:p>
+          <a:p>
+            <a:r>
+              <a:rPr lang="en-US" sz="1400" i="0" dirty="0" smtClean="0">
+                <a:latin typeface="Courier New"/>
+                <a:cs typeface="Courier New"/>
+              </a:rPr>
+              <a:t>  </a:t>
             </a:r>
             <a:r>
               <a:rPr lang="en-US" sz="1400" i="0" dirty="0" err="1" smtClean="0">
                 <a:latin typeface="Courier New"/>
                 <a:cs typeface="Courier New"/>
               </a:rPr>
-              <a:t>passive_observer</a:t>
+              <a:t>mirrorport</a:t>
             </a:r>
             <a:r>
               <a:rPr lang="en-US" sz="1400" i="0" dirty="0" smtClean="0">
                 <a:latin typeface="Courier New"/>
                 <a:cs typeface="Courier New"/>
               </a:rPr>
-              <a:t>;    </a:t>
-            </a:r>
-          </a:p>
-          <a:p>
+              <a:t> </a:t>
+            </a:r>
+            <a:r>
+              <a:rPr lang="en-US" sz="1400" i="0" dirty="0" err="1" smtClean="0">
+                <a:latin typeface="Courier New"/>
+                <a:cs typeface="Courier New"/>
+              </a:rPr>
+              <a:t>DDS_StateListen</a:t>
+            </a:r>
             <a:r>
               <a:rPr lang="en-US" sz="1400" i="0" dirty="0" smtClean="0">
                 <a:latin typeface="Courier New"/>
                 <a:cs typeface="Courier New"/>
               </a:rPr>
-              <a:t>  </a:t>
-            </a:r>
-            <a:r>
-              <a:rPr lang="en-US" sz="1400" i="0" dirty="0" err="1" smtClean="0">
-                <a:latin typeface="Courier New"/>
-                <a:cs typeface="Courier New"/>
-              </a:rPr>
-              <a:t>mirrorport</a:t>
-            </a:r>
-            <a:r>
-              <a:rPr lang="en-US" sz="1400" i="0" dirty="0" smtClean="0">
-                <a:latin typeface="Courier New"/>
-                <a:cs typeface="Courier New"/>
-              </a:rPr>
-              <a:t> </a:t>
-            </a:r>
-            <a:r>
-              <a:rPr lang="en-US" sz="1400" i="0" dirty="0" err="1" smtClean="0">
-                <a:latin typeface="Courier New"/>
-                <a:cs typeface="Courier New"/>
-              </a:rPr>
-              <a:t>DDS_Get</a:t>
-            </a:r>
-            <a:r>
-              <a:rPr lang="en-US" sz="1400" i="0" dirty="0" smtClean="0">
-                <a:latin typeface="Courier New"/>
-                <a:cs typeface="Courier New"/>
-              </a:rPr>
-              <a:t>&lt;T</a:t>
-            </a:r>
-            <a:r>
-              <a:rPr lang="en-US" sz="1400" i="0" dirty="0" smtClean="0">
-                <a:latin typeface="Courier New"/>
-                <a:cs typeface="Courier New"/>
-              </a:rPr>
-              <a:t>&gt; </a:t>
-            </a:r>
-            <a:r>
-              <a:rPr lang="en-US" sz="1400" i="0" dirty="0" err="1" smtClean="0">
-                <a:latin typeface="Courier New"/>
-                <a:cs typeface="Courier New"/>
-              </a:rPr>
-              <a:t>pull_observer</a:t>
-            </a:r>
-            <a:r>
-              <a:rPr lang="en-US" sz="1400" i="0" dirty="0" smtClean="0">
-                <a:latin typeface="Courier New"/>
-                <a:cs typeface="Courier New"/>
-              </a:rPr>
-              <a:t>; </a:t>
-            </a:r>
-          </a:p>
-          <a:p>
-            <a:r>
-              <a:rPr lang="en-US" sz="1400" i="0" dirty="0" smtClean="0">
-                <a:latin typeface="Courier New"/>
-                <a:cs typeface="Courier New"/>
-              </a:rPr>
-              <a:t>  </a:t>
-            </a:r>
-            <a:r>
-              <a:rPr lang="en-US" sz="1400" i="0" dirty="0" err="1" smtClean="0">
-                <a:latin typeface="Courier New"/>
-                <a:cs typeface="Courier New"/>
-              </a:rPr>
-              <a:t>mirrorport</a:t>
-            </a:r>
-            <a:r>
-              <a:rPr lang="en-US" sz="1400" i="0" dirty="0" smtClean="0">
-                <a:latin typeface="Courier New"/>
-                <a:cs typeface="Courier New"/>
-              </a:rPr>
-              <a:t> </a:t>
-            </a:r>
-            <a:r>
-              <a:rPr lang="en-US" sz="1400" i="0" dirty="0" err="1" smtClean="0">
-                <a:latin typeface="Courier New"/>
-                <a:cs typeface="Courier New"/>
-              </a:rPr>
-              <a:t>DDS_StateListen</a:t>
-            </a:r>
-            <a:r>
-              <a:rPr lang="en-US" sz="1400" i="0" dirty="0" smtClean="0">
-                <a:latin typeface="Courier New"/>
-                <a:cs typeface="Courier New"/>
-              </a:rPr>
-              <a:t>&lt;T</a:t>
-            </a:r>
-            <a:r>
-              <a:rPr lang="en-US" sz="1400" i="0" dirty="0" smtClean="0">
-                <a:latin typeface="Courier New"/>
-                <a:cs typeface="Courier New"/>
-              </a:rPr>
-              <a:t>&gt;</a:t>
+              <a:t>&lt;T&gt;</a:t>
             </a:r>
           </a:p>
           <a:p>
@@ -18468,42 +18282,58 @@
                 <a:latin typeface="Courier New"/>
                 <a:cs typeface="Courier New"/>
               </a:rPr>
-              <a:t>c</a:t>
+              <a:t>connector </a:t>
+            </a:r>
+            <a:r>
+              <a:rPr lang="en-US" sz="1400" i="0" dirty="0" err="1" smtClean="0">
+                <a:latin typeface="Courier New"/>
+                <a:cs typeface="Courier New"/>
+              </a:rPr>
+              <a:t>DDS_Event</a:t>
             </a:r>
             <a:r>
               <a:rPr lang="en-US" sz="1400" i="0" dirty="0" smtClean="0">
                 <a:latin typeface="Courier New"/>
                 <a:cs typeface="Courier New"/>
               </a:rPr>
-              <a:t>onnector </a:t>
+              <a:t>&lt;</a:t>
             </a:r>
             <a:r>
               <a:rPr lang="en-US" sz="1400" i="0" dirty="0" err="1" smtClean="0">
                 <a:latin typeface="Courier New"/>
                 <a:cs typeface="Courier New"/>
               </a:rPr>
-              <a:t>DDS_Event</a:t>
+              <a:t>typename</a:t>
             </a:r>
             <a:r>
               <a:rPr lang="en-US" sz="1400" i="0" dirty="0" smtClean="0">
                 <a:latin typeface="Courier New"/>
                 <a:cs typeface="Courier New"/>
               </a:rPr>
-              <a:t>&lt;</a:t>
+              <a:t> T&gt;</a:t>
+            </a:r>
+          </a:p>
+          <a:p>
+            <a:r>
+              <a:rPr lang="en-US" sz="1400" i="0" dirty="0" smtClean="0">
+                <a:latin typeface="Courier New"/>
+                <a:cs typeface="Courier New"/>
+              </a:rPr>
+              <a:t>   : </a:t>
             </a:r>
             <a:r>
               <a:rPr lang="en-US" sz="1400" i="0" dirty="0" err="1" smtClean="0">
                 <a:latin typeface="Courier New"/>
                 <a:cs typeface="Courier New"/>
               </a:rPr>
-              <a:t>typename</a:t>
+              <a:t>DDS_TopicBase</a:t>
             </a:r>
             <a:r>
               <a:rPr lang="en-US" sz="1400" i="0" dirty="0" smtClean="0">
                 <a:latin typeface="Courier New"/>
                 <a:cs typeface="Courier New"/>
               </a:rPr>
-              <a:t> T&gt;</a:t>
+              <a:t> {</a:t>
             </a:r>
           </a:p>
           <a:p>
@@ -18512,29 +18342,43 @@
                 <a:latin typeface="Courier New"/>
                 <a:cs typeface="Courier New"/>
               </a:rPr>
-              <a:t>   : </a:t>
+              <a:t>  </a:t>
             </a:r>
             <a:r>
               <a:rPr lang="en-US" sz="1400" i="0" dirty="0" err="1" smtClean="0">
                 <a:latin typeface="Courier New"/>
                 <a:cs typeface="Courier New"/>
               </a:rPr>
-              <a:t>DDS_TopicBase</a:t>
+              <a:t>mirrorport</a:t>
             </a:r>
             <a:r>
               <a:rPr lang="en-US" sz="1400" i="0" dirty="0" smtClean="0">
                 <a:latin typeface="Courier New"/>
                 <a:cs typeface="Courier New"/>
               </a:rPr>
-              <a:t> {</a:t>
-            </a:r>
-          </a:p>
-          <a:p>
+              <a:t> </a:t>
+            </a:r>
+            <a:r>
+              <a:rPr lang="en-US" sz="1400" i="0" dirty="0" err="1" smtClean="0">
+                <a:latin typeface="Courier New"/>
+                <a:cs typeface="Courier New"/>
+              </a:rPr>
+              <a:t>DDS_Write</a:t>
+            </a:r>
             <a:r>
               <a:rPr lang="en-US" sz="1400" i="0" dirty="0" smtClean="0">
                 <a:latin typeface="Courier New"/>
                 <a:cs typeface="Courier New"/>
               </a:rPr>
+              <a:t>&lt;T&gt; supplier;</a:t>
+            </a:r>
+          </a:p>
+          <a:p>
+            <a:r>
+              <a:rPr lang="en-US" sz="1400" i="0" dirty="0" smtClean="0">
+                <a:latin typeface="Courier New"/>
+                <a:cs typeface="Courier New"/>
+              </a:rPr>
               <a:t>  </a:t>
             </a:r>
             <a:r>
@@ -18556,144 +18400,65 @@
                 <a:latin typeface="Courier New"/>
                 <a:cs typeface="Courier New"/>
               </a:rPr>
-              <a:t>DDS_Write</a:t>
+              <a:t>DDS_Get</a:t>
             </a:r>
             <a:r>
               <a:rPr lang="en-US" sz="1400" i="0" dirty="0" smtClean="0">
                 <a:latin typeface="Courier New"/>
                 <a:cs typeface="Courier New"/>
               </a:rPr>
-              <a:t>&lt;</a:t>
+              <a:t>&lt;T&gt; </a:t>
+            </a:r>
+            <a:r>
+              <a:rPr lang="en-US" sz="1400" i="0" dirty="0" err="1" smtClean="0">
+                <a:latin typeface="Courier New"/>
+                <a:cs typeface="Courier New"/>
+              </a:rPr>
+              <a:t>pull_consumer</a:t>
             </a:r>
             <a:r>
               <a:rPr lang="en-US" sz="1400" i="0" dirty="0" smtClean="0">
                 <a:latin typeface="Courier New"/>
                 <a:cs typeface="Courier New"/>
               </a:rPr>
-              <a:t>T</a:t>
-            </a:r>
+              <a:t>;    </a:t>
+            </a:r>
+          </a:p>
+          <a:p>
             <a:r>
               <a:rPr lang="en-US" sz="1400" i="0" dirty="0" smtClean="0">
                 <a:latin typeface="Courier New"/>
                 <a:cs typeface="Courier New"/>
               </a:rPr>
-              <a:t>&gt; supplier;</a:t>
-            </a:r>
-          </a:p>
-          <a:p>
+              <a:t>  </a:t>
+            </a:r>
+            <a:r>
+              <a:rPr lang="en-US" sz="1400" i="0" dirty="0" err="1" smtClean="0">
+                <a:latin typeface="Courier New"/>
+                <a:cs typeface="Courier New"/>
+              </a:rPr>
+              <a:t>mirrorport</a:t>
+            </a:r>
             <a:r>
               <a:rPr lang="en-US" sz="1400" i="0" dirty="0" smtClean="0">
                 <a:latin typeface="Courier New"/>
                 <a:cs typeface="Courier New"/>
               </a:rPr>
-              <a:t>  </a:t>
+              <a:t> </a:t>
             </a:r>
             <a:r>
               <a:rPr lang="en-US" sz="1400" i="0" dirty="0" err="1" smtClean="0">
                 <a:latin typeface="Courier New"/>
                 <a:cs typeface="Courier New"/>
               </a:rPr>
-              <a:t>mirrorport</a:t>
+              <a:t>DDS_Listen</a:t>
             </a:r>
             <a:r>
               <a:rPr lang="en-US" sz="1400" i="0" dirty="0" smtClean="0">
                 <a:latin typeface="Courier New"/>
                 <a:cs typeface="Courier New"/>
               </a:rPr>
-              <a:t> </a:t>
-            </a:r>
-            <a:r>
-              <a:rPr lang="en-US" sz="1400" i="0" dirty="0" err="1" smtClean="0">
-                <a:latin typeface="Courier New"/>
-                <a:cs typeface="Courier New"/>
-              </a:rPr>
-              <a:t>DDS_Get</a:t>
-            </a:r>
-            <a:r>
-              <a:rPr lang="en-US" sz="1400" i="0" dirty="0" smtClean="0">
-                <a:latin typeface="Courier New"/>
-                <a:cs typeface="Courier New"/>
-              </a:rPr>
-              <a:t>&lt;</a:t>
-            </a:r>
-            <a:r>
-              <a:rPr lang="en-US" sz="1400" i="0" dirty="0" smtClean="0">
-                <a:latin typeface="Courier New"/>
-                <a:cs typeface="Courier New"/>
-              </a:rPr>
-              <a:t>T</a:t>
-            </a:r>
-            <a:r>
-              <a:rPr lang="en-US" sz="1400" i="0" dirty="0" smtClean="0">
-                <a:latin typeface="Courier New"/>
-                <a:cs typeface="Courier New"/>
-              </a:rPr>
-              <a:t>&gt; </a:t>
-            </a:r>
-            <a:r>
-              <a:rPr lang="en-US" sz="1400" i="0" dirty="0" err="1" smtClean="0">
-                <a:latin typeface="Courier New"/>
-                <a:cs typeface="Courier New"/>
-              </a:rPr>
-              <a:t>pull_consumer</a:t>
-            </a:r>
-            <a:r>
-              <a:rPr lang="en-US" sz="1400" i="0" dirty="0" smtClean="0">
-                <a:latin typeface="Courier New"/>
-                <a:cs typeface="Courier New"/>
-              </a:rPr>
-              <a:t>;    </a:t>
-            </a:r>
-          </a:p>
-          <a:p>
-            <a:r>
-              <a:rPr lang="en-US" sz="1400" i="0" dirty="0" smtClean="0">
-                <a:latin typeface="Courier New"/>
-                <a:cs typeface="Courier New"/>
-              </a:rPr>
-              <a:t>  </a:t>
-            </a:r>
-            <a:r>
-              <a:rPr lang="en-US" sz="1400" i="0" dirty="0" err="1" smtClean="0">
-                <a:latin typeface="Courier New"/>
-                <a:cs typeface="Courier New"/>
-              </a:rPr>
-              <a:t>mirrorport</a:t>
-            </a:r>
-            <a:r>
-              <a:rPr lang="en-US" sz="1400" i="0" dirty="0" smtClean="0">
-                <a:latin typeface="Courier New"/>
-                <a:cs typeface="Courier New"/>
-              </a:rPr>
-              <a:t> </a:t>
-            </a:r>
-            <a:r>
-              <a:rPr lang="en-US" sz="1400" i="0" dirty="0" err="1" smtClean="0">
-                <a:latin typeface="Courier New"/>
-                <a:cs typeface="Courier New"/>
-              </a:rPr>
-              <a:t>DDS_Listen</a:t>
-            </a:r>
-            <a:r>
-              <a:rPr lang="en-US" sz="1400" i="0" dirty="0" smtClean="0">
-                <a:latin typeface="Courier New"/>
-                <a:cs typeface="Courier New"/>
-              </a:rPr>
-              <a:t>&lt;</a:t>
-            </a:r>
-            <a:r>
-              <a:rPr lang="en-US" sz="1400" i="0" dirty="0" smtClean="0">
-                <a:latin typeface="Courier New"/>
-                <a:cs typeface="Courier New"/>
-              </a:rPr>
-              <a:t>T</a:t>
-            </a:r>
-            <a:r>
-              <a:rPr lang="en-US" sz="1400" i="0" dirty="0" smtClean="0">
-                <a:latin typeface="Courier New"/>
-                <a:cs typeface="Courier New"/>
-              </a:rPr>
-              <a:t>&gt; </a:t>
+              <a:t>&lt;T&gt; </a:t>
             </a:r>
             <a:r>
               <a:rPr lang="en-US" sz="1400" i="0" dirty="0" err="1" smtClean="0">
@@ -18908,7 +18673,7 @@
 </file>
 
 <file path=ppt/slides/slide32.xml><?xml version="1.0" encoding="utf-8"?>
-<p:sld xmlns:a="http://schemas.openxmlformats.org/drawingml/2006/main" xmlns:r="http://schemas.openxmlformats.org/officeDocument/2006/relationships" xmlns:mc="http://schemas.openxmlformats.org/markup-compatibility/2006" xmlns:mv="urn:schemas-microsoft-com:mac:vml" xmlns:p="http://schemas.openxmlformats.org/presentationml/2006/main" mc:Ignorable="mv" mc:PreserveAttributes="mv:*">
+<p:sld xmlns:a="http://schemas.openxmlformats.org/drawingml/2006/main" xmlns:r="http://schemas.openxmlformats.org/officeDocument/2006/relationships" xmlns:p="http://schemas.openxmlformats.org/presentationml/2006/main">
   <p:cSld>
     <p:spTree>
       <p:nvGrpSpPr>
@@ -19038,15 +18803,7 @@
                 <a:ea typeface="宋体" pitchFamily="-65" charset="-128"/>
                 <a:cs typeface="Times New Roman" charset="0"/>
               </a:rPr>
-              <a:t>Initial proof of concept is a derivation of the </a:t>
-            </a:r>
-            <a:r>
-              <a:rPr lang="en-US" altLang="zh-CN" sz="2200" i="0" dirty="0" smtClean="0">
-                <a:latin typeface="+mn-lt"/>
-                <a:ea typeface="宋体" pitchFamily="-65" charset="-128"/>
-                <a:cs typeface="Times New Roman" charset="0"/>
-              </a:rPr>
-              <a:t>“Hello, World!” CCM example</a:t>
+              <a:t>Initial proof of concept is a derivation of the “Hello, World!” CCM example</a:t>
             </a:r>
           </a:p>
           <a:p>
@@ -19161,8 +18918,8 @@
           </p:cNvPicPr>
           <p:nvPr/>
         </p:nvPicPr>
-        <mc:AlternateContent>
-          <mc:Choice xmlns:ma="http://schemas.microsoft.com/office/mac/drawingml/2008/main" Requires="ma">
+        <mc:AlternateContent xmlns:mc="http://schemas.openxmlformats.org/markup-compatibility/2006">
+          <mc:Choice xmlns:ma="http://schemas.microsoft.com/office/mac/drawingml/2008/main" xmlns:mv="urn:schemas-microsoft-com:mac:vml" xmlns="" Requires="ma">
             <p:blipFill>
               <a:blip r:embed="rId2"/>
               <a:stretch>
@@ -19197,8 +18954,8 @@
           </p:cNvPicPr>
           <p:nvPr/>
         </p:nvPicPr>
-        <mc:AlternateContent>
-          <mc:Choice xmlns:ma="http://schemas.microsoft.com/office/mac/drawingml/2008/main" Requires="ma">
+        <mc:AlternateContent xmlns:mc="http://schemas.openxmlformats.org/markup-compatibility/2006">
+          <mc:Choice xmlns:ma="http://schemas.microsoft.com/office/mac/drawingml/2008/main" xmlns:mv="urn:schemas-microsoft-com:mac:vml" xmlns="" Requires="ma">
             <p:blipFill>
               <a:blip r:embed="rId4"/>
               <a:stretch>
@@ -19233,8 +18990,8 @@
           </p:cNvPicPr>
           <p:nvPr/>
         </p:nvPicPr>
-        <mc:AlternateContent>
-          <mc:Choice xmlns:ma="http://schemas.microsoft.com/office/mac/drawingml/2008/main" Requires="ma">
+        <mc:AlternateContent xmlns:mc="http://schemas.openxmlformats.org/markup-compatibility/2006">
+          <mc:Choice xmlns:ma="http://schemas.microsoft.com/office/mac/drawingml/2008/main" xmlns:mv="urn:schemas-microsoft-com:mac:vml" xmlns="" Requires="ma">
             <p:blipFill>
               <a:blip r:embed="rId6"/>
               <a:stretch>
@@ -19277,7 +19034,7 @@
 </file>
 
 <file path=ppt/slides/slide33.xml><?xml version="1.0" encoding="utf-8"?>
-<p:sld xmlns:a="http://schemas.openxmlformats.org/drawingml/2006/main" xmlns:r="http://schemas.openxmlformats.org/officeDocument/2006/relationships" xmlns:mc="http://schemas.openxmlformats.org/markup-compatibility/2006" xmlns:mv="urn:schemas-microsoft-com:mac:vml" xmlns:p="http://schemas.openxmlformats.org/presentationml/2006/main" mc:Ignorable="mv" mc:PreserveAttributes="mv:*">
+<p:sld xmlns:a="http://schemas.openxmlformats.org/drawingml/2006/main" xmlns:r="http://schemas.openxmlformats.org/officeDocument/2006/relationships" xmlns:p="http://schemas.openxmlformats.org/presentationml/2006/main">
   <p:cSld>
     <p:spTree>
       <p:nvGrpSpPr>
@@ -19324,8 +19081,8 @@
           </p:cNvPicPr>
           <p:nvPr/>
         </p:nvPicPr>
-        <mc:AlternateContent>
-          <mc:Choice xmlns:ma="http://schemas.microsoft.com/office/mac/drawingml/2008/main" Requires="ma">
+        <mc:AlternateContent xmlns:mc="http://schemas.openxmlformats.org/markup-compatibility/2006">
+          <mc:Choice xmlns:ma="http://schemas.microsoft.com/office/mac/drawingml/2008/main" xmlns:mv="urn:schemas-microsoft-com:mac:vml" xmlns="" Requires="ma">
             <p:blipFill>
               <a:blip r:embed="rId2"/>
               <a:stretch>
@@ -20290,7 +20047,7 @@
 </file>
 
 <file path=ppt/slides/slide34.xml><?xml version="1.0" encoding="utf-8"?>
-<p:sld xmlns:a="http://schemas.openxmlformats.org/drawingml/2006/main" xmlns:r="http://schemas.openxmlformats.org/officeDocument/2006/relationships" xmlns:mc="http://schemas.openxmlformats.org/markup-compatibility/2006" xmlns:mv="urn:schemas-microsoft-com:mac:vml" xmlns:p="http://schemas.openxmlformats.org/presentationml/2006/main" mc:Ignorable="mv" mc:PreserveAttributes="mv:*">
+<p:sld xmlns:a="http://schemas.openxmlformats.org/drawingml/2006/main" xmlns:r="http://schemas.openxmlformats.org/officeDocument/2006/relationships" xmlns:p="http://schemas.openxmlformats.org/presentationml/2006/main">
   <p:cSld>
     <p:spTree>
       <p:nvGrpSpPr>
@@ -20901,14 +20658,7 @@
                 <a:latin typeface="Courier New"/>
                 <a:cs typeface="Courier New"/>
               </a:rPr>
-              <a:t>v</a:t>
-            </a:r>
-            <a:r>
-              <a:rPr lang="en-US" sz="1400" i="0" dirty="0" smtClean="0">
-                <a:latin typeface="Courier New"/>
-                <a:cs typeface="Courier New"/>
-              </a:rPr>
-              <a:t>oid </a:t>
+              <a:t>void </a:t>
             </a:r>
             <a:r>
               <a:rPr lang="en-US" sz="1400" i="0" dirty="0" err="1" smtClean="0">
@@ -21017,15 +20767,7 @@
                 <a:ea typeface="宋体" pitchFamily="-65" charset="-128"/>
                 <a:cs typeface="Courier New" charset="0"/>
               </a:rPr>
-              <a:t>    writer </a:t>
-            </a:r>
-            <a:r>
-              <a:rPr lang="en-US" altLang="zh-CN" sz="1400" i="0" dirty="0" smtClean="0">
-                <a:latin typeface="Courier New" charset="0"/>
-                <a:ea typeface="宋体" pitchFamily="-65" charset="-128"/>
-                <a:cs typeface="Courier New" charset="0"/>
-              </a:rPr>
-              <a:t>=</a:t>
+              <a:t>    writer =</a:t>
             </a:r>
             <a:r>
               <a:rPr lang="en-US" sz="1400" i="0" dirty="0" smtClean="0">
@@ -21477,7 +21219,7 @@
 </file>
 
 <file path=ppt/slides/slide35.xml><?xml version="1.0" encoding="utf-8"?>
-<p:sld xmlns:a="http://schemas.openxmlformats.org/drawingml/2006/main" xmlns:r="http://schemas.openxmlformats.org/officeDocument/2006/relationships" xmlns:mc="http://schemas.openxmlformats.org/markup-compatibility/2006" xmlns:mv="urn:schemas-microsoft-com:mac:vml" xmlns:p="http://schemas.openxmlformats.org/presentationml/2006/main" mc:Ignorable="mv" mc:PreserveAttributes="mv:*">
+<p:sld xmlns:a="http://schemas.openxmlformats.org/drawingml/2006/main" xmlns:r="http://schemas.openxmlformats.org/officeDocument/2006/relationships" xmlns:p="http://schemas.openxmlformats.org/presentationml/2006/main">
   <p:cSld>
     <p:spTree>
       <p:nvGrpSpPr>
@@ -22611,7 +22353,33 @@
                 <a:effectLst/>
                 <a:latin typeface="Arial" pitchFamily="-65" charset="0"/>
               </a:rPr>
-              <a:t> World prototype currently only implements the </a:t>
+              <a:t> World prototype currently </a:t>
+            </a:r>
+            <a:r>
+              <a:rPr kumimoji="0" lang="en-US" sz="2400" b="1" i="0" u="none" strike="noStrike" cap="none" normalizeH="0" dirty="0" smtClean="0">
+                <a:ln>
+                  <a:noFill/>
+                </a:ln>
+                <a:solidFill>
+                  <a:srgbClr val="FF0000"/>
+                </a:solidFill>
+                <a:effectLst/>
+                <a:latin typeface="Arial" pitchFamily="-65" charset="0"/>
+              </a:rPr>
+              <a:t>implements </a:t>
+            </a:r>
+            <a:r>
+              <a:rPr kumimoji="0" lang="en-US" sz="2400" b="1" i="0" u="none" strike="noStrike" cap="none" normalizeH="0" dirty="0" smtClean="0">
+                <a:ln>
+                  <a:noFill/>
+                </a:ln>
+                <a:solidFill>
+                  <a:srgbClr val="FF0000"/>
+                </a:solidFill>
+                <a:effectLst/>
+                <a:latin typeface="Arial" pitchFamily="-65" charset="0"/>
+              </a:rPr>
+              <a:t>the </a:t>
             </a:r>
             <a:r>
               <a:rPr kumimoji="0" lang="en-US" sz="2400" b="1" i="0" u="none" strike="noStrike" cap="none" normalizeH="0" dirty="0" err="1" smtClean="0">
@@ -22637,7 +22405,20 @@
                 <a:effectLst/>
                 <a:latin typeface="Arial" pitchFamily="-65" charset="0"/>
               </a:rPr>
-              <a:t> port.</a:t>
+              <a:t> </a:t>
+            </a:r>
+            <a:r>
+              <a:rPr kumimoji="0" lang="en-US" sz="2400" b="1" i="0" u="none" strike="noStrike" cap="none" normalizeH="0" dirty="0" smtClean="0">
+                <a:ln>
+                  <a:noFill/>
+                </a:ln>
+                <a:solidFill>
+                  <a:srgbClr val="FF0000"/>
+                </a:solidFill>
+                <a:effectLst/>
+                <a:latin typeface="Arial" pitchFamily="-65" charset="0"/>
+              </a:rPr>
+              <a:t>port and part of the Reader port.</a:t>
             </a:r>
             <a:endParaRPr kumimoji="0" lang="en-US" sz="2400" b="1" i="0" u="none" strike="noStrike" cap="none" normalizeH="0" baseline="0" dirty="0">
               <a:ln>
@@ -22747,7 +22528,7 @@
 </file>
 
 <file path=ppt/slides/slide36.xml><?xml version="1.0" encoding="utf-8"?>
-<p:sld xmlns:a="http://schemas.openxmlformats.org/drawingml/2006/main" xmlns:r="http://schemas.openxmlformats.org/officeDocument/2006/relationships" xmlns:mc="http://schemas.openxmlformats.org/markup-compatibility/2006" xmlns:mv="urn:schemas-microsoft-com:mac:vml" xmlns:p="http://schemas.openxmlformats.org/presentationml/2006/main" mc:Ignorable="mv" mc:PreserveAttributes="mv:*">
+<p:sld xmlns:a="http://schemas.openxmlformats.org/drawingml/2006/main" xmlns:r="http://schemas.openxmlformats.org/officeDocument/2006/relationships" xmlns:p="http://schemas.openxmlformats.org/presentationml/2006/main">
   <p:cSld>
     <p:spTree>
       <p:nvGrpSpPr>
@@ -23014,15 +22795,7 @@
                 <a:ea typeface="宋体" pitchFamily="-65" charset="-128"/>
                 <a:cs typeface="Courier New" charset="0"/>
               </a:rPr>
-              <a:t>                  </a:t>
-            </a:r>
-            <a:r>
-              <a:rPr lang="en-US" altLang="zh-CN" sz="1400" i="0" dirty="0" smtClean="0">
-                <a:latin typeface="Courier New" charset="0"/>
-                <a:ea typeface="宋体" pitchFamily="-65" charset="-128"/>
-                <a:cs typeface="Courier New" charset="0"/>
-              </a:rPr>
-              <a:t>in </a:t>
+              <a:t>                  in </a:t>
             </a:r>
             <a:r>
               <a:rPr lang="en-US" altLang="zh-CN" sz="1400" i="0" dirty="0" err="1">
@@ -23115,15 +22888,7 @@
                 <a:ea typeface="宋体" pitchFamily="-65" charset="-128"/>
                 <a:cs typeface="Courier New" charset="0"/>
               </a:rPr>
-              <a:t> class</a:t>
-            </a:r>
-            <a:r>
-              <a:rPr lang="en-US" altLang="zh-CN" sz="1400" i="0" dirty="0" smtClean="0">
-                <a:latin typeface="Courier New" charset="0"/>
-                <a:ea typeface="宋体" pitchFamily="-65" charset="-128"/>
-                <a:cs typeface="Courier New" charset="0"/>
-              </a:rPr>
-              <a:t> </a:t>
+              <a:t> class </a:t>
             </a:r>
             <a:r>
               <a:rPr lang="en-US" altLang="zh-CN" sz="1400" i="0" dirty="0" err="1" smtClean="0">
@@ -23151,15 +22916,7 @@
                 <a:ea typeface="宋体" pitchFamily="-65" charset="-128"/>
                 <a:cs typeface="Courier New" charset="0"/>
               </a:rPr>
-              <a:t>    : public virtual</a:t>
-            </a:r>
-            <a:r>
-              <a:rPr lang="en-US" altLang="zh-CN" sz="1400" i="0" dirty="0" smtClean="0">
-                <a:latin typeface="Courier New" charset="0"/>
-                <a:ea typeface="宋体" pitchFamily="-65" charset="-128"/>
-                <a:cs typeface="Courier New" charset="0"/>
-              </a:rPr>
-              <a:t> </a:t>
+              <a:t>    : public virtual </a:t>
             </a:r>
           </a:p>
           <a:p>
@@ -23174,15 +22931,7 @@
                 <a:ea typeface="宋体" pitchFamily="-65" charset="-128"/>
                 <a:cs typeface="Courier New" charset="0"/>
               </a:rPr>
-              <a:t>       :</a:t>
-            </a:r>
-            <a:r>
-              <a:rPr lang="en-US" altLang="zh-CN" sz="1400" i="0" dirty="0" smtClean="0">
-                <a:latin typeface="Courier New" charset="0"/>
-                <a:ea typeface="宋体" pitchFamily="-65" charset="-128"/>
-                <a:cs typeface="Courier New" charset="0"/>
-              </a:rPr>
-              <a:t>:</a:t>
+              <a:t>       ::</a:t>
             </a:r>
             <a:r>
               <a:rPr lang="en-US" altLang="zh-CN" sz="1400" i="0" dirty="0" err="1" smtClean="0">
@@ -23213,15 +22962,7 @@
                 <a:ea typeface="宋体" pitchFamily="-65" charset="-128"/>
                 <a:cs typeface="Courier New" charset="0"/>
               </a:rPr>
-              <a:t>      public virtual</a:t>
-            </a:r>
-            <a:r>
-              <a:rPr lang="en-US" altLang="zh-CN" sz="1400" i="0" dirty="0" smtClean="0">
-                <a:latin typeface="Courier New" charset="0"/>
-                <a:ea typeface="宋体" pitchFamily="-65" charset="-128"/>
-                <a:cs typeface="Courier New" charset="0"/>
-              </a:rPr>
-              <a:t> </a:t>
+              <a:t>      public virtual </a:t>
             </a:r>
           </a:p>
           <a:p>
@@ -23236,15 +22977,7 @@
                 <a:ea typeface="宋体" pitchFamily="-65" charset="-128"/>
                 <a:cs typeface="Courier New" charset="0"/>
               </a:rPr>
-              <a:t>       :</a:t>
-            </a:r>
-            <a:r>
-              <a:rPr lang="en-US" altLang="zh-CN" sz="1400" i="0" dirty="0" smtClean="0">
-                <a:latin typeface="Courier New" charset="0"/>
-                <a:ea typeface="宋体" pitchFamily="-65" charset="-128"/>
-                <a:cs typeface="Courier New" charset="0"/>
-              </a:rPr>
-              <a:t>:</a:t>
+              <a:t>       ::</a:t>
             </a:r>
             <a:r>
               <a:rPr lang="en-US" altLang="zh-CN" sz="1400" i="0" dirty="0" err="1" smtClean="0">
@@ -23274,11 +23007,6 @@
               </a:rPr>
               <a:t>{</a:t>
             </a:r>
-            <a:endParaRPr lang="en-US" altLang="zh-CN" sz="1400" i="0" dirty="0" smtClean="0">
-              <a:latin typeface="Courier New" charset="0"/>
-              <a:ea typeface="宋体" pitchFamily="-65" charset="-128"/>
-              <a:cs typeface="Courier New" charset="0"/>
-            </a:endParaRPr>
           </a:p>
           <a:p>
             <a:pPr marL="169863" indent="-169863">
@@ -23369,7 +23097,15 @@
                 <a:ea typeface="宋体" pitchFamily="-65" charset="-128"/>
                 <a:cs typeface="Courier New" charset="0"/>
               </a:rPr>
-              <a:t>     </a:t>
+              <a:t>      const ::</a:t>
+            </a:r>
+            <a:r>
+              <a:rPr lang="en-US" altLang="zh-CN" sz="1400" i="0" dirty="0" err="1" smtClean="0">
+                <a:latin typeface="Courier New" charset="0"/>
+                <a:ea typeface="宋体" pitchFamily="-65" charset="-128"/>
+                <a:cs typeface="Courier New" charset="0"/>
+              </a:rPr>
+              <a:t>CCM_DDS::ReadInfo</a:t>
             </a:r>
             <a:r>
               <a:rPr lang="en-US" altLang="zh-CN" sz="1400" i="0" dirty="0" smtClean="0">
@@ -23377,39 +23113,7 @@
                 <a:ea typeface="宋体" pitchFamily="-65" charset="-128"/>
                 <a:cs typeface="Courier New" charset="0"/>
               </a:rPr>
-              <a:t> const </a:t>
-            </a:r>
-            <a:r>
-              <a:rPr lang="en-US" altLang="zh-CN" sz="1400" i="0" dirty="0" smtClean="0">
-                <a:latin typeface="Courier New" charset="0"/>
-                <a:ea typeface="宋体" pitchFamily="-65" charset="-128"/>
-                <a:cs typeface="Courier New" charset="0"/>
-              </a:rPr>
-              <a:t>::</a:t>
-            </a:r>
-            <a:r>
-              <a:rPr lang="en-US" altLang="zh-CN" sz="1400" i="0" dirty="0" err="1" smtClean="0">
-                <a:latin typeface="Courier New" charset="0"/>
-                <a:ea typeface="宋体" pitchFamily="-65" charset="-128"/>
-                <a:cs typeface="Courier New" charset="0"/>
-              </a:rPr>
-              <a:t>CCM_DDS::ReadInfo</a:t>
-            </a:r>
-            <a:r>
-              <a:rPr lang="en-US" altLang="zh-CN" sz="1400" i="0" dirty="0" smtClean="0">
-                <a:latin typeface="Courier New" charset="0"/>
-                <a:ea typeface="宋体" pitchFamily="-65" charset="-128"/>
-                <a:cs typeface="Courier New" charset="0"/>
-              </a:rPr>
-              <a:t> &amp; info</a:t>
-            </a:r>
-            <a:r>
-              <a:rPr lang="en-US" altLang="zh-CN" sz="1400" i="0" dirty="0" smtClean="0">
-                <a:latin typeface="Courier New" charset="0"/>
-                <a:ea typeface="宋体" pitchFamily="-65" charset="-128"/>
-                <a:cs typeface="Courier New" charset="0"/>
-              </a:rPr>
-              <a:t>)</a:t>
+              <a:t> &amp; info)</a:t>
             </a:r>
           </a:p>
           <a:p>
@@ -23971,23 +23675,7 @@
                 <a:ea typeface="宋体" pitchFamily="-65" charset="-128"/>
                 <a:cs typeface="Courier New" charset="0"/>
               </a:rPr>
-              <a:t> </a:t>
-            </a:r>
-            <a:r>
-              <a:rPr lang="en-US" altLang="zh-CN" sz="1400" i="0" dirty="0" smtClean="0">
-                <a:latin typeface="Courier New" charset="0"/>
-                <a:ea typeface="宋体" pitchFamily="-65" charset="-128"/>
-                <a:cs typeface="Courier New" charset="0"/>
-              </a:rPr>
-              <a:t>virtual</a:t>
-            </a:r>
-            <a:r>
-              <a:rPr lang="en-US" altLang="zh-CN" sz="1400" i="0" dirty="0" smtClean="0">
-                <a:latin typeface="Courier New" charset="0"/>
-                <a:ea typeface="宋体" pitchFamily="-65" charset="-128"/>
-                <a:cs typeface="Courier New" charset="0"/>
-              </a:rPr>
-              <a:t> </a:t>
+              <a:t> virtual </a:t>
             </a:r>
           </a:p>
           <a:p>
@@ -24002,15 +23690,7 @@
                 <a:ea typeface="宋体" pitchFamily="-65" charset="-128"/>
                 <a:cs typeface="Courier New" charset="0"/>
               </a:rPr>
-              <a:t>:</a:t>
-            </a:r>
-            <a:r>
-              <a:rPr lang="en-US" altLang="zh-CN" sz="1400" i="0" dirty="0" smtClean="0">
-                <a:latin typeface="Courier New" charset="0"/>
-                <a:ea typeface="宋体" pitchFamily="-65" charset="-128"/>
-                <a:cs typeface="Courier New" charset="0"/>
-              </a:rPr>
-              <a:t>:</a:t>
+              <a:t>::</a:t>
             </a:r>
             <a:r>
               <a:rPr lang="en-US" altLang="zh-CN" sz="1400" i="0" dirty="0" err="1" smtClean="0">
@@ -24054,15 +23734,7 @@
                 <a:ea typeface="宋体" pitchFamily="-65" charset="-128"/>
                 <a:cs typeface="Courier New" charset="0"/>
               </a:rPr>
-              <a:t> (void</a:t>
-            </a:r>
-            <a:r>
-              <a:rPr lang="en-US" altLang="zh-CN" sz="1400" i="0" dirty="0" smtClean="0">
-                <a:latin typeface="Courier New" charset="0"/>
-                <a:ea typeface="宋体" pitchFamily="-65" charset="-128"/>
-                <a:cs typeface="Courier New" charset="0"/>
-              </a:rPr>
-              <a:t>) {</a:t>
+              <a:t> (void) {</a:t>
             </a:r>
           </a:p>
           <a:p>
@@ -24256,7 +23928,7 @@
 </file>
 
 <file path=ppt/slides/slide37.xml><?xml version="1.0" encoding="utf-8"?>
-<p:sld xmlns:a="http://schemas.openxmlformats.org/drawingml/2006/main" xmlns:r="http://schemas.openxmlformats.org/officeDocument/2006/relationships" xmlns:mc="http://schemas.openxmlformats.org/markup-compatibility/2006" xmlns:mv="urn:schemas-microsoft-com:mac:vml" xmlns:p="http://schemas.openxmlformats.org/presentationml/2006/main" mc:Ignorable="mv" mc:PreserveAttributes="mv:*">
+<p:sld xmlns:a="http://schemas.openxmlformats.org/drawingml/2006/main" xmlns:r="http://schemas.openxmlformats.org/officeDocument/2006/relationships" xmlns:p="http://schemas.openxmlformats.org/presentationml/2006/main">
   <p:cSld>
     <p:spTree>
       <p:nvGrpSpPr>
@@ -24559,7 +24231,7 @@
 </file>
 
 <file path=ppt/slides/slide38.xml><?xml version="1.0" encoding="utf-8"?>
-<p:sld xmlns:a="http://schemas.openxmlformats.org/drawingml/2006/main" xmlns:r="http://schemas.openxmlformats.org/officeDocument/2006/relationships" xmlns:mc="http://schemas.openxmlformats.org/markup-compatibility/2006" xmlns:mv="urn:schemas-microsoft-com:mac:vml" xmlns:p="http://schemas.openxmlformats.org/presentationml/2006/main" mc:Ignorable="mv" mc:PreserveAttributes="mv:*">
+<p:sld xmlns:a="http://schemas.openxmlformats.org/drawingml/2006/main" xmlns:r="http://schemas.openxmlformats.org/officeDocument/2006/relationships" xmlns:p="http://schemas.openxmlformats.org/presentationml/2006/main">
   <p:cSld>
     <p:spTree>
       <p:nvGrpSpPr>
@@ -24682,7 +24354,7 @@
 </file>
 
 <file path=ppt/slides/slide39.xml><?xml version="1.0" encoding="utf-8"?>
-<p:sld xmlns:a="http://schemas.openxmlformats.org/drawingml/2006/main" xmlns:r="http://schemas.openxmlformats.org/officeDocument/2006/relationships" xmlns:mc="http://schemas.openxmlformats.org/markup-compatibility/2006" xmlns:mv="urn:schemas-microsoft-com:mac:vml" xmlns:p="http://schemas.openxmlformats.org/presentationml/2006/main" mc:Ignorable="mv" mc:PreserveAttributes="mv:*">
+<p:sld xmlns:a="http://schemas.openxmlformats.org/drawingml/2006/main" xmlns:r="http://schemas.openxmlformats.org/officeDocument/2006/relationships" xmlns:p="http://schemas.openxmlformats.org/presentationml/2006/main">
   <p:cSld>
     <p:spTree>
       <p:nvGrpSpPr>
@@ -24920,7 +24592,7 @@
 </file>
 
 <file path=ppt/slides/slide4.xml><?xml version="1.0" encoding="utf-8"?>
-<p:sld xmlns:a="http://schemas.openxmlformats.org/drawingml/2006/main" xmlns:r="http://schemas.openxmlformats.org/officeDocument/2006/relationships" xmlns:mc="http://schemas.openxmlformats.org/markup-compatibility/2006" xmlns:mv="urn:schemas-microsoft-com:mac:vml" xmlns:p="http://schemas.openxmlformats.org/presentationml/2006/main" mc:Ignorable="mv" mc:PreserveAttributes="mv:*">
+<p:sld xmlns:a="http://schemas.openxmlformats.org/drawingml/2006/main" xmlns:r="http://schemas.openxmlformats.org/officeDocument/2006/relationships" xmlns:p="http://schemas.openxmlformats.org/presentationml/2006/main">
   <p:cSld>
     <p:spTree>
       <p:nvGrpSpPr>
@@ -25213,7 +24885,7 @@
 </file>
 
 <file path=ppt/slides/slide40.xml><?xml version="1.0" encoding="utf-8"?>
-<p:sld xmlns:a="http://schemas.openxmlformats.org/drawingml/2006/main" xmlns:r="http://schemas.openxmlformats.org/officeDocument/2006/relationships" xmlns:mc="http://schemas.openxmlformats.org/markup-compatibility/2006" xmlns:mv="urn:schemas-microsoft-com:mac:vml" xmlns:p="http://schemas.openxmlformats.org/presentationml/2006/main" mc:Ignorable="mv" mc:PreserveAttributes="mv:*">
+<p:sld xmlns:a="http://schemas.openxmlformats.org/drawingml/2006/main" xmlns:r="http://schemas.openxmlformats.org/officeDocument/2006/relationships" xmlns:p="http://schemas.openxmlformats.org/presentationml/2006/main">
   <p:cSld>
     <p:spTree>
       <p:nvGrpSpPr>
@@ -25454,7 +25126,7 @@
 </file>
 
 <file path=ppt/slides/slide41.xml><?xml version="1.0" encoding="utf-8"?>
-<p:sld xmlns:a="http://schemas.openxmlformats.org/drawingml/2006/main" xmlns:r="http://schemas.openxmlformats.org/officeDocument/2006/relationships" xmlns:mc="http://schemas.openxmlformats.org/markup-compatibility/2006" xmlns:mv="urn:schemas-microsoft-com:mac:vml" xmlns:p="http://schemas.openxmlformats.org/presentationml/2006/main" mc:Ignorable="mv" mc:PreserveAttributes="mv:*">
+<p:sld xmlns:a="http://schemas.openxmlformats.org/drawingml/2006/main" xmlns:r="http://schemas.openxmlformats.org/officeDocument/2006/relationships" xmlns:p="http://schemas.openxmlformats.org/presentationml/2006/main">
   <p:cSld>
     <p:spTree>
       <p:nvGrpSpPr>
@@ -25660,7 +25332,7 @@
 </file>
 
 <file path=ppt/slides/slide42.xml><?xml version="1.0" encoding="utf-8"?>
-<p:sld xmlns:a="http://schemas.openxmlformats.org/drawingml/2006/main" xmlns:r="http://schemas.openxmlformats.org/officeDocument/2006/relationships" xmlns:mc="http://schemas.openxmlformats.org/markup-compatibility/2006" xmlns:mv="urn:schemas-microsoft-com:mac:vml" xmlns:p="http://schemas.openxmlformats.org/presentationml/2006/main" mc:Ignorable="mv" mc:PreserveAttributes="mv:*">
+<p:sld xmlns:a="http://schemas.openxmlformats.org/drawingml/2006/main" xmlns:r="http://schemas.openxmlformats.org/officeDocument/2006/relationships" xmlns:p="http://schemas.openxmlformats.org/presentationml/2006/main">
   <p:cSld>
     <p:spTree>
       <p:nvGrpSpPr>
@@ -25983,7 +25655,7 @@
 </file>
 
 <file path=ppt/slides/slide43.xml><?xml version="1.0" encoding="utf-8"?>
-<p:sld xmlns:a="http://schemas.openxmlformats.org/drawingml/2006/main" xmlns:r="http://schemas.openxmlformats.org/officeDocument/2006/relationships" xmlns:mc="http://schemas.openxmlformats.org/markup-compatibility/2006" xmlns:mv="urn:schemas-microsoft-com:mac:vml" xmlns:p="http://schemas.openxmlformats.org/presentationml/2006/main" mc:Ignorable="mv" mc:PreserveAttributes="mv:*">
+<p:sld xmlns:a="http://schemas.openxmlformats.org/drawingml/2006/main" xmlns:r="http://schemas.openxmlformats.org/officeDocument/2006/relationships" xmlns:p="http://schemas.openxmlformats.org/presentationml/2006/main">
   <p:cSld>
     <p:spTree>
       <p:nvGrpSpPr>
@@ -26216,7 +25888,7 @@
 </file>
 
 <file path=ppt/slides/slide44.xml><?xml version="1.0" encoding="utf-8"?>
-<p:sld xmlns:a="http://schemas.openxmlformats.org/drawingml/2006/main" xmlns:r="http://schemas.openxmlformats.org/officeDocument/2006/relationships" xmlns:mc="http://schemas.openxmlformats.org/markup-compatibility/2006" xmlns:mv="urn:schemas-microsoft-com:mac:vml" xmlns:p="http://schemas.openxmlformats.org/presentationml/2006/main" mc:Ignorable="mv" mc:PreserveAttributes="mv:*">
+<p:sld xmlns:a="http://schemas.openxmlformats.org/drawingml/2006/main" xmlns:r="http://schemas.openxmlformats.org/officeDocument/2006/relationships" xmlns:p="http://schemas.openxmlformats.org/presentationml/2006/main">
   <p:cSld>
     <p:spTree>
       <p:nvGrpSpPr>
@@ -26526,7 +26198,7 @@
 </file>
 
 <file path=ppt/slides/slide45.xml><?xml version="1.0" encoding="utf-8"?>
-<p:sld xmlns:a="http://schemas.openxmlformats.org/drawingml/2006/main" xmlns:r="http://schemas.openxmlformats.org/officeDocument/2006/relationships" xmlns:mc="http://schemas.openxmlformats.org/markup-compatibility/2006" xmlns:mv="urn:schemas-microsoft-com:mac:vml" xmlns:p="http://schemas.openxmlformats.org/presentationml/2006/main" mc:Ignorable="mv" mc:PreserveAttributes="mv:*">
+<p:sld xmlns:a="http://schemas.openxmlformats.org/drawingml/2006/main" xmlns:r="http://schemas.openxmlformats.org/officeDocument/2006/relationships" xmlns:p="http://schemas.openxmlformats.org/presentationml/2006/main">
   <p:cSld>
     <p:spTree>
       <p:nvGrpSpPr>
@@ -26813,7 +26485,7 @@
 </file>
 
 <file path=ppt/slides/slide46.xml><?xml version="1.0" encoding="utf-8"?>
-<p:sld xmlns:a="http://schemas.openxmlformats.org/drawingml/2006/main" xmlns:r="http://schemas.openxmlformats.org/officeDocument/2006/relationships" xmlns:mc="http://schemas.openxmlformats.org/markup-compatibility/2006" xmlns:mv="urn:schemas-microsoft-com:mac:vml" xmlns:p="http://schemas.openxmlformats.org/presentationml/2006/main" mc:Ignorable="mv" mc:PreserveAttributes="mv:*">
+<p:sld xmlns:a="http://schemas.openxmlformats.org/drawingml/2006/main" xmlns:r="http://schemas.openxmlformats.org/officeDocument/2006/relationships" xmlns:p="http://schemas.openxmlformats.org/presentationml/2006/main">
   <p:cSld>
     <p:spTree>
       <p:nvGrpSpPr>
@@ -27164,7 +26836,7 @@
 </file>
 
 <file path=ppt/slides/slide47.xml><?xml version="1.0" encoding="utf-8"?>
-<p:sld xmlns:a="http://schemas.openxmlformats.org/drawingml/2006/main" xmlns:r="http://schemas.openxmlformats.org/officeDocument/2006/relationships" xmlns:mc="http://schemas.openxmlformats.org/markup-compatibility/2006" xmlns:mv="urn:schemas-microsoft-com:mac:vml" xmlns:p="http://schemas.openxmlformats.org/presentationml/2006/main" mc:Ignorable="mv" mc:PreserveAttributes="mv:*">
+<p:sld xmlns:a="http://schemas.openxmlformats.org/drawingml/2006/main" xmlns:r="http://schemas.openxmlformats.org/officeDocument/2006/relationships" xmlns:p="http://schemas.openxmlformats.org/presentationml/2006/main">
   <p:cSld>
     <p:spTree>
       <p:nvGrpSpPr>
@@ -27494,7 +27166,7 @@
 </file>
 
 <file path=ppt/slides/slide48.xml><?xml version="1.0" encoding="utf-8"?>
-<p:sld xmlns:a="http://schemas.openxmlformats.org/drawingml/2006/main" xmlns:r="http://schemas.openxmlformats.org/officeDocument/2006/relationships" xmlns:mc="http://schemas.openxmlformats.org/markup-compatibility/2006" xmlns:mv="urn:schemas-microsoft-com:mac:vml" xmlns:p="http://schemas.openxmlformats.org/presentationml/2006/main" mc:Ignorable="mv" mc:PreserveAttributes="mv:*">
+<p:sld xmlns:a="http://schemas.openxmlformats.org/drawingml/2006/main" xmlns:r="http://schemas.openxmlformats.org/officeDocument/2006/relationships" xmlns:p="http://schemas.openxmlformats.org/presentationml/2006/main">
   <p:cSld>
     <p:spTree>
       <p:nvGrpSpPr>
@@ -27770,7 +27442,7 @@
 </file>
 
 <file path=ppt/slides/slide49.xml><?xml version="1.0" encoding="utf-8"?>
-<p:sld xmlns:a="http://schemas.openxmlformats.org/drawingml/2006/main" xmlns:r="http://schemas.openxmlformats.org/officeDocument/2006/relationships" xmlns:mc="http://schemas.openxmlformats.org/markup-compatibility/2006" xmlns:mv="urn:schemas-microsoft-com:mac:vml" xmlns:p="http://schemas.openxmlformats.org/presentationml/2006/main" mc:Ignorable="mv" mc:PreserveAttributes="mv:*">
+<p:sld xmlns:a="http://schemas.openxmlformats.org/drawingml/2006/main" xmlns:r="http://schemas.openxmlformats.org/officeDocument/2006/relationships" xmlns:p="http://schemas.openxmlformats.org/presentationml/2006/main">
   <p:cSld>
     <p:spTree>
       <p:nvGrpSpPr>
@@ -28033,7 +27705,7 @@
 </file>
 
 <file path=ppt/slides/slide5.xml><?xml version="1.0" encoding="utf-8"?>
-<p:sld xmlns:a="http://schemas.openxmlformats.org/drawingml/2006/main" xmlns:r="http://schemas.openxmlformats.org/officeDocument/2006/relationships" xmlns:mc="http://schemas.openxmlformats.org/markup-compatibility/2006" xmlns:mv="urn:schemas-microsoft-com:mac:vml" xmlns:p="http://schemas.openxmlformats.org/presentationml/2006/main" mc:Ignorable="mv" mc:PreserveAttributes="mv:*">
+<p:sld xmlns:a="http://schemas.openxmlformats.org/drawingml/2006/main" xmlns:r="http://schemas.openxmlformats.org/officeDocument/2006/relationships" xmlns:p="http://schemas.openxmlformats.org/presentationml/2006/main">
   <p:cSld>
     <p:spTree>
       <p:nvGrpSpPr>
@@ -28299,7 +27971,7 @@
 </file>
 
 <file path=ppt/slides/slide50.xml><?xml version="1.0" encoding="utf-8"?>
-<p:sld xmlns:a="http://schemas.openxmlformats.org/drawingml/2006/main" xmlns:r="http://schemas.openxmlformats.org/officeDocument/2006/relationships" xmlns:mc="http://schemas.openxmlformats.org/markup-compatibility/2006" xmlns:mv="urn:schemas-microsoft-com:mac:vml" xmlns:p="http://schemas.openxmlformats.org/presentationml/2006/main" mc:Ignorable="mv" mc:PreserveAttributes="mv:*">
+<p:sld xmlns:a="http://schemas.openxmlformats.org/drawingml/2006/main" xmlns:r="http://schemas.openxmlformats.org/officeDocument/2006/relationships" xmlns:p="http://schemas.openxmlformats.org/presentationml/2006/main">
   <p:cSld>
     <p:spTree>
       <p:nvGrpSpPr>
@@ -28648,7 +28320,7 @@
 </file>
 
 <file path=ppt/slides/slide51.xml><?xml version="1.0" encoding="utf-8"?>
-<p:sld xmlns:a="http://schemas.openxmlformats.org/drawingml/2006/main" xmlns:r="http://schemas.openxmlformats.org/officeDocument/2006/relationships" xmlns:mc="http://schemas.openxmlformats.org/markup-compatibility/2006" xmlns:mv="urn:schemas-microsoft-com:mac:vml" xmlns:p="http://schemas.openxmlformats.org/presentationml/2006/main" mc:Ignorable="mv" mc:PreserveAttributes="mv:*">
+<p:sld xmlns:a="http://schemas.openxmlformats.org/drawingml/2006/main" xmlns:r="http://schemas.openxmlformats.org/officeDocument/2006/relationships" xmlns:p="http://schemas.openxmlformats.org/presentationml/2006/main">
   <p:cSld>
     <p:spTree>
       <p:nvGrpSpPr>
@@ -28849,7 +28521,7 @@
 </file>
 
 <file path=ppt/slides/slide6.xml><?xml version="1.0" encoding="utf-8"?>
-<p:sld xmlns:a="http://schemas.openxmlformats.org/drawingml/2006/main" xmlns:r="http://schemas.openxmlformats.org/officeDocument/2006/relationships" xmlns:mc="http://schemas.openxmlformats.org/markup-compatibility/2006" xmlns:mv="urn:schemas-microsoft-com:mac:vml" xmlns:p="http://schemas.openxmlformats.org/presentationml/2006/main" mc:Ignorable="mv" mc:PreserveAttributes="mv:*">
+<p:sld xmlns:a="http://schemas.openxmlformats.org/drawingml/2006/main" xmlns:r="http://schemas.openxmlformats.org/officeDocument/2006/relationships" xmlns:p="http://schemas.openxmlformats.org/presentationml/2006/main">
   <p:cSld>
     <p:spTree>
       <p:nvGrpSpPr>
@@ -28965,7 +28637,7 @@
 </file>
 
 <file path=ppt/slides/slide7.xml><?xml version="1.0" encoding="utf-8"?>
-<p:sld xmlns:a="http://schemas.openxmlformats.org/drawingml/2006/main" xmlns:r="http://schemas.openxmlformats.org/officeDocument/2006/relationships" xmlns:mc="http://schemas.openxmlformats.org/markup-compatibility/2006" xmlns:mv="urn:schemas-microsoft-com:mac:vml" xmlns:p="http://schemas.openxmlformats.org/presentationml/2006/main" mc:Ignorable="mv" mc:PreserveAttributes="mv:*">
+<p:sld xmlns:a="http://schemas.openxmlformats.org/drawingml/2006/main" xmlns:r="http://schemas.openxmlformats.org/officeDocument/2006/relationships" xmlns:p="http://schemas.openxmlformats.org/presentationml/2006/main">
   <p:cSld>
     <p:spTree>
       <p:nvGrpSpPr>
@@ -29203,21 +28875,7 @@
                 <a:ea typeface="宋体" pitchFamily="-65" charset="-128"/>
                 <a:cs typeface="Times New Roman" charset="0"/>
               </a:rPr>
-              <a:t>Solution – Create an ‘extended’ port type that may be</a:t>
-            </a:r>
-            <a:r>
-              <a:rPr lang="en-US" altLang="zh-CN" sz="2000" i="0" dirty="0" smtClean="0">
-                <a:ea typeface="宋体" pitchFamily="-65" charset="-128"/>
-                <a:cs typeface="Times New Roman" charset="0"/>
-              </a:rPr>
-              <a:t> offered </a:t>
-            </a:r>
-            <a:r>
-              <a:rPr lang="en-US" altLang="zh-CN" sz="2000" i="0" dirty="0" smtClean="0">
-                <a:ea typeface="宋体" pitchFamily="-65" charset="-128"/>
-                <a:cs typeface="Times New Roman" charset="0"/>
-              </a:rPr>
-              <a:t>by a component</a:t>
+              <a:t>Solution – Create an ‘extended’ port type that may be offered by a component</a:t>
             </a:r>
           </a:p>
           <a:p>
@@ -29297,7 +28955,7 @@
 </file>
 
 <file path=ppt/slides/slide8.xml><?xml version="1.0" encoding="utf-8"?>
-<p:sld xmlns:a="http://schemas.openxmlformats.org/drawingml/2006/main" xmlns:r="http://schemas.openxmlformats.org/officeDocument/2006/relationships" xmlns:mc="http://schemas.openxmlformats.org/markup-compatibility/2006" xmlns:mv="urn:schemas-microsoft-com:mac:vml" xmlns:p="http://schemas.openxmlformats.org/presentationml/2006/main" mc:Ignorable="mv" mc:PreserveAttributes="mv:*">
+<p:sld xmlns:a="http://schemas.openxmlformats.org/drawingml/2006/main" xmlns:r="http://schemas.openxmlformats.org/officeDocument/2006/relationships" xmlns:p="http://schemas.openxmlformats.org/presentationml/2006/main">
   <p:cSld>
     <p:spTree>
       <p:nvGrpSpPr>
@@ -29638,7 +29296,7 @@
 </file>
 
 <file path=ppt/slides/slide9.xml><?xml version="1.0" encoding="utf-8"?>
-<p:sld xmlns:a="http://schemas.openxmlformats.org/drawingml/2006/main" xmlns:r="http://schemas.openxmlformats.org/officeDocument/2006/relationships" xmlns:mc="http://schemas.openxmlformats.org/markup-compatibility/2006" xmlns:mv="urn:schemas-microsoft-com:mac:vml" xmlns:p="http://schemas.openxmlformats.org/presentationml/2006/main" mc:Ignorable="mv" mc:PreserveAttributes="mv:*">
+<p:sld xmlns:a="http://schemas.openxmlformats.org/drawingml/2006/main" xmlns:r="http://schemas.openxmlformats.org/officeDocument/2006/relationships" xmlns:p="http://schemas.openxmlformats.org/presentationml/2006/main">
   <p:cSld>
     <p:spTree>
       <p:nvGrpSpPr>

</xml_diff>

<commit_message>
mention usage of port/mirrorport/porttype
</commit_message>
<xml_diff>
--- a/branches/dds_ports/modules/CIAO/docs/Connectors.pptx
+++ b/branches/dds_ports/modules/CIAO/docs/Connectors.pptx
@@ -20795,26 +20795,18 @@
                 <a:ea typeface="宋体" pitchFamily="-65" charset="-128"/>
                 <a:cs typeface="Courier New" charset="0"/>
               </a:rPr>
-              <a:t>    </a:t>
-            </a:r>
-            <a:r>
-              <a:rPr lang="en-US" altLang="zh-CN" sz="1400" i="0" smtClean="0">
+              <a:t>    writer </a:t>
+            </a:r>
+            <a:r>
+              <a:rPr lang="en-US" altLang="zh-CN" sz="1400" i="0" dirty="0" smtClean="0">
                 <a:latin typeface="Courier New" charset="0"/>
                 <a:ea typeface="宋体" pitchFamily="-65" charset="-128"/>
                 <a:cs typeface="Courier New" charset="0"/>
               </a:rPr>
-              <a:t>writer </a:t>
-            </a:r>
-            <a:r>
-              <a:rPr lang="en-US" altLang="zh-CN" sz="1400" i="0" smtClean="0">
-                <a:latin typeface="Courier New" charset="0"/>
-                <a:ea typeface="宋体" pitchFamily="-65" charset="-128"/>
-                <a:cs typeface="Courier New" charset="0"/>
-              </a:rPr>
               <a:t>= </a:t>
             </a:r>
             <a:r>
-              <a:rPr lang="en-US" sz="1400" i="0" smtClean="0">
+              <a:rPr lang="en-US" sz="1400" i="0" dirty="0" smtClean="0">
                 <a:latin typeface="Courier New"/>
                 <a:cs typeface="Courier New"/>
               </a:rPr>
@@ -24585,8 +24577,88 @@
                 <a:ea typeface="宋体" pitchFamily="-65" charset="-128"/>
                 <a:cs typeface="Times New Roman" charset="0"/>
               </a:rPr>
-              <a:t>AMI4CCM doesn’t use IDL3+, just IDL3</a:t>
-            </a:r>
+              <a:t>AMI4CCM </a:t>
+            </a:r>
+            <a:r>
+              <a:rPr lang="en-US" altLang="zh-CN" sz="2200" i="0" dirty="0" smtClean="0">
+                <a:ea typeface="宋体" pitchFamily="-65" charset="-128"/>
+                <a:cs typeface="Times New Roman" charset="0"/>
+              </a:rPr>
+              <a:t>will use </a:t>
+            </a:r>
+            <a:r>
+              <a:rPr lang="en-US" altLang="zh-CN" sz="2200" i="0" dirty="0">
+                <a:ea typeface="宋体" pitchFamily="-65" charset="-128"/>
+                <a:cs typeface="Times New Roman" charset="0"/>
+              </a:rPr>
+              <a:t>IDL3</a:t>
+            </a:r>
+            <a:r>
+              <a:rPr lang="en-US" altLang="zh-CN" sz="2200" i="0" dirty="0" smtClean="0">
+                <a:ea typeface="宋体" pitchFamily="-65" charset="-128"/>
+                <a:cs typeface="Times New Roman" charset="0"/>
+              </a:rPr>
+              <a:t>+ </a:t>
+            </a:r>
+            <a:r>
+              <a:rPr lang="en-US" altLang="zh-CN" sz="2200" i="0" dirty="0" err="1" smtClean="0">
+                <a:ea typeface="宋体" pitchFamily="-65" charset="-128"/>
+                <a:cs typeface="Times New Roman" charset="0"/>
+              </a:rPr>
+              <a:t>porttype</a:t>
+            </a:r>
+            <a:r>
+              <a:rPr lang="en-US" altLang="zh-CN" sz="2200" i="0" dirty="0" smtClean="0">
+                <a:ea typeface="宋体" pitchFamily="-65" charset="-128"/>
+                <a:cs typeface="Times New Roman" charset="0"/>
+              </a:rPr>
+              <a:t>/port/</a:t>
+            </a:r>
+            <a:r>
+              <a:rPr lang="en-US" altLang="zh-CN" sz="2200" i="0" dirty="0" err="1" smtClean="0">
+                <a:ea typeface="宋体" pitchFamily="-65" charset="-128"/>
+                <a:cs typeface="Times New Roman" charset="0"/>
+              </a:rPr>
+              <a:t>mirrorport</a:t>
+            </a:r>
+            <a:endParaRPr lang="en-US" altLang="zh-CN" sz="2200" i="0" dirty="0" smtClean="0">
+              <a:ea typeface="宋体" pitchFamily="-65" charset="-128"/>
+              <a:cs typeface="Times New Roman" charset="0"/>
+            </a:endParaRPr>
+          </a:p>
+          <a:p>
+            <a:pPr marL="169863" indent="-169863">
+              <a:spcBef>
+                <a:spcPct val="40000"/>
+              </a:spcBef>
+              <a:buFontTx/>
+              <a:buChar char="•"/>
+            </a:pPr>
+            <a:r>
+              <a:rPr lang="en-US" altLang="zh-CN" sz="2200" i="0" dirty="0" smtClean="0">
+                <a:ea typeface="宋体" pitchFamily="-65" charset="-128"/>
+                <a:cs typeface="Times New Roman" charset="0"/>
+              </a:rPr>
+              <a:t>AMI4CCM doesn’t use </a:t>
+            </a:r>
+            <a:r>
+              <a:rPr lang="en-US" altLang="zh-CN" sz="2200" i="0" dirty="0" err="1" smtClean="0">
+                <a:ea typeface="宋体" pitchFamily="-65" charset="-128"/>
+                <a:cs typeface="Times New Roman" charset="0"/>
+              </a:rPr>
+              <a:t>templated</a:t>
+            </a:r>
+            <a:r>
+              <a:rPr lang="en-US" altLang="zh-CN" sz="2200" i="0" dirty="0" smtClean="0">
+                <a:ea typeface="宋体" pitchFamily="-65" charset="-128"/>
+                <a:cs typeface="Times New Roman" charset="0"/>
+              </a:rPr>
+              <a:t> interfaces</a:t>
+            </a:r>
+            <a:endParaRPr lang="en-US" altLang="zh-CN" sz="2200" i="0" dirty="0">
+              <a:ea typeface="宋体" pitchFamily="-65" charset="-128"/>
+              <a:cs typeface="Times New Roman" charset="0"/>
+            </a:endParaRPr>
           </a:p>
           <a:p>
             <a:pPr marL="169863" indent="-169863">

</xml_diff>